<commit_message>
Edição no LLD e banco
</commit_message>
<xml_diff>
--- a/Documentação/HLD.LLD.DIAGRAMA.pptx
+++ b/Documentação/HLD.LLD.DIAGRAMA.pptx
@@ -135,7 +135,7 @@
           <p:cNvPr id="2" name="Título 1">
             <a:extLst>
               <a:ext uri="{FF2B5EF4-FFF2-40B4-BE49-F238E27FC236}">
-                <a16:creationId xmlns:a16="http://schemas.microsoft.com/office/drawing/2014/main" id="{9C9D081C-0F97-4DB2-B545-D20F5456DA1F}"/>
+                <a16:creationId xmlns:a16="http://schemas.microsoft.com/office/drawing/2014/main" xmlns="" id="{9C9D081C-0F97-4DB2-B545-D20F5456DA1F}"/>
               </a:ext>
             </a:extLst>
           </p:cNvPr>
@@ -172,7 +172,7 @@
           <p:cNvPr id="3" name="Subtítulo 2">
             <a:extLst>
               <a:ext uri="{FF2B5EF4-FFF2-40B4-BE49-F238E27FC236}">
-                <a16:creationId xmlns:a16="http://schemas.microsoft.com/office/drawing/2014/main" id="{974DF855-DB25-4F33-BF88-68991EBB3108}"/>
+                <a16:creationId xmlns:a16="http://schemas.microsoft.com/office/drawing/2014/main" xmlns="" id="{974DF855-DB25-4F33-BF88-68991EBB3108}"/>
               </a:ext>
             </a:extLst>
           </p:cNvPr>
@@ -242,7 +242,7 @@
           <p:cNvPr id="4" name="Espaço Reservado para Data 3">
             <a:extLst>
               <a:ext uri="{FF2B5EF4-FFF2-40B4-BE49-F238E27FC236}">
-                <a16:creationId xmlns:a16="http://schemas.microsoft.com/office/drawing/2014/main" id="{035A9201-BCC9-43E0-88C6-004C731F0501}"/>
+                <a16:creationId xmlns:a16="http://schemas.microsoft.com/office/drawing/2014/main" xmlns="" id="{035A9201-BCC9-43E0-88C6-004C731F0501}"/>
               </a:ext>
             </a:extLst>
           </p:cNvPr>
@@ -271,7 +271,7 @@
           <p:cNvPr id="5" name="Espaço Reservado para Rodapé 4">
             <a:extLst>
               <a:ext uri="{FF2B5EF4-FFF2-40B4-BE49-F238E27FC236}">
-                <a16:creationId xmlns:a16="http://schemas.microsoft.com/office/drawing/2014/main" id="{EE96D7DF-1FB0-4D05-AF2C-DE6460380CCA}"/>
+                <a16:creationId xmlns:a16="http://schemas.microsoft.com/office/drawing/2014/main" xmlns="" id="{EE96D7DF-1FB0-4D05-AF2C-DE6460380CCA}"/>
               </a:ext>
             </a:extLst>
           </p:cNvPr>
@@ -296,7 +296,7 @@
           <p:cNvPr id="6" name="Espaço Reservado para Número de Slide 5">
             <a:extLst>
               <a:ext uri="{FF2B5EF4-FFF2-40B4-BE49-F238E27FC236}">
-                <a16:creationId xmlns:a16="http://schemas.microsoft.com/office/drawing/2014/main" id="{6B180718-A06F-41B8-BBDE-D69E94F87DB3}"/>
+                <a16:creationId xmlns:a16="http://schemas.microsoft.com/office/drawing/2014/main" xmlns="" id="{6B180718-A06F-41B8-BBDE-D69E94F87DB3}"/>
               </a:ext>
             </a:extLst>
           </p:cNvPr>
@@ -355,7 +355,7 @@
           <p:cNvPr id="2" name="Título 1">
             <a:extLst>
               <a:ext uri="{FF2B5EF4-FFF2-40B4-BE49-F238E27FC236}">
-                <a16:creationId xmlns:a16="http://schemas.microsoft.com/office/drawing/2014/main" id="{06BC62C5-62A3-4C34-B96D-E9772382BB1F}"/>
+                <a16:creationId xmlns:a16="http://schemas.microsoft.com/office/drawing/2014/main" xmlns="" id="{06BC62C5-62A3-4C34-B96D-E9772382BB1F}"/>
               </a:ext>
             </a:extLst>
           </p:cNvPr>
@@ -383,7 +383,7 @@
           <p:cNvPr id="3" name="Espaço Reservado para Texto Vertical 2">
             <a:extLst>
               <a:ext uri="{FF2B5EF4-FFF2-40B4-BE49-F238E27FC236}">
-                <a16:creationId xmlns:a16="http://schemas.microsoft.com/office/drawing/2014/main" id="{5987ABD5-17FB-4334-8D1E-1B9FA7510FEF}"/>
+                <a16:creationId xmlns:a16="http://schemas.microsoft.com/office/drawing/2014/main" xmlns="" id="{5987ABD5-17FB-4334-8D1E-1B9FA7510FEF}"/>
               </a:ext>
             </a:extLst>
           </p:cNvPr>
@@ -440,7 +440,7 @@
           <p:cNvPr id="4" name="Espaço Reservado para Data 3">
             <a:extLst>
               <a:ext uri="{FF2B5EF4-FFF2-40B4-BE49-F238E27FC236}">
-                <a16:creationId xmlns:a16="http://schemas.microsoft.com/office/drawing/2014/main" id="{63B767CF-7B82-479D-B09D-C5ACFB4BF497}"/>
+                <a16:creationId xmlns:a16="http://schemas.microsoft.com/office/drawing/2014/main" xmlns="" id="{63B767CF-7B82-479D-B09D-C5ACFB4BF497}"/>
               </a:ext>
             </a:extLst>
           </p:cNvPr>
@@ -469,7 +469,7 @@
           <p:cNvPr id="5" name="Espaço Reservado para Rodapé 4">
             <a:extLst>
               <a:ext uri="{FF2B5EF4-FFF2-40B4-BE49-F238E27FC236}">
-                <a16:creationId xmlns:a16="http://schemas.microsoft.com/office/drawing/2014/main" id="{5813DBE3-B5D1-47C3-9D46-3B12A356FD91}"/>
+                <a16:creationId xmlns:a16="http://schemas.microsoft.com/office/drawing/2014/main" xmlns="" id="{5813DBE3-B5D1-47C3-9D46-3B12A356FD91}"/>
               </a:ext>
             </a:extLst>
           </p:cNvPr>
@@ -494,7 +494,7 @@
           <p:cNvPr id="6" name="Espaço Reservado para Número de Slide 5">
             <a:extLst>
               <a:ext uri="{FF2B5EF4-FFF2-40B4-BE49-F238E27FC236}">
-                <a16:creationId xmlns:a16="http://schemas.microsoft.com/office/drawing/2014/main" id="{FE4F2FBA-5C20-4470-AB3B-CA59CCC90F4E}"/>
+                <a16:creationId xmlns:a16="http://schemas.microsoft.com/office/drawing/2014/main" xmlns="" id="{FE4F2FBA-5C20-4470-AB3B-CA59CCC90F4E}"/>
               </a:ext>
             </a:extLst>
           </p:cNvPr>
@@ -553,7 +553,7 @@
           <p:cNvPr id="2" name="Título Vertical 1">
             <a:extLst>
               <a:ext uri="{FF2B5EF4-FFF2-40B4-BE49-F238E27FC236}">
-                <a16:creationId xmlns:a16="http://schemas.microsoft.com/office/drawing/2014/main" id="{2D0FF3FD-4633-4116-B308-3DC9016524BF}"/>
+                <a16:creationId xmlns:a16="http://schemas.microsoft.com/office/drawing/2014/main" xmlns="" id="{2D0FF3FD-4633-4116-B308-3DC9016524BF}"/>
               </a:ext>
             </a:extLst>
           </p:cNvPr>
@@ -586,7 +586,7 @@
           <p:cNvPr id="3" name="Espaço Reservado para Texto Vertical 2">
             <a:extLst>
               <a:ext uri="{FF2B5EF4-FFF2-40B4-BE49-F238E27FC236}">
-                <a16:creationId xmlns:a16="http://schemas.microsoft.com/office/drawing/2014/main" id="{1CE652A6-6F2A-46CD-9D5C-CED0D3A9FB8F}"/>
+                <a16:creationId xmlns:a16="http://schemas.microsoft.com/office/drawing/2014/main" xmlns="" id="{1CE652A6-6F2A-46CD-9D5C-CED0D3A9FB8F}"/>
               </a:ext>
             </a:extLst>
           </p:cNvPr>
@@ -648,7 +648,7 @@
           <p:cNvPr id="4" name="Espaço Reservado para Data 3">
             <a:extLst>
               <a:ext uri="{FF2B5EF4-FFF2-40B4-BE49-F238E27FC236}">
-                <a16:creationId xmlns:a16="http://schemas.microsoft.com/office/drawing/2014/main" id="{06B13398-15E8-4EBF-B29F-80855CDF7F26}"/>
+                <a16:creationId xmlns:a16="http://schemas.microsoft.com/office/drawing/2014/main" xmlns="" id="{06B13398-15E8-4EBF-B29F-80855CDF7F26}"/>
               </a:ext>
             </a:extLst>
           </p:cNvPr>
@@ -677,7 +677,7 @@
           <p:cNvPr id="5" name="Espaço Reservado para Rodapé 4">
             <a:extLst>
               <a:ext uri="{FF2B5EF4-FFF2-40B4-BE49-F238E27FC236}">
-                <a16:creationId xmlns:a16="http://schemas.microsoft.com/office/drawing/2014/main" id="{152F3931-4EA3-4DFF-AB39-EBDC4DD76D8D}"/>
+                <a16:creationId xmlns:a16="http://schemas.microsoft.com/office/drawing/2014/main" xmlns="" id="{152F3931-4EA3-4DFF-AB39-EBDC4DD76D8D}"/>
               </a:ext>
             </a:extLst>
           </p:cNvPr>
@@ -702,7 +702,7 @@
           <p:cNvPr id="6" name="Espaço Reservado para Número de Slide 5">
             <a:extLst>
               <a:ext uri="{FF2B5EF4-FFF2-40B4-BE49-F238E27FC236}">
-                <a16:creationId xmlns:a16="http://schemas.microsoft.com/office/drawing/2014/main" id="{4A6AC45E-BF7F-4F65-9509-B6CF7A6F3748}"/>
+                <a16:creationId xmlns:a16="http://schemas.microsoft.com/office/drawing/2014/main" xmlns="" id="{4A6AC45E-BF7F-4F65-9509-B6CF7A6F3748}"/>
               </a:ext>
             </a:extLst>
           </p:cNvPr>
@@ -761,7 +761,7 @@
           <p:cNvPr id="2" name="Título 1">
             <a:extLst>
               <a:ext uri="{FF2B5EF4-FFF2-40B4-BE49-F238E27FC236}">
-                <a16:creationId xmlns:a16="http://schemas.microsoft.com/office/drawing/2014/main" id="{47080BF8-F94D-4C7B-8946-1F7A9406C1FE}"/>
+                <a16:creationId xmlns:a16="http://schemas.microsoft.com/office/drawing/2014/main" xmlns="" id="{47080BF8-F94D-4C7B-8946-1F7A9406C1FE}"/>
               </a:ext>
             </a:extLst>
           </p:cNvPr>
@@ -789,7 +789,7 @@
           <p:cNvPr id="3" name="Espaço Reservado para Conteúdo 2">
             <a:extLst>
               <a:ext uri="{FF2B5EF4-FFF2-40B4-BE49-F238E27FC236}">
-                <a16:creationId xmlns:a16="http://schemas.microsoft.com/office/drawing/2014/main" id="{87C712CB-843F-4DFE-A432-2CC6CF4A63C7}"/>
+                <a16:creationId xmlns:a16="http://schemas.microsoft.com/office/drawing/2014/main" xmlns="" id="{87C712CB-843F-4DFE-A432-2CC6CF4A63C7}"/>
               </a:ext>
             </a:extLst>
           </p:cNvPr>
@@ -846,7 +846,7 @@
           <p:cNvPr id="4" name="Espaço Reservado para Data 3">
             <a:extLst>
               <a:ext uri="{FF2B5EF4-FFF2-40B4-BE49-F238E27FC236}">
-                <a16:creationId xmlns:a16="http://schemas.microsoft.com/office/drawing/2014/main" id="{C4A7E271-096C-48D0-A96E-AC1F80043C54}"/>
+                <a16:creationId xmlns:a16="http://schemas.microsoft.com/office/drawing/2014/main" xmlns="" id="{C4A7E271-096C-48D0-A96E-AC1F80043C54}"/>
               </a:ext>
             </a:extLst>
           </p:cNvPr>
@@ -875,7 +875,7 @@
           <p:cNvPr id="5" name="Espaço Reservado para Rodapé 4">
             <a:extLst>
               <a:ext uri="{FF2B5EF4-FFF2-40B4-BE49-F238E27FC236}">
-                <a16:creationId xmlns:a16="http://schemas.microsoft.com/office/drawing/2014/main" id="{1C722D53-0BCF-4AA5-ABD6-F5F92BE3953B}"/>
+                <a16:creationId xmlns:a16="http://schemas.microsoft.com/office/drawing/2014/main" xmlns="" id="{1C722D53-0BCF-4AA5-ABD6-F5F92BE3953B}"/>
               </a:ext>
             </a:extLst>
           </p:cNvPr>
@@ -900,7 +900,7 @@
           <p:cNvPr id="6" name="Espaço Reservado para Número de Slide 5">
             <a:extLst>
               <a:ext uri="{FF2B5EF4-FFF2-40B4-BE49-F238E27FC236}">
-                <a16:creationId xmlns:a16="http://schemas.microsoft.com/office/drawing/2014/main" id="{23647B80-A0C6-4C68-B4A3-C58B2FB759D3}"/>
+                <a16:creationId xmlns:a16="http://schemas.microsoft.com/office/drawing/2014/main" xmlns="" id="{23647B80-A0C6-4C68-B4A3-C58B2FB759D3}"/>
               </a:ext>
             </a:extLst>
           </p:cNvPr>
@@ -959,7 +959,7 @@
           <p:cNvPr id="2" name="Título 1">
             <a:extLst>
               <a:ext uri="{FF2B5EF4-FFF2-40B4-BE49-F238E27FC236}">
-                <a16:creationId xmlns:a16="http://schemas.microsoft.com/office/drawing/2014/main" id="{0A830081-40B9-4693-9AE9-FB6C802278E0}"/>
+                <a16:creationId xmlns:a16="http://schemas.microsoft.com/office/drawing/2014/main" xmlns="" id="{0A830081-40B9-4693-9AE9-FB6C802278E0}"/>
               </a:ext>
             </a:extLst>
           </p:cNvPr>
@@ -996,7 +996,7 @@
           <p:cNvPr id="3" name="Espaço Reservado para Texto 2">
             <a:extLst>
               <a:ext uri="{FF2B5EF4-FFF2-40B4-BE49-F238E27FC236}">
-                <a16:creationId xmlns:a16="http://schemas.microsoft.com/office/drawing/2014/main" id="{BF5D38DE-E84F-4AD6-B626-13BAC655DDF6}"/>
+                <a16:creationId xmlns:a16="http://schemas.microsoft.com/office/drawing/2014/main" xmlns="" id="{BF5D38DE-E84F-4AD6-B626-13BAC655DDF6}"/>
               </a:ext>
             </a:extLst>
           </p:cNvPr>
@@ -1121,7 +1121,7 @@
           <p:cNvPr id="4" name="Espaço Reservado para Data 3">
             <a:extLst>
               <a:ext uri="{FF2B5EF4-FFF2-40B4-BE49-F238E27FC236}">
-                <a16:creationId xmlns:a16="http://schemas.microsoft.com/office/drawing/2014/main" id="{8BBBB9CE-FE64-4440-89E0-58692A7ED8E5}"/>
+                <a16:creationId xmlns:a16="http://schemas.microsoft.com/office/drawing/2014/main" xmlns="" id="{8BBBB9CE-FE64-4440-89E0-58692A7ED8E5}"/>
               </a:ext>
             </a:extLst>
           </p:cNvPr>
@@ -1150,7 +1150,7 @@
           <p:cNvPr id="5" name="Espaço Reservado para Rodapé 4">
             <a:extLst>
               <a:ext uri="{FF2B5EF4-FFF2-40B4-BE49-F238E27FC236}">
-                <a16:creationId xmlns:a16="http://schemas.microsoft.com/office/drawing/2014/main" id="{EBABC5BE-E0D5-4A2A-97A7-02EA28F3FD40}"/>
+                <a16:creationId xmlns:a16="http://schemas.microsoft.com/office/drawing/2014/main" xmlns="" id="{EBABC5BE-E0D5-4A2A-97A7-02EA28F3FD40}"/>
               </a:ext>
             </a:extLst>
           </p:cNvPr>
@@ -1175,7 +1175,7 @@
           <p:cNvPr id="6" name="Espaço Reservado para Número de Slide 5">
             <a:extLst>
               <a:ext uri="{FF2B5EF4-FFF2-40B4-BE49-F238E27FC236}">
-                <a16:creationId xmlns:a16="http://schemas.microsoft.com/office/drawing/2014/main" id="{264D844E-38E3-4AEB-95EE-A141D561415B}"/>
+                <a16:creationId xmlns:a16="http://schemas.microsoft.com/office/drawing/2014/main" xmlns="" id="{264D844E-38E3-4AEB-95EE-A141D561415B}"/>
               </a:ext>
             </a:extLst>
           </p:cNvPr>
@@ -1234,7 +1234,7 @@
           <p:cNvPr id="2" name="Título 1">
             <a:extLst>
               <a:ext uri="{FF2B5EF4-FFF2-40B4-BE49-F238E27FC236}">
-                <a16:creationId xmlns:a16="http://schemas.microsoft.com/office/drawing/2014/main" id="{EBD2F67F-68BF-4EC1-8D4E-01B8259ACD92}"/>
+                <a16:creationId xmlns:a16="http://schemas.microsoft.com/office/drawing/2014/main" xmlns="" id="{EBD2F67F-68BF-4EC1-8D4E-01B8259ACD92}"/>
               </a:ext>
             </a:extLst>
           </p:cNvPr>
@@ -1262,7 +1262,7 @@
           <p:cNvPr id="3" name="Espaço Reservado para Conteúdo 2">
             <a:extLst>
               <a:ext uri="{FF2B5EF4-FFF2-40B4-BE49-F238E27FC236}">
-                <a16:creationId xmlns:a16="http://schemas.microsoft.com/office/drawing/2014/main" id="{01974D6A-BCE5-4E24-B4D1-2B2BCA416358}"/>
+                <a16:creationId xmlns:a16="http://schemas.microsoft.com/office/drawing/2014/main" xmlns="" id="{01974D6A-BCE5-4E24-B4D1-2B2BCA416358}"/>
               </a:ext>
             </a:extLst>
           </p:cNvPr>
@@ -1324,7 +1324,7 @@
           <p:cNvPr id="4" name="Espaço Reservado para Conteúdo 3">
             <a:extLst>
               <a:ext uri="{FF2B5EF4-FFF2-40B4-BE49-F238E27FC236}">
-                <a16:creationId xmlns:a16="http://schemas.microsoft.com/office/drawing/2014/main" id="{9D00E5A3-BC4C-4370-B691-96CE002325C1}"/>
+                <a16:creationId xmlns:a16="http://schemas.microsoft.com/office/drawing/2014/main" xmlns="" id="{9D00E5A3-BC4C-4370-B691-96CE002325C1}"/>
               </a:ext>
             </a:extLst>
           </p:cNvPr>
@@ -1386,7 +1386,7 @@
           <p:cNvPr id="5" name="Espaço Reservado para Data 4">
             <a:extLst>
               <a:ext uri="{FF2B5EF4-FFF2-40B4-BE49-F238E27FC236}">
-                <a16:creationId xmlns:a16="http://schemas.microsoft.com/office/drawing/2014/main" id="{301DACF2-7B9C-4039-B450-907946D43F2F}"/>
+                <a16:creationId xmlns:a16="http://schemas.microsoft.com/office/drawing/2014/main" xmlns="" id="{301DACF2-7B9C-4039-B450-907946D43F2F}"/>
               </a:ext>
             </a:extLst>
           </p:cNvPr>
@@ -1415,7 +1415,7 @@
           <p:cNvPr id="6" name="Espaço Reservado para Rodapé 5">
             <a:extLst>
               <a:ext uri="{FF2B5EF4-FFF2-40B4-BE49-F238E27FC236}">
-                <a16:creationId xmlns:a16="http://schemas.microsoft.com/office/drawing/2014/main" id="{930B2BF7-E597-4DBF-AC42-44D9AC074CA7}"/>
+                <a16:creationId xmlns:a16="http://schemas.microsoft.com/office/drawing/2014/main" xmlns="" id="{930B2BF7-E597-4DBF-AC42-44D9AC074CA7}"/>
               </a:ext>
             </a:extLst>
           </p:cNvPr>
@@ -1440,7 +1440,7 @@
           <p:cNvPr id="7" name="Espaço Reservado para Número de Slide 6">
             <a:extLst>
               <a:ext uri="{FF2B5EF4-FFF2-40B4-BE49-F238E27FC236}">
-                <a16:creationId xmlns:a16="http://schemas.microsoft.com/office/drawing/2014/main" id="{7BD0FD2C-FA19-486B-8614-D5B565DD9F06}"/>
+                <a16:creationId xmlns:a16="http://schemas.microsoft.com/office/drawing/2014/main" xmlns="" id="{7BD0FD2C-FA19-486B-8614-D5B565DD9F06}"/>
               </a:ext>
             </a:extLst>
           </p:cNvPr>
@@ -1499,7 +1499,7 @@
           <p:cNvPr id="2" name="Título 1">
             <a:extLst>
               <a:ext uri="{FF2B5EF4-FFF2-40B4-BE49-F238E27FC236}">
-                <a16:creationId xmlns:a16="http://schemas.microsoft.com/office/drawing/2014/main" id="{D440D9DA-AE47-4C63-817F-6FABBFEAA115}"/>
+                <a16:creationId xmlns:a16="http://schemas.microsoft.com/office/drawing/2014/main" xmlns="" id="{D440D9DA-AE47-4C63-817F-6FABBFEAA115}"/>
               </a:ext>
             </a:extLst>
           </p:cNvPr>
@@ -1532,7 +1532,7 @@
           <p:cNvPr id="3" name="Espaço Reservado para Texto 2">
             <a:extLst>
               <a:ext uri="{FF2B5EF4-FFF2-40B4-BE49-F238E27FC236}">
-                <a16:creationId xmlns:a16="http://schemas.microsoft.com/office/drawing/2014/main" id="{5A79B8A0-431C-46B7-9585-6ED7F0D39EF2}"/>
+                <a16:creationId xmlns:a16="http://schemas.microsoft.com/office/drawing/2014/main" xmlns="" id="{5A79B8A0-431C-46B7-9585-6ED7F0D39EF2}"/>
               </a:ext>
             </a:extLst>
           </p:cNvPr>
@@ -1603,7 +1603,7 @@
           <p:cNvPr id="4" name="Espaço Reservado para Conteúdo 3">
             <a:extLst>
               <a:ext uri="{FF2B5EF4-FFF2-40B4-BE49-F238E27FC236}">
-                <a16:creationId xmlns:a16="http://schemas.microsoft.com/office/drawing/2014/main" id="{D962E492-AB16-4CE4-860D-ADB327B364FA}"/>
+                <a16:creationId xmlns:a16="http://schemas.microsoft.com/office/drawing/2014/main" xmlns="" id="{D962E492-AB16-4CE4-860D-ADB327B364FA}"/>
               </a:ext>
             </a:extLst>
           </p:cNvPr>
@@ -1665,7 +1665,7 @@
           <p:cNvPr id="5" name="Espaço Reservado para Texto 4">
             <a:extLst>
               <a:ext uri="{FF2B5EF4-FFF2-40B4-BE49-F238E27FC236}">
-                <a16:creationId xmlns:a16="http://schemas.microsoft.com/office/drawing/2014/main" id="{205D6EB2-A451-4CFB-A4CE-B757CEC3C34A}"/>
+                <a16:creationId xmlns:a16="http://schemas.microsoft.com/office/drawing/2014/main" xmlns="" id="{205D6EB2-A451-4CFB-A4CE-B757CEC3C34A}"/>
               </a:ext>
             </a:extLst>
           </p:cNvPr>
@@ -1736,7 +1736,7 @@
           <p:cNvPr id="6" name="Espaço Reservado para Conteúdo 5">
             <a:extLst>
               <a:ext uri="{FF2B5EF4-FFF2-40B4-BE49-F238E27FC236}">
-                <a16:creationId xmlns:a16="http://schemas.microsoft.com/office/drawing/2014/main" id="{F5E11F8F-EB23-4782-92C0-5A46225A3CF6}"/>
+                <a16:creationId xmlns:a16="http://schemas.microsoft.com/office/drawing/2014/main" xmlns="" id="{F5E11F8F-EB23-4782-92C0-5A46225A3CF6}"/>
               </a:ext>
             </a:extLst>
           </p:cNvPr>
@@ -1798,7 +1798,7 @@
           <p:cNvPr id="7" name="Espaço Reservado para Data 6">
             <a:extLst>
               <a:ext uri="{FF2B5EF4-FFF2-40B4-BE49-F238E27FC236}">
-                <a16:creationId xmlns:a16="http://schemas.microsoft.com/office/drawing/2014/main" id="{11E705B9-1AE6-4B3F-B142-A57289326F92}"/>
+                <a16:creationId xmlns:a16="http://schemas.microsoft.com/office/drawing/2014/main" xmlns="" id="{11E705B9-1AE6-4B3F-B142-A57289326F92}"/>
               </a:ext>
             </a:extLst>
           </p:cNvPr>
@@ -1827,7 +1827,7 @@
           <p:cNvPr id="8" name="Espaço Reservado para Rodapé 7">
             <a:extLst>
               <a:ext uri="{FF2B5EF4-FFF2-40B4-BE49-F238E27FC236}">
-                <a16:creationId xmlns:a16="http://schemas.microsoft.com/office/drawing/2014/main" id="{48EF0B24-3FF3-4C27-BEC2-8AC3B23E9DEB}"/>
+                <a16:creationId xmlns:a16="http://schemas.microsoft.com/office/drawing/2014/main" xmlns="" id="{48EF0B24-3FF3-4C27-BEC2-8AC3B23E9DEB}"/>
               </a:ext>
             </a:extLst>
           </p:cNvPr>
@@ -1852,7 +1852,7 @@
           <p:cNvPr id="9" name="Espaço Reservado para Número de Slide 8">
             <a:extLst>
               <a:ext uri="{FF2B5EF4-FFF2-40B4-BE49-F238E27FC236}">
-                <a16:creationId xmlns:a16="http://schemas.microsoft.com/office/drawing/2014/main" id="{E736BDCF-EC0D-4A52-8503-19E7822C8C0C}"/>
+                <a16:creationId xmlns:a16="http://schemas.microsoft.com/office/drawing/2014/main" xmlns="" id="{E736BDCF-EC0D-4A52-8503-19E7822C8C0C}"/>
               </a:ext>
             </a:extLst>
           </p:cNvPr>
@@ -1911,7 +1911,7 @@
           <p:cNvPr id="2" name="Título 1">
             <a:extLst>
               <a:ext uri="{FF2B5EF4-FFF2-40B4-BE49-F238E27FC236}">
-                <a16:creationId xmlns:a16="http://schemas.microsoft.com/office/drawing/2014/main" id="{C8D1AFA6-6735-442E-B80B-24DB69886AF1}"/>
+                <a16:creationId xmlns:a16="http://schemas.microsoft.com/office/drawing/2014/main" xmlns="" id="{C8D1AFA6-6735-442E-B80B-24DB69886AF1}"/>
               </a:ext>
             </a:extLst>
           </p:cNvPr>
@@ -1939,7 +1939,7 @@
           <p:cNvPr id="3" name="Espaço Reservado para Data 2">
             <a:extLst>
               <a:ext uri="{FF2B5EF4-FFF2-40B4-BE49-F238E27FC236}">
-                <a16:creationId xmlns:a16="http://schemas.microsoft.com/office/drawing/2014/main" id="{D7458DFD-4CB5-4F1E-8D2E-970B34448A07}"/>
+                <a16:creationId xmlns:a16="http://schemas.microsoft.com/office/drawing/2014/main" xmlns="" id="{D7458DFD-4CB5-4F1E-8D2E-970B34448A07}"/>
               </a:ext>
             </a:extLst>
           </p:cNvPr>
@@ -1968,7 +1968,7 @@
           <p:cNvPr id="4" name="Espaço Reservado para Rodapé 3">
             <a:extLst>
               <a:ext uri="{FF2B5EF4-FFF2-40B4-BE49-F238E27FC236}">
-                <a16:creationId xmlns:a16="http://schemas.microsoft.com/office/drawing/2014/main" id="{ED562646-CBF8-4D67-BFF2-FDA6A743285E}"/>
+                <a16:creationId xmlns:a16="http://schemas.microsoft.com/office/drawing/2014/main" xmlns="" id="{ED562646-CBF8-4D67-BFF2-FDA6A743285E}"/>
               </a:ext>
             </a:extLst>
           </p:cNvPr>
@@ -1993,7 +1993,7 @@
           <p:cNvPr id="5" name="Espaço Reservado para Número de Slide 4">
             <a:extLst>
               <a:ext uri="{FF2B5EF4-FFF2-40B4-BE49-F238E27FC236}">
-                <a16:creationId xmlns:a16="http://schemas.microsoft.com/office/drawing/2014/main" id="{7B0FA740-0E87-42AA-8994-E46D3B329A94}"/>
+                <a16:creationId xmlns:a16="http://schemas.microsoft.com/office/drawing/2014/main" xmlns="" id="{7B0FA740-0E87-42AA-8994-E46D3B329A94}"/>
               </a:ext>
             </a:extLst>
           </p:cNvPr>
@@ -2052,7 +2052,7 @@
           <p:cNvPr id="2" name="Espaço Reservado para Data 1">
             <a:extLst>
               <a:ext uri="{FF2B5EF4-FFF2-40B4-BE49-F238E27FC236}">
-                <a16:creationId xmlns:a16="http://schemas.microsoft.com/office/drawing/2014/main" id="{6BA3CBF6-643C-4ACD-AD84-EE4CC969A087}"/>
+                <a16:creationId xmlns:a16="http://schemas.microsoft.com/office/drawing/2014/main" xmlns="" id="{6BA3CBF6-643C-4ACD-AD84-EE4CC969A087}"/>
               </a:ext>
             </a:extLst>
           </p:cNvPr>
@@ -2081,7 +2081,7 @@
           <p:cNvPr id="3" name="Espaço Reservado para Rodapé 2">
             <a:extLst>
               <a:ext uri="{FF2B5EF4-FFF2-40B4-BE49-F238E27FC236}">
-                <a16:creationId xmlns:a16="http://schemas.microsoft.com/office/drawing/2014/main" id="{DA9E3177-C1C8-47C4-ACAB-13BA6A17B47D}"/>
+                <a16:creationId xmlns:a16="http://schemas.microsoft.com/office/drawing/2014/main" xmlns="" id="{DA9E3177-C1C8-47C4-ACAB-13BA6A17B47D}"/>
               </a:ext>
             </a:extLst>
           </p:cNvPr>
@@ -2106,7 +2106,7 @@
           <p:cNvPr id="4" name="Espaço Reservado para Número de Slide 3">
             <a:extLst>
               <a:ext uri="{FF2B5EF4-FFF2-40B4-BE49-F238E27FC236}">
-                <a16:creationId xmlns:a16="http://schemas.microsoft.com/office/drawing/2014/main" id="{18A5E5DD-60AE-4B3D-BA68-EFB55A852DB6}"/>
+                <a16:creationId xmlns:a16="http://schemas.microsoft.com/office/drawing/2014/main" xmlns="" id="{18A5E5DD-60AE-4B3D-BA68-EFB55A852DB6}"/>
               </a:ext>
             </a:extLst>
           </p:cNvPr>
@@ -2165,7 +2165,7 @@
           <p:cNvPr id="2" name="Título 1">
             <a:extLst>
               <a:ext uri="{FF2B5EF4-FFF2-40B4-BE49-F238E27FC236}">
-                <a16:creationId xmlns:a16="http://schemas.microsoft.com/office/drawing/2014/main" id="{F1DB3F72-ACB8-4452-879C-3475B9D5229B}"/>
+                <a16:creationId xmlns:a16="http://schemas.microsoft.com/office/drawing/2014/main" xmlns="" id="{F1DB3F72-ACB8-4452-879C-3475B9D5229B}"/>
               </a:ext>
             </a:extLst>
           </p:cNvPr>
@@ -2202,7 +2202,7 @@
           <p:cNvPr id="3" name="Espaço Reservado para Conteúdo 2">
             <a:extLst>
               <a:ext uri="{FF2B5EF4-FFF2-40B4-BE49-F238E27FC236}">
-                <a16:creationId xmlns:a16="http://schemas.microsoft.com/office/drawing/2014/main" id="{08B02274-FF04-4E27-8FCE-2872DC8FB29F}"/>
+                <a16:creationId xmlns:a16="http://schemas.microsoft.com/office/drawing/2014/main" xmlns="" id="{08B02274-FF04-4E27-8FCE-2872DC8FB29F}"/>
               </a:ext>
             </a:extLst>
           </p:cNvPr>
@@ -2292,7 +2292,7 @@
           <p:cNvPr id="4" name="Espaço Reservado para Texto 3">
             <a:extLst>
               <a:ext uri="{FF2B5EF4-FFF2-40B4-BE49-F238E27FC236}">
-                <a16:creationId xmlns:a16="http://schemas.microsoft.com/office/drawing/2014/main" id="{05BAC6B0-7C36-443D-BFAF-0DC7FDDB6CE6}"/>
+                <a16:creationId xmlns:a16="http://schemas.microsoft.com/office/drawing/2014/main" xmlns="" id="{05BAC6B0-7C36-443D-BFAF-0DC7FDDB6CE6}"/>
               </a:ext>
             </a:extLst>
           </p:cNvPr>
@@ -2363,7 +2363,7 @@
           <p:cNvPr id="5" name="Espaço Reservado para Data 4">
             <a:extLst>
               <a:ext uri="{FF2B5EF4-FFF2-40B4-BE49-F238E27FC236}">
-                <a16:creationId xmlns:a16="http://schemas.microsoft.com/office/drawing/2014/main" id="{C97A49D8-2ABA-4FAD-A219-DFB616012DE0}"/>
+                <a16:creationId xmlns:a16="http://schemas.microsoft.com/office/drawing/2014/main" xmlns="" id="{C97A49D8-2ABA-4FAD-A219-DFB616012DE0}"/>
               </a:ext>
             </a:extLst>
           </p:cNvPr>
@@ -2392,7 +2392,7 @@
           <p:cNvPr id="6" name="Espaço Reservado para Rodapé 5">
             <a:extLst>
               <a:ext uri="{FF2B5EF4-FFF2-40B4-BE49-F238E27FC236}">
-                <a16:creationId xmlns:a16="http://schemas.microsoft.com/office/drawing/2014/main" id="{39D0A1B8-190A-4E3C-93DD-D1A92DBB7D1C}"/>
+                <a16:creationId xmlns:a16="http://schemas.microsoft.com/office/drawing/2014/main" xmlns="" id="{39D0A1B8-190A-4E3C-93DD-D1A92DBB7D1C}"/>
               </a:ext>
             </a:extLst>
           </p:cNvPr>
@@ -2417,7 +2417,7 @@
           <p:cNvPr id="7" name="Espaço Reservado para Número de Slide 6">
             <a:extLst>
               <a:ext uri="{FF2B5EF4-FFF2-40B4-BE49-F238E27FC236}">
-                <a16:creationId xmlns:a16="http://schemas.microsoft.com/office/drawing/2014/main" id="{22E076B9-BF23-488D-AAA7-F93C4DEB82F9}"/>
+                <a16:creationId xmlns:a16="http://schemas.microsoft.com/office/drawing/2014/main" xmlns="" id="{22E076B9-BF23-488D-AAA7-F93C4DEB82F9}"/>
               </a:ext>
             </a:extLst>
           </p:cNvPr>
@@ -2476,7 +2476,7 @@
           <p:cNvPr id="2" name="Título 1">
             <a:extLst>
               <a:ext uri="{FF2B5EF4-FFF2-40B4-BE49-F238E27FC236}">
-                <a16:creationId xmlns:a16="http://schemas.microsoft.com/office/drawing/2014/main" id="{1C6E4039-84DB-4D88-ADBC-60DB1A1DA8A2}"/>
+                <a16:creationId xmlns:a16="http://schemas.microsoft.com/office/drawing/2014/main" xmlns="" id="{1C6E4039-84DB-4D88-ADBC-60DB1A1DA8A2}"/>
               </a:ext>
             </a:extLst>
           </p:cNvPr>
@@ -2513,7 +2513,7 @@
           <p:cNvPr id="3" name="Espaço Reservado para Imagem 2">
             <a:extLst>
               <a:ext uri="{FF2B5EF4-FFF2-40B4-BE49-F238E27FC236}">
-                <a16:creationId xmlns:a16="http://schemas.microsoft.com/office/drawing/2014/main" id="{FE66FC34-356A-4619-B939-098A01CD14A4}"/>
+                <a16:creationId xmlns:a16="http://schemas.microsoft.com/office/drawing/2014/main" xmlns="" id="{FE66FC34-356A-4619-B939-098A01CD14A4}"/>
               </a:ext>
             </a:extLst>
           </p:cNvPr>
@@ -2580,7 +2580,7 @@
           <p:cNvPr id="4" name="Espaço Reservado para Texto 3">
             <a:extLst>
               <a:ext uri="{FF2B5EF4-FFF2-40B4-BE49-F238E27FC236}">
-                <a16:creationId xmlns:a16="http://schemas.microsoft.com/office/drawing/2014/main" id="{2D1C9864-964D-4D8C-B33B-711212ACB318}"/>
+                <a16:creationId xmlns:a16="http://schemas.microsoft.com/office/drawing/2014/main" xmlns="" id="{2D1C9864-964D-4D8C-B33B-711212ACB318}"/>
               </a:ext>
             </a:extLst>
           </p:cNvPr>
@@ -2651,7 +2651,7 @@
           <p:cNvPr id="5" name="Espaço Reservado para Data 4">
             <a:extLst>
               <a:ext uri="{FF2B5EF4-FFF2-40B4-BE49-F238E27FC236}">
-                <a16:creationId xmlns:a16="http://schemas.microsoft.com/office/drawing/2014/main" id="{F9CE9AEF-2284-498A-B9EE-89DBE7B003CE}"/>
+                <a16:creationId xmlns:a16="http://schemas.microsoft.com/office/drawing/2014/main" xmlns="" id="{F9CE9AEF-2284-498A-B9EE-89DBE7B003CE}"/>
               </a:ext>
             </a:extLst>
           </p:cNvPr>
@@ -2680,7 +2680,7 @@
           <p:cNvPr id="6" name="Espaço Reservado para Rodapé 5">
             <a:extLst>
               <a:ext uri="{FF2B5EF4-FFF2-40B4-BE49-F238E27FC236}">
-                <a16:creationId xmlns:a16="http://schemas.microsoft.com/office/drawing/2014/main" id="{E8DD3157-6B63-4D9B-B816-0DE04861777F}"/>
+                <a16:creationId xmlns:a16="http://schemas.microsoft.com/office/drawing/2014/main" xmlns="" id="{E8DD3157-6B63-4D9B-B816-0DE04861777F}"/>
               </a:ext>
             </a:extLst>
           </p:cNvPr>
@@ -2705,7 +2705,7 @@
           <p:cNvPr id="7" name="Espaço Reservado para Número de Slide 6">
             <a:extLst>
               <a:ext uri="{FF2B5EF4-FFF2-40B4-BE49-F238E27FC236}">
-                <a16:creationId xmlns:a16="http://schemas.microsoft.com/office/drawing/2014/main" id="{757F54A0-57B1-44CC-8CDD-CA3EAA4B0189}"/>
+                <a16:creationId xmlns:a16="http://schemas.microsoft.com/office/drawing/2014/main" xmlns="" id="{757F54A0-57B1-44CC-8CDD-CA3EAA4B0189}"/>
               </a:ext>
             </a:extLst>
           </p:cNvPr>
@@ -2769,7 +2769,7 @@
           <p:cNvPr id="2" name="Espaço Reservado para Título 1">
             <a:extLst>
               <a:ext uri="{FF2B5EF4-FFF2-40B4-BE49-F238E27FC236}">
-                <a16:creationId xmlns:a16="http://schemas.microsoft.com/office/drawing/2014/main" id="{DF3B372A-336D-49A1-8E4C-C2772470E717}"/>
+                <a16:creationId xmlns:a16="http://schemas.microsoft.com/office/drawing/2014/main" xmlns="" id="{DF3B372A-336D-49A1-8E4C-C2772470E717}"/>
               </a:ext>
             </a:extLst>
           </p:cNvPr>
@@ -2807,7 +2807,7 @@
           <p:cNvPr id="3" name="Espaço Reservado para Texto 2">
             <a:extLst>
               <a:ext uri="{FF2B5EF4-FFF2-40B4-BE49-F238E27FC236}">
-                <a16:creationId xmlns:a16="http://schemas.microsoft.com/office/drawing/2014/main" id="{FF8D6751-AF01-43BA-BC96-8236D09E671A}"/>
+                <a16:creationId xmlns:a16="http://schemas.microsoft.com/office/drawing/2014/main" xmlns="" id="{FF8D6751-AF01-43BA-BC96-8236D09E671A}"/>
               </a:ext>
             </a:extLst>
           </p:cNvPr>
@@ -2874,7 +2874,7 @@
           <p:cNvPr id="4" name="Espaço Reservado para Data 3">
             <a:extLst>
               <a:ext uri="{FF2B5EF4-FFF2-40B4-BE49-F238E27FC236}">
-                <a16:creationId xmlns:a16="http://schemas.microsoft.com/office/drawing/2014/main" id="{717400A4-F695-495F-8D3A-44F247634C38}"/>
+                <a16:creationId xmlns:a16="http://schemas.microsoft.com/office/drawing/2014/main" xmlns="" id="{717400A4-F695-495F-8D3A-44F247634C38}"/>
               </a:ext>
             </a:extLst>
           </p:cNvPr>
@@ -2921,7 +2921,7 @@
           <p:cNvPr id="5" name="Espaço Reservado para Rodapé 4">
             <a:extLst>
               <a:ext uri="{FF2B5EF4-FFF2-40B4-BE49-F238E27FC236}">
-                <a16:creationId xmlns:a16="http://schemas.microsoft.com/office/drawing/2014/main" id="{AE9E5EC4-6EE9-4001-83FB-7B2CEDC8F6C1}"/>
+                <a16:creationId xmlns:a16="http://schemas.microsoft.com/office/drawing/2014/main" xmlns="" id="{AE9E5EC4-6EE9-4001-83FB-7B2CEDC8F6C1}"/>
               </a:ext>
             </a:extLst>
           </p:cNvPr>
@@ -2964,7 +2964,7 @@
           <p:cNvPr id="6" name="Espaço Reservado para Número de Slide 5">
             <a:extLst>
               <a:ext uri="{FF2B5EF4-FFF2-40B4-BE49-F238E27FC236}">
-                <a16:creationId xmlns:a16="http://schemas.microsoft.com/office/drawing/2014/main" id="{23F1441C-AB1F-4113-A9EA-CFBBA3E5D38B}"/>
+                <a16:creationId xmlns:a16="http://schemas.microsoft.com/office/drawing/2014/main" xmlns="" id="{23F1441C-AB1F-4113-A9EA-CFBBA3E5D38B}"/>
               </a:ext>
             </a:extLst>
           </p:cNvPr>
@@ -3332,7 +3332,7 @@
           <p:cNvPr id="5" name="CaixaDeTexto 4">
             <a:extLst>
               <a:ext uri="{FF2B5EF4-FFF2-40B4-BE49-F238E27FC236}">
-                <a16:creationId xmlns:a16="http://schemas.microsoft.com/office/drawing/2014/main" id="{3A0E2E5A-1CDB-49BC-9C37-FC86C36DA909}"/>
+                <a16:creationId xmlns:a16="http://schemas.microsoft.com/office/drawing/2014/main" xmlns="" id="{3A0E2E5A-1CDB-49BC-9C37-FC86C36DA909}"/>
               </a:ext>
             </a:extLst>
           </p:cNvPr>
@@ -3368,7 +3368,7 @@
           <p:cNvPr id="6" name="CaixaDeTexto 5">
             <a:extLst>
               <a:ext uri="{FF2B5EF4-FFF2-40B4-BE49-F238E27FC236}">
-                <a16:creationId xmlns:a16="http://schemas.microsoft.com/office/drawing/2014/main" id="{412904C5-8378-4A99-AC6C-897C51F80497}"/>
+                <a16:creationId xmlns:a16="http://schemas.microsoft.com/office/drawing/2014/main" xmlns="" id="{412904C5-8378-4A99-AC6C-897C51F80497}"/>
               </a:ext>
             </a:extLst>
           </p:cNvPr>
@@ -3404,7 +3404,7 @@
           <p:cNvPr id="10" name="Imagem 9">
             <a:extLst>
               <a:ext uri="{FF2B5EF4-FFF2-40B4-BE49-F238E27FC236}">
-                <a16:creationId xmlns:a16="http://schemas.microsoft.com/office/drawing/2014/main" id="{AD925734-A883-4E00-A8F5-5539F9E089B0}"/>
+                <a16:creationId xmlns:a16="http://schemas.microsoft.com/office/drawing/2014/main" xmlns="" id="{AD925734-A883-4E00-A8F5-5539F9E089B0}"/>
               </a:ext>
             </a:extLst>
           </p:cNvPr>
@@ -3449,7 +3449,7 @@
           <p:cNvPr id="12" name="Imagem 11">
             <a:extLst>
               <a:ext uri="{FF2B5EF4-FFF2-40B4-BE49-F238E27FC236}">
-                <a16:creationId xmlns:a16="http://schemas.microsoft.com/office/drawing/2014/main" id="{B36E72DB-7364-407A-ADAA-356DC5102CC1}"/>
+                <a16:creationId xmlns:a16="http://schemas.microsoft.com/office/drawing/2014/main" xmlns="" id="{B36E72DB-7364-407A-ADAA-356DC5102CC1}"/>
               </a:ext>
             </a:extLst>
           </p:cNvPr>
@@ -3494,7 +3494,7 @@
           <p:cNvPr id="14" name="Imagem 13">
             <a:extLst>
               <a:ext uri="{FF2B5EF4-FFF2-40B4-BE49-F238E27FC236}">
-                <a16:creationId xmlns:a16="http://schemas.microsoft.com/office/drawing/2014/main" id="{7C95BA3E-B087-497F-A2F7-17D2ACAB588D}"/>
+                <a16:creationId xmlns:a16="http://schemas.microsoft.com/office/drawing/2014/main" xmlns="" id="{7C95BA3E-B087-497F-A2F7-17D2ACAB588D}"/>
               </a:ext>
             </a:extLst>
           </p:cNvPr>
@@ -3538,7 +3538,7 @@
           <p:cNvPr id="16" name="Imagem 15">
             <a:extLst>
               <a:ext uri="{FF2B5EF4-FFF2-40B4-BE49-F238E27FC236}">
-                <a16:creationId xmlns:a16="http://schemas.microsoft.com/office/drawing/2014/main" id="{6E1ED496-9576-424C-A6D8-1A33B907F447}"/>
+                <a16:creationId xmlns:a16="http://schemas.microsoft.com/office/drawing/2014/main" xmlns="" id="{6E1ED496-9576-424C-A6D8-1A33B907F447}"/>
               </a:ext>
             </a:extLst>
           </p:cNvPr>
@@ -3574,7 +3574,7 @@
           <p:cNvPr id="20" name="Imagem 19">
             <a:extLst>
               <a:ext uri="{FF2B5EF4-FFF2-40B4-BE49-F238E27FC236}">
-                <a16:creationId xmlns:a16="http://schemas.microsoft.com/office/drawing/2014/main" id="{6711525F-D16D-41C7-AB3E-9799DB511FA0}"/>
+                <a16:creationId xmlns:a16="http://schemas.microsoft.com/office/drawing/2014/main" xmlns="" id="{6711525F-D16D-41C7-AB3E-9799DB511FA0}"/>
               </a:ext>
             </a:extLst>
           </p:cNvPr>
@@ -3618,7 +3618,7 @@
           <p:cNvPr id="29" name="Imagem 28" descr="Ícone&#10;&#10;Descrição gerada automaticamente">
             <a:extLst>
               <a:ext uri="{FF2B5EF4-FFF2-40B4-BE49-F238E27FC236}">
-                <a16:creationId xmlns:a16="http://schemas.microsoft.com/office/drawing/2014/main" id="{43FB11AC-C448-4F44-B61E-41B39317BF92}"/>
+                <a16:creationId xmlns:a16="http://schemas.microsoft.com/office/drawing/2014/main" xmlns="" id="{43FB11AC-C448-4F44-B61E-41B39317BF92}"/>
               </a:ext>
             </a:extLst>
           </p:cNvPr>
@@ -3654,7 +3654,7 @@
           <p:cNvPr id="31" name="Imagem 30" descr="Ícone&#10;&#10;Descrição gerada automaticamente">
             <a:extLst>
               <a:ext uri="{FF2B5EF4-FFF2-40B4-BE49-F238E27FC236}">
-                <a16:creationId xmlns:a16="http://schemas.microsoft.com/office/drawing/2014/main" id="{E015E4BB-65D7-4162-A599-1A3DABA35918}"/>
+                <a16:creationId xmlns:a16="http://schemas.microsoft.com/office/drawing/2014/main" xmlns="" id="{E015E4BB-65D7-4162-A599-1A3DABA35918}"/>
               </a:ext>
             </a:extLst>
           </p:cNvPr>
@@ -3690,7 +3690,7 @@
           <p:cNvPr id="37" name="Imagem 36" descr="Uma imagem contendo relógio&#10;&#10;Descrição gerada automaticamente">
             <a:extLst>
               <a:ext uri="{FF2B5EF4-FFF2-40B4-BE49-F238E27FC236}">
-                <a16:creationId xmlns:a16="http://schemas.microsoft.com/office/drawing/2014/main" id="{CAF8B920-9A4F-406A-AB75-211B681E233E}"/>
+                <a16:creationId xmlns:a16="http://schemas.microsoft.com/office/drawing/2014/main" xmlns="" id="{CAF8B920-9A4F-406A-AB75-211B681E233E}"/>
               </a:ext>
             </a:extLst>
           </p:cNvPr>
@@ -3726,7 +3726,7 @@
           <p:cNvPr id="39" name="Imagem 38" descr="Ícone&#10;&#10;Descrição gerada automaticamente">
             <a:extLst>
               <a:ext uri="{FF2B5EF4-FFF2-40B4-BE49-F238E27FC236}">
-                <a16:creationId xmlns:a16="http://schemas.microsoft.com/office/drawing/2014/main" id="{F75E5FE2-0419-4BCC-A15C-8DE54005C9B2}"/>
+                <a16:creationId xmlns:a16="http://schemas.microsoft.com/office/drawing/2014/main" xmlns="" id="{F75E5FE2-0419-4BCC-A15C-8DE54005C9B2}"/>
               </a:ext>
             </a:extLst>
           </p:cNvPr>
@@ -3762,7 +3762,7 @@
           <p:cNvPr id="2" name="CaixaDeTexto 1">
             <a:extLst>
               <a:ext uri="{FF2B5EF4-FFF2-40B4-BE49-F238E27FC236}">
-                <a16:creationId xmlns:a16="http://schemas.microsoft.com/office/drawing/2014/main" id="{9785855B-0C06-475A-8CEB-38B9B93C5421}"/>
+                <a16:creationId xmlns:a16="http://schemas.microsoft.com/office/drawing/2014/main" xmlns="" id="{9785855B-0C06-475A-8CEB-38B9B93C5421}"/>
               </a:ext>
             </a:extLst>
           </p:cNvPr>
@@ -3797,7 +3797,7 @@
           <p:cNvPr id="18" name="CaixaDeTexto 17">
             <a:extLst>
               <a:ext uri="{FF2B5EF4-FFF2-40B4-BE49-F238E27FC236}">
-                <a16:creationId xmlns:a16="http://schemas.microsoft.com/office/drawing/2014/main" id="{5E16D9AB-B401-4B00-98D4-EFE0768B70EC}"/>
+                <a16:creationId xmlns:a16="http://schemas.microsoft.com/office/drawing/2014/main" xmlns="" id="{5E16D9AB-B401-4B00-98D4-EFE0768B70EC}"/>
               </a:ext>
             </a:extLst>
           </p:cNvPr>
@@ -3833,7 +3833,7 @@
           <p:cNvPr id="21" name="CaixaDeTexto 20">
             <a:extLst>
               <a:ext uri="{FF2B5EF4-FFF2-40B4-BE49-F238E27FC236}">
-                <a16:creationId xmlns:a16="http://schemas.microsoft.com/office/drawing/2014/main" id="{8FAB4AC2-1CFF-4CA5-BD50-F2D84F81A361}"/>
+                <a16:creationId xmlns:a16="http://schemas.microsoft.com/office/drawing/2014/main" xmlns="" id="{8FAB4AC2-1CFF-4CA5-BD50-F2D84F81A361}"/>
               </a:ext>
             </a:extLst>
           </p:cNvPr>
@@ -3869,7 +3869,7 @@
           <p:cNvPr id="23" name="CaixaDeTexto 22">
             <a:extLst>
               <a:ext uri="{FF2B5EF4-FFF2-40B4-BE49-F238E27FC236}">
-                <a16:creationId xmlns:a16="http://schemas.microsoft.com/office/drawing/2014/main" id="{752684E8-841F-414C-92C0-6E2CF31C3DA7}"/>
+                <a16:creationId xmlns:a16="http://schemas.microsoft.com/office/drawing/2014/main" xmlns="" id="{752684E8-841F-414C-92C0-6E2CF31C3DA7}"/>
               </a:ext>
             </a:extLst>
           </p:cNvPr>
@@ -3935,7 +3935,7 @@
           <p:cNvPr id="24" name="Imagem 23" descr="Forma&#10;&#10;Descrição gerada automaticamente">
             <a:extLst>
               <a:ext uri="{FF2B5EF4-FFF2-40B4-BE49-F238E27FC236}">
-                <a16:creationId xmlns:a16="http://schemas.microsoft.com/office/drawing/2014/main" id="{5C7DD506-50B1-460C-BA22-4C94A74330EA}"/>
+                <a16:creationId xmlns:a16="http://schemas.microsoft.com/office/drawing/2014/main" xmlns="" id="{5C7DD506-50B1-460C-BA22-4C94A74330EA}"/>
               </a:ext>
             </a:extLst>
           </p:cNvPr>
@@ -3970,7 +3970,7 @@
           <p:cNvPr id="16" name="Imagem 15">
             <a:extLst>
               <a:ext uri="{FF2B5EF4-FFF2-40B4-BE49-F238E27FC236}">
-                <a16:creationId xmlns:a16="http://schemas.microsoft.com/office/drawing/2014/main" id="{F080E30E-48F9-44E0-BB36-75BC3D0889E5}"/>
+                <a16:creationId xmlns:a16="http://schemas.microsoft.com/office/drawing/2014/main" xmlns="" id="{F080E30E-48F9-44E0-BB36-75BC3D0889E5}"/>
               </a:ext>
             </a:extLst>
           </p:cNvPr>
@@ -3993,7 +3993,7 @@
         </p:blipFill>
         <p:spPr>
           <a:xfrm>
-            <a:off x="1006679" y="4576595"/>
+            <a:off x="977989" y="4731748"/>
             <a:ext cx="2437376" cy="1925029"/>
           </a:xfrm>
           <a:prstGeom prst="rect">
@@ -4006,7 +4006,7 @@
           <p:cNvPr id="68" name="Conector de Seta Reta 67">
             <a:extLst>
               <a:ext uri="{FF2B5EF4-FFF2-40B4-BE49-F238E27FC236}">
-                <a16:creationId xmlns:a16="http://schemas.microsoft.com/office/drawing/2014/main" id="{8C10B952-8765-4D4B-A28B-A6F214A05649}"/>
+                <a16:creationId xmlns:a16="http://schemas.microsoft.com/office/drawing/2014/main" xmlns="" id="{8C10B952-8765-4D4B-A28B-A6F214A05649}"/>
               </a:ext>
             </a:extLst>
           </p:cNvPr>
@@ -4053,7 +4053,7 @@
           <p:cNvPr id="72" name="Conector de Seta Reta 71">
             <a:extLst>
               <a:ext uri="{FF2B5EF4-FFF2-40B4-BE49-F238E27FC236}">
-                <a16:creationId xmlns:a16="http://schemas.microsoft.com/office/drawing/2014/main" id="{E39A84D5-791D-428F-8A43-562265A600C5}"/>
+                <a16:creationId xmlns:a16="http://schemas.microsoft.com/office/drawing/2014/main" xmlns="" id="{E39A84D5-791D-428F-8A43-562265A600C5}"/>
               </a:ext>
             </a:extLst>
           </p:cNvPr>
@@ -4100,7 +4100,7 @@
           <p:cNvPr id="91" name="Imagem 90">
             <a:extLst>
               <a:ext uri="{FF2B5EF4-FFF2-40B4-BE49-F238E27FC236}">
-                <a16:creationId xmlns:a16="http://schemas.microsoft.com/office/drawing/2014/main" id="{413FCE52-9E42-42C4-8D09-B45934FDA216}"/>
+                <a16:creationId xmlns:a16="http://schemas.microsoft.com/office/drawing/2014/main" xmlns="" id="{413FCE52-9E42-42C4-8D09-B45934FDA216}"/>
               </a:ext>
             </a:extLst>
           </p:cNvPr>
@@ -4136,7 +4136,7 @@
           <p:cNvPr id="93" name="Imagem 92">
             <a:extLst>
               <a:ext uri="{FF2B5EF4-FFF2-40B4-BE49-F238E27FC236}">
-                <a16:creationId xmlns:a16="http://schemas.microsoft.com/office/drawing/2014/main" id="{63E9CCF7-0455-42A7-B3B4-AEC2412E858C}"/>
+                <a16:creationId xmlns:a16="http://schemas.microsoft.com/office/drawing/2014/main" xmlns="" id="{63E9CCF7-0455-42A7-B3B4-AEC2412E858C}"/>
               </a:ext>
             </a:extLst>
           </p:cNvPr>
@@ -4172,7 +4172,7 @@
           <p:cNvPr id="94" name="Imagem 93">
             <a:extLst>
               <a:ext uri="{FF2B5EF4-FFF2-40B4-BE49-F238E27FC236}">
-                <a16:creationId xmlns:a16="http://schemas.microsoft.com/office/drawing/2014/main" id="{B79F862E-D809-4A78-AAE4-6CF63FB26508}"/>
+                <a16:creationId xmlns:a16="http://schemas.microsoft.com/office/drawing/2014/main" xmlns="" id="{B79F862E-D809-4A78-AAE4-6CF63FB26508}"/>
               </a:ext>
             </a:extLst>
           </p:cNvPr>
@@ -4195,7 +4195,7 @@
         </p:blipFill>
         <p:spPr>
           <a:xfrm>
-            <a:off x="1546191" y="4033785"/>
+            <a:off x="1305529" y="4240434"/>
             <a:ext cx="510968" cy="510968"/>
           </a:xfrm>
           <a:prstGeom prst="rect">
@@ -4208,7 +4208,7 @@
           <p:cNvPr id="97" name="Imagem 96">
             <a:extLst>
               <a:ext uri="{FF2B5EF4-FFF2-40B4-BE49-F238E27FC236}">
-                <a16:creationId xmlns:a16="http://schemas.microsoft.com/office/drawing/2014/main" id="{1E1D9264-4478-4D21-90D1-CC0A88EEBE02}"/>
+                <a16:creationId xmlns:a16="http://schemas.microsoft.com/office/drawing/2014/main" xmlns="" id="{1E1D9264-4478-4D21-90D1-CC0A88EEBE02}"/>
               </a:ext>
             </a:extLst>
           </p:cNvPr>
@@ -4244,7 +4244,7 @@
           <p:cNvPr id="110" name="Imagem 109">
             <a:extLst>
               <a:ext uri="{FF2B5EF4-FFF2-40B4-BE49-F238E27FC236}">
-                <a16:creationId xmlns:a16="http://schemas.microsoft.com/office/drawing/2014/main" id="{48EAE7C9-853C-4C62-BE4F-77E1FF7A2142}"/>
+                <a16:creationId xmlns:a16="http://schemas.microsoft.com/office/drawing/2014/main" xmlns="" id="{48EAE7C9-853C-4C62-BE4F-77E1FF7A2142}"/>
               </a:ext>
             </a:extLst>
           </p:cNvPr>
@@ -4280,7 +4280,7 @@
           <p:cNvPr id="113" name="Imagem 112">
             <a:extLst>
               <a:ext uri="{FF2B5EF4-FFF2-40B4-BE49-F238E27FC236}">
-                <a16:creationId xmlns:a16="http://schemas.microsoft.com/office/drawing/2014/main" id="{3A0A7C0D-5AAE-4386-8F96-FE545AB5180F}"/>
+                <a16:creationId xmlns:a16="http://schemas.microsoft.com/office/drawing/2014/main" xmlns="" id="{3A0A7C0D-5AAE-4386-8F96-FE545AB5180F}"/>
               </a:ext>
             </a:extLst>
           </p:cNvPr>
@@ -4316,7 +4316,7 @@
           <p:cNvPr id="115" name="Imagem 114">
             <a:extLst>
               <a:ext uri="{FF2B5EF4-FFF2-40B4-BE49-F238E27FC236}">
-                <a16:creationId xmlns:a16="http://schemas.microsoft.com/office/drawing/2014/main" id="{3C1B681C-ED12-41C5-AD26-8B6853414F1D}"/>
+                <a16:creationId xmlns:a16="http://schemas.microsoft.com/office/drawing/2014/main" xmlns="" id="{3C1B681C-ED12-41C5-AD26-8B6853414F1D}"/>
               </a:ext>
             </a:extLst>
           </p:cNvPr>
@@ -4352,7 +4352,7 @@
           <p:cNvPr id="2" name="Retângulo 1">
             <a:extLst>
               <a:ext uri="{FF2B5EF4-FFF2-40B4-BE49-F238E27FC236}">
-                <a16:creationId xmlns:a16="http://schemas.microsoft.com/office/drawing/2014/main" id="{969E54A0-B7B5-4147-AB27-DA0CC75F47BD}"/>
+                <a16:creationId xmlns:a16="http://schemas.microsoft.com/office/drawing/2014/main" xmlns="" id="{969E54A0-B7B5-4147-AB27-DA0CC75F47BD}"/>
               </a:ext>
             </a:extLst>
           </p:cNvPr>
@@ -4361,7 +4361,7 @@
         </p:nvSpPr>
         <p:spPr>
           <a:xfrm>
-            <a:off x="81988" y="3961603"/>
+            <a:off x="120981" y="3961602"/>
             <a:ext cx="3958255" cy="2799923"/>
           </a:xfrm>
           <a:prstGeom prst="rect">
@@ -4404,7 +4404,7 @@
           <p:cNvPr id="3" name="CaixaDeTexto 2">
             <a:extLst>
               <a:ext uri="{FF2B5EF4-FFF2-40B4-BE49-F238E27FC236}">
-                <a16:creationId xmlns:a16="http://schemas.microsoft.com/office/drawing/2014/main" id="{F3DB1EB6-7EDD-4F76-AC41-93A77350D0DB}"/>
+                <a16:creationId xmlns:a16="http://schemas.microsoft.com/office/drawing/2014/main" xmlns="" id="{F3DB1EB6-7EDD-4F76-AC41-93A77350D0DB}"/>
               </a:ext>
             </a:extLst>
           </p:cNvPr>
@@ -4439,7 +4439,7 @@
           <p:cNvPr id="5" name="CaixaDeTexto 4">
             <a:extLst>
               <a:ext uri="{FF2B5EF4-FFF2-40B4-BE49-F238E27FC236}">
-                <a16:creationId xmlns:a16="http://schemas.microsoft.com/office/drawing/2014/main" id="{00324186-5835-453F-9CA7-D8BA2FE4FDB1}"/>
+                <a16:creationId xmlns:a16="http://schemas.microsoft.com/office/drawing/2014/main" xmlns="" id="{00324186-5835-453F-9CA7-D8BA2FE4FDB1}"/>
               </a:ext>
             </a:extLst>
           </p:cNvPr>
@@ -4478,7 +4478,7 @@
           <p:cNvPr id="8" name="CaixaDeTexto 7">
             <a:extLst>
               <a:ext uri="{FF2B5EF4-FFF2-40B4-BE49-F238E27FC236}">
-                <a16:creationId xmlns:a16="http://schemas.microsoft.com/office/drawing/2014/main" id="{C6B4F186-1182-4828-8066-2E561878460C}"/>
+                <a16:creationId xmlns:a16="http://schemas.microsoft.com/office/drawing/2014/main" xmlns="" id="{C6B4F186-1182-4828-8066-2E561878460C}"/>
               </a:ext>
             </a:extLst>
           </p:cNvPr>
@@ -4513,7 +4513,7 @@
           <p:cNvPr id="14" name="Imagem 13" descr="Logotipo, nome da empresa&#10;&#10;Descrição gerada automaticamente">
             <a:extLst>
               <a:ext uri="{FF2B5EF4-FFF2-40B4-BE49-F238E27FC236}">
-                <a16:creationId xmlns:a16="http://schemas.microsoft.com/office/drawing/2014/main" id="{C131E45E-AAA8-4092-97F7-314E8411F05B}"/>
+                <a16:creationId xmlns:a16="http://schemas.microsoft.com/office/drawing/2014/main" xmlns="" id="{C131E45E-AAA8-4092-97F7-314E8411F05B}"/>
               </a:ext>
             </a:extLst>
           </p:cNvPr>
@@ -4549,7 +4549,7 @@
           <p:cNvPr id="6" name="Picture 4">
             <a:extLst>
               <a:ext uri="{FF2B5EF4-FFF2-40B4-BE49-F238E27FC236}">
-                <a16:creationId xmlns:a16="http://schemas.microsoft.com/office/drawing/2014/main" id="{459310AC-F268-4178-A4E9-B2C3E8E97734}"/>
+                <a16:creationId xmlns:a16="http://schemas.microsoft.com/office/drawing/2014/main" xmlns="" id="{459310AC-F268-4178-A4E9-B2C3E8E97734}"/>
               </a:ext>
             </a:extLst>
           </p:cNvPr>
@@ -4596,7 +4596,7 @@
           <p:cNvPr id="36" name="CaixaDeTexto 35">
             <a:extLst>
               <a:ext uri="{FF2B5EF4-FFF2-40B4-BE49-F238E27FC236}">
-                <a16:creationId xmlns:a16="http://schemas.microsoft.com/office/drawing/2014/main" id="{2AD70534-8DF3-47A4-8849-845029A2F70F}"/>
+                <a16:creationId xmlns:a16="http://schemas.microsoft.com/office/drawing/2014/main" xmlns="" id="{2AD70534-8DF3-47A4-8849-845029A2F70F}"/>
               </a:ext>
             </a:extLst>
           </p:cNvPr>
@@ -4636,7 +4636,7 @@
           <p:cNvPr id="41" name="CaixaDeTexto 40">
             <a:extLst>
               <a:ext uri="{FF2B5EF4-FFF2-40B4-BE49-F238E27FC236}">
-                <a16:creationId xmlns:a16="http://schemas.microsoft.com/office/drawing/2014/main" id="{52D7509F-0E02-4527-A270-E5C288172F37}"/>
+                <a16:creationId xmlns:a16="http://schemas.microsoft.com/office/drawing/2014/main" xmlns="" id="{52D7509F-0E02-4527-A270-E5C288172F37}"/>
               </a:ext>
             </a:extLst>
           </p:cNvPr>
@@ -4671,94 +4671,12 @@
           </a:p>
         </p:txBody>
       </p:sp>
-      <p:pic>
-        <p:nvPicPr>
-          <p:cNvPr id="53" name="Imagem 52" descr="Imagem em preto e branco&#10;&#10;Descrição gerada automaticamente">
-            <a:extLst>
-              <a:ext uri="{FF2B5EF4-FFF2-40B4-BE49-F238E27FC236}">
-                <a16:creationId xmlns:a16="http://schemas.microsoft.com/office/drawing/2014/main" id="{F88B7289-3322-46D5-AD13-B255012820B5}"/>
-              </a:ext>
-            </a:extLst>
-          </p:cNvPr>
-          <p:cNvPicPr>
-            <a:picLocks noChangeAspect="1"/>
-          </p:cNvPicPr>
-          <p:nvPr/>
-        </p:nvPicPr>
-        <p:blipFill>
-          <a:blip r:embed="rId11" cstate="print">
-            <a:duotone>
-              <a:schemeClr val="accent5">
-                <a:shade val="45000"/>
-                <a:satMod val="135000"/>
-              </a:schemeClr>
-              <a:prstClr val="white"/>
-            </a:duotone>
-            <a:extLst>
-              <a:ext uri="{28A0092B-C50C-407E-A947-70E740481C1C}">
-                <a14:useLocalDpi xmlns:a14="http://schemas.microsoft.com/office/drawing/2010/main" val="0"/>
-              </a:ext>
-            </a:extLst>
-          </a:blip>
-          <a:stretch>
-            <a:fillRect/>
-          </a:stretch>
-        </p:blipFill>
-        <p:spPr>
-          <a:xfrm>
-            <a:off x="4935740" y="2227912"/>
-            <a:ext cx="644809" cy="644809"/>
-          </a:xfrm>
-          <a:prstGeom prst="rect">
-            <a:avLst/>
-          </a:prstGeom>
-        </p:spPr>
-      </p:pic>
-      <p:sp>
-        <p:nvSpPr>
-          <p:cNvPr id="55" name="CaixaDeTexto 54">
-            <a:extLst>
-              <a:ext uri="{FF2B5EF4-FFF2-40B4-BE49-F238E27FC236}">
-                <a16:creationId xmlns:a16="http://schemas.microsoft.com/office/drawing/2014/main" id="{1994B9A6-3548-496B-AB95-90CBE7C708B1}"/>
-              </a:ext>
-            </a:extLst>
-          </p:cNvPr>
-          <p:cNvSpPr txBox="1"/>
-          <p:nvPr/>
-        </p:nvSpPr>
-        <p:spPr>
-          <a:xfrm>
-            <a:off x="4983682" y="2749247"/>
-            <a:ext cx="644809" cy="369332"/>
-          </a:xfrm>
-          <a:prstGeom prst="rect">
-            <a:avLst/>
-          </a:prstGeom>
-          <a:noFill/>
-        </p:spPr>
-        <p:txBody>
-          <a:bodyPr wrap="square" rtlCol="0">
-            <a:spAutoFit/>
-          </a:bodyPr>
-          <a:lstStyle/>
-          <a:p>
-            <a:r>
-              <a:rPr lang="pt-BR" dirty="0">
-                <a:solidFill>
-                  <a:schemeClr val="accent1"/>
-                </a:solidFill>
-              </a:rPr>
-              <a:t>SQL</a:t>
-            </a:r>
-          </a:p>
-        </p:txBody>
-      </p:sp>
       <p:cxnSp>
         <p:nvCxnSpPr>
           <p:cNvPr id="57" name="Conector de Seta Reta 56">
             <a:extLst>
               <a:ext uri="{FF2B5EF4-FFF2-40B4-BE49-F238E27FC236}">
-                <a16:creationId xmlns:a16="http://schemas.microsoft.com/office/drawing/2014/main" id="{688067FF-CBEE-4F28-88D7-F6AEC67ED517}"/>
+                <a16:creationId xmlns:a16="http://schemas.microsoft.com/office/drawing/2014/main" xmlns="" id="{688067FF-CBEE-4F28-88D7-F6AEC67ED517}"/>
               </a:ext>
             </a:extLst>
           </p:cNvPr>
@@ -4799,7 +4717,7 @@
           <p:cNvPr id="9" name="Retângulo 8">
             <a:extLst>
               <a:ext uri="{FF2B5EF4-FFF2-40B4-BE49-F238E27FC236}">
-                <a16:creationId xmlns:a16="http://schemas.microsoft.com/office/drawing/2014/main" id="{A2895AD6-3034-4EE2-8F53-A1BC76FBF2D0}"/>
+                <a16:creationId xmlns:a16="http://schemas.microsoft.com/office/drawing/2014/main" xmlns="" id="{A2895AD6-3034-4EE2-8F53-A1BC76FBF2D0}"/>
               </a:ext>
             </a:extLst>
           </p:cNvPr>
@@ -4851,7 +4769,7 @@
           <p:cNvPr id="7" name="Picture 10" descr="Amazon Web Services - Wikipedia">
             <a:extLst>
               <a:ext uri="{FF2B5EF4-FFF2-40B4-BE49-F238E27FC236}">
-                <a16:creationId xmlns:a16="http://schemas.microsoft.com/office/drawing/2014/main" id="{4484FA0D-09D2-41AD-9A5C-AA5C5431D5FE}"/>
+                <a16:creationId xmlns:a16="http://schemas.microsoft.com/office/drawing/2014/main" xmlns="" id="{4484FA0D-09D2-41AD-9A5C-AA5C5431D5FE}"/>
               </a:ext>
             </a:extLst>
           </p:cNvPr>
@@ -4861,7 +4779,7 @@
           <p:nvPr/>
         </p:nvPicPr>
         <p:blipFill>
-          <a:blip r:embed="rId12" cstate="print">
+          <a:blip r:embed="rId11" cstate="print">
             <a:extLst>
               <a:ext uri="{28A0092B-C50C-407E-A947-70E740481C1C}">
                 <a14:useLocalDpi xmlns:a14="http://schemas.microsoft.com/office/drawing/2010/main" val="0"/>
@@ -4898,7 +4816,7 @@
           <p:cNvPr id="17" name="CaixaDeTexto 16">
             <a:extLst>
               <a:ext uri="{FF2B5EF4-FFF2-40B4-BE49-F238E27FC236}">
-                <a16:creationId xmlns:a16="http://schemas.microsoft.com/office/drawing/2014/main" id="{26EAF8F4-3BDF-487E-A712-9B376B133FBC}"/>
+                <a16:creationId xmlns:a16="http://schemas.microsoft.com/office/drawing/2014/main" xmlns="" id="{26EAF8F4-3BDF-487E-A712-9B376B133FBC}"/>
               </a:ext>
             </a:extLst>
           </p:cNvPr>
@@ -4937,13 +4855,13 @@
           <p:nvPr/>
         </p:nvPicPr>
         <p:blipFill rotWithShape="1">
-          <a:blip r:embed="rId13"/>
+          <a:blip r:embed="rId12"/>
           <a:srcRect l="9121" t="320" r="8400" b="-320"/>
           <a:stretch/>
         </p:blipFill>
         <p:spPr>
           <a:xfrm>
-            <a:off x="4950262" y="1810437"/>
+            <a:off x="4926098" y="1817287"/>
             <a:ext cx="702832" cy="360454"/>
           </a:xfrm>
           <a:prstGeom prst="rect">
@@ -4960,7 +4878,7 @@
           <p:nvPr/>
         </p:nvPicPr>
         <p:blipFill>
-          <a:blip r:embed="rId14"/>
+          <a:blip r:embed="rId13"/>
           <a:stretch>
             <a:fillRect/>
           </a:stretch>
@@ -5023,7 +4941,7 @@
           <p:nvPr/>
         </p:nvPicPr>
         <p:blipFill>
-          <a:blip r:embed="rId15"/>
+          <a:blip r:embed="rId14"/>
           <a:stretch>
             <a:fillRect/>
           </a:stretch>
@@ -5047,7 +4965,7 @@
           <p:nvPr/>
         </p:nvPicPr>
         <p:blipFill rotWithShape="1">
-          <a:blip r:embed="rId16"/>
+          <a:blip r:embed="rId15"/>
           <a:srcRect l="35681" t="14554" r="34566" b="10328"/>
           <a:stretch/>
         </p:blipFill>
@@ -5070,7 +4988,7 @@
           <p:nvPr/>
         </p:nvPicPr>
         <p:blipFill>
-          <a:blip r:embed="rId17" cstate="print">
+          <a:blip r:embed="rId16" cstate="print">
             <a:extLst>
               <a:ext uri="{28A0092B-C50C-407E-A947-70E740481C1C}">
                 <a14:useLocalDpi xmlns:a14="http://schemas.microsoft.com/office/drawing/2010/main" val="0"/>
@@ -5107,7 +5025,7 @@
           <p:cNvPr id="21" name="Agrupar 20">
             <a:extLst>
               <a:ext uri="{FF2B5EF4-FFF2-40B4-BE49-F238E27FC236}">
-                <a16:creationId xmlns:a16="http://schemas.microsoft.com/office/drawing/2014/main" id="{1550788F-EA80-4E29-BE8A-2E903471849F}"/>
+                <a16:creationId xmlns:a16="http://schemas.microsoft.com/office/drawing/2014/main" xmlns="" id="{1550788F-EA80-4E29-BE8A-2E903471849F}"/>
               </a:ext>
             </a:extLst>
           </p:cNvPr>
@@ -5127,7 +5045,7 @@
             <p:cNvPr id="1026" name="Picture 2" descr="Boas-vindas ao seu novo QG | Slack">
               <a:extLst>
                 <a:ext uri="{FF2B5EF4-FFF2-40B4-BE49-F238E27FC236}">
-                  <a16:creationId xmlns:a16="http://schemas.microsoft.com/office/drawing/2014/main" id="{D2B9D5B0-D199-4A89-A00B-86E4BE07F467}"/>
+                  <a16:creationId xmlns:a16="http://schemas.microsoft.com/office/drawing/2014/main" xmlns="" id="{D2B9D5B0-D199-4A89-A00B-86E4BE07F467}"/>
                 </a:ext>
               </a:extLst>
             </p:cNvPr>
@@ -5137,7 +5055,7 @@
             <p:nvPr/>
           </p:nvPicPr>
           <p:blipFill>
-            <a:blip r:embed="rId18">
+            <a:blip r:embed="rId17" cstate="print">
               <a:extLst>
                 <a:ext uri="{28A0092B-C50C-407E-A947-70E740481C1C}">
                   <a14:useLocalDpi xmlns:a14="http://schemas.microsoft.com/office/drawing/2010/main" val="0"/>
@@ -5174,7 +5092,7 @@
             <p:cNvPr id="4" name="CaixaDeTexto 3">
               <a:extLst>
                 <a:ext uri="{FF2B5EF4-FFF2-40B4-BE49-F238E27FC236}">
-                  <a16:creationId xmlns:a16="http://schemas.microsoft.com/office/drawing/2014/main" id="{D03018DC-DEBD-439B-B33A-3FD65D7934A5}"/>
+                  <a16:creationId xmlns:a16="http://schemas.microsoft.com/office/drawing/2014/main" xmlns="" id="{D03018DC-DEBD-439B-B33A-3FD65D7934A5}"/>
                 </a:ext>
               </a:extLst>
             </p:cNvPr>
@@ -5210,7 +5128,7 @@
           <p:cNvPr id="23" name="Imagem 22" descr="Logotipo, nome da empresa&#10;&#10;Descrição gerada automaticamente">
             <a:extLst>
               <a:ext uri="{FF2B5EF4-FFF2-40B4-BE49-F238E27FC236}">
-                <a16:creationId xmlns:a16="http://schemas.microsoft.com/office/drawing/2014/main" id="{430375AE-F10C-4E7F-AC5E-E4A9143A7746}"/>
+                <a16:creationId xmlns:a16="http://schemas.microsoft.com/office/drawing/2014/main" xmlns="" id="{430375AE-F10C-4E7F-AC5E-E4A9143A7746}"/>
               </a:ext>
             </a:extLst>
           </p:cNvPr>
@@ -5220,7 +5138,7 @@
           <p:nvPr/>
         </p:nvPicPr>
         <p:blipFill>
-          <a:blip r:embed="rId19">
+          <a:blip r:embed="rId18" cstate="print">
             <a:extLst>
               <a:ext uri="{28A0092B-C50C-407E-A947-70E740481C1C}">
                 <a14:useLocalDpi xmlns:a14="http://schemas.microsoft.com/office/drawing/2010/main" val="0"/>
@@ -5233,7 +5151,7 @@
         </p:blipFill>
         <p:spPr>
           <a:xfrm>
-            <a:off x="3888538" y="1606927"/>
+            <a:off x="3721256" y="1620310"/>
             <a:ext cx="1089399" cy="754409"/>
           </a:xfrm>
           <a:prstGeom prst="rect">
@@ -5246,7 +5164,7 @@
           <p:cNvPr id="50" name="Imagem 49">
             <a:extLst>
               <a:ext uri="{FF2B5EF4-FFF2-40B4-BE49-F238E27FC236}">
-                <a16:creationId xmlns:a16="http://schemas.microsoft.com/office/drawing/2014/main" id="{B7B64E3D-9B7A-45F3-806A-B186144DA1C4}"/>
+                <a16:creationId xmlns:a16="http://schemas.microsoft.com/office/drawing/2014/main" xmlns="" id="{B7B64E3D-9B7A-45F3-806A-B186144DA1C4}"/>
               </a:ext>
             </a:extLst>
           </p:cNvPr>
@@ -5256,14 +5174,14 @@
           <p:nvPr/>
         </p:nvPicPr>
         <p:blipFill>
-          <a:blip r:embed="rId14"/>
+          <a:blip r:embed="rId13"/>
           <a:stretch>
             <a:fillRect/>
           </a:stretch>
         </p:blipFill>
         <p:spPr>
           <a:xfrm>
-            <a:off x="3979952" y="2273939"/>
+            <a:off x="3996631" y="2388102"/>
             <a:ext cx="736425" cy="618481"/>
           </a:xfrm>
           <a:prstGeom prst="rect">
@@ -5276,7 +5194,7 @@
           <p:cNvPr id="52" name="Picture 2" descr="Boas-vindas ao seu novo QG | Slack">
             <a:extLst>
               <a:ext uri="{FF2B5EF4-FFF2-40B4-BE49-F238E27FC236}">
-                <a16:creationId xmlns:a16="http://schemas.microsoft.com/office/drawing/2014/main" id="{84353701-537A-485B-9AFC-F27D88E69C0E}"/>
+                <a16:creationId xmlns:a16="http://schemas.microsoft.com/office/drawing/2014/main" xmlns="" id="{84353701-537A-485B-9AFC-F27D88E69C0E}"/>
               </a:ext>
             </a:extLst>
           </p:cNvPr>
@@ -5286,7 +5204,7 @@
           <p:nvPr/>
         </p:nvPicPr>
         <p:blipFill>
-          <a:blip r:embed="rId18">
+          <a:blip r:embed="rId19" cstate="print">
             <a:extLst>
               <a:ext uri="{28A0092B-C50C-407E-A947-70E740481C1C}">
                 <a14:useLocalDpi xmlns:a14="http://schemas.microsoft.com/office/drawing/2010/main" val="0"/>
@@ -5300,7 +5218,7 @@
         </p:blipFill>
         <p:spPr bwMode="auto">
           <a:xfrm>
-            <a:off x="1503241" y="4955134"/>
+            <a:off x="1531764" y="4990659"/>
             <a:ext cx="596868" cy="547749"/>
           </a:xfrm>
           <a:prstGeom prst="rect">
@@ -5323,7 +5241,7 @@
           <p:cNvPr id="54" name="Retângulo 53">
             <a:extLst>
               <a:ext uri="{FF2B5EF4-FFF2-40B4-BE49-F238E27FC236}">
-                <a16:creationId xmlns:a16="http://schemas.microsoft.com/office/drawing/2014/main" id="{F6769D6D-4C92-4616-B7A1-9AA9E96B528E}"/>
+                <a16:creationId xmlns:a16="http://schemas.microsoft.com/office/drawing/2014/main" xmlns="" id="{F6769D6D-4C92-4616-B7A1-9AA9E96B528E}"/>
               </a:ext>
             </a:extLst>
           </p:cNvPr>
@@ -5375,7 +5293,7 @@
           <p:cNvPr id="28" name="Imagem 27" descr="Imagem em preto e branco&#10;&#10;Descrição gerada automaticamente">
             <a:extLst>
               <a:ext uri="{FF2B5EF4-FFF2-40B4-BE49-F238E27FC236}">
-                <a16:creationId xmlns:a16="http://schemas.microsoft.com/office/drawing/2014/main" id="{2CC60A5A-32BC-4872-BEF8-F867013BB652}"/>
+                <a16:creationId xmlns:a16="http://schemas.microsoft.com/office/drawing/2014/main" xmlns="" id="{2CC60A5A-32BC-4872-BEF8-F867013BB652}"/>
               </a:ext>
             </a:extLst>
           </p:cNvPr>
@@ -5400,6 +5318,89 @@
           <a:xfrm>
             <a:off x="10760575" y="5320303"/>
             <a:ext cx="933450" cy="981075"/>
+          </a:xfrm>
+          <a:prstGeom prst="rect">
+            <a:avLst/>
+          </a:prstGeom>
+        </p:spPr>
+      </p:pic>
+      <p:pic>
+        <p:nvPicPr>
+          <p:cNvPr id="12" name="Imagem 11"/>
+          <p:cNvPicPr>
+            <a:picLocks noChangeAspect="1"/>
+          </p:cNvPicPr>
+          <p:nvPr/>
+        </p:nvPicPr>
+        <p:blipFill>
+          <a:blip r:embed="rId21"/>
+          <a:stretch>
+            <a:fillRect/>
+          </a:stretch>
+        </p:blipFill>
+        <p:spPr>
+          <a:xfrm>
+            <a:off x="5226824" y="549698"/>
+            <a:ext cx="1689404" cy="950290"/>
+          </a:xfrm>
+          <a:prstGeom prst="rect">
+            <a:avLst/>
+          </a:prstGeom>
+        </p:spPr>
+      </p:pic>
+      <p:pic>
+        <p:nvPicPr>
+          <p:cNvPr id="42" name="Imagem 41" descr="Forma&#10;&#10;Descrição gerada automaticamente">
+            <a:extLst>
+              <a:ext uri="{FF2B5EF4-FFF2-40B4-BE49-F238E27FC236}">
+                <a16:creationId xmlns:a16="http://schemas.microsoft.com/office/drawing/2014/main" xmlns="" id="{5C7DD506-50B1-460C-BA22-4C94A74330EA}"/>
+              </a:ext>
+            </a:extLst>
+          </p:cNvPr>
+          <p:cNvPicPr>
+            <a:picLocks noChangeAspect="1"/>
+          </p:cNvPicPr>
+          <p:nvPr/>
+        </p:nvPicPr>
+        <p:blipFill rotWithShape="1">
+          <a:blip r:embed="rId2">
+            <a:extLst>
+              <a:ext uri="{28A0092B-C50C-407E-A947-70E740481C1C}">
+                <a14:useLocalDpi xmlns:a14="http://schemas.microsoft.com/office/drawing/2010/main" val="0"/>
+              </a:ext>
+            </a:extLst>
+          </a:blip>
+          <a:srcRect l="1522" t="2780" r="-356" b="3946"/>
+          <a:stretch/>
+        </p:blipFill>
+        <p:spPr>
+          <a:xfrm>
+            <a:off x="1824311" y="3368459"/>
+            <a:ext cx="1986501" cy="1285157"/>
+          </a:xfrm>
+          <a:prstGeom prst="rect">
+            <a:avLst/>
+          </a:prstGeom>
+        </p:spPr>
+      </p:pic>
+      <p:pic>
+        <p:nvPicPr>
+          <p:cNvPr id="18" name="Imagem 17"/>
+          <p:cNvPicPr>
+            <a:picLocks noChangeAspect="1"/>
+          </p:cNvPicPr>
+          <p:nvPr/>
+        </p:nvPicPr>
+        <p:blipFill>
+          <a:blip r:embed="rId22"/>
+          <a:stretch>
+            <a:fillRect/>
+          </a:stretch>
+        </p:blipFill>
+        <p:spPr>
+          <a:xfrm>
+            <a:off x="2550049" y="4053413"/>
+            <a:ext cx="922572" cy="482118"/>
           </a:xfrm>
           <a:prstGeom prst="rect">
             <a:avLst/>
@@ -5715,21 +5716,6 @@
 </file>
 
 <file path=customXml/item1.xml><?xml version="1.0" encoding="utf-8"?>
-<p:properties xmlns:p="http://schemas.microsoft.com/office/2006/metadata/properties" xmlns:xsi="http://www.w3.org/2001/XMLSchema-instance" xmlns:pc="http://schemas.microsoft.com/office/infopath/2007/PartnerControls">
-  <documentManagement/>
-</p:properties>
-</file>
-
-<file path=customXml/item2.xml><?xml version="1.0" encoding="utf-8"?>
-<?mso-contentType ?>
-<FormTemplates xmlns="http://schemas.microsoft.com/sharepoint/v3/contenttype/forms">
-  <Display>DocumentLibraryForm</Display>
-  <Edit>DocumentLibraryForm</Edit>
-  <New>DocumentLibraryForm</New>
-</FormTemplates>
-</file>
-
-<file path=customXml/item3.xml><?xml version="1.0" encoding="utf-8"?>
 <ct:contentTypeSchema xmlns:ct="http://schemas.microsoft.com/office/2006/metadata/contentType" xmlns:ma="http://schemas.microsoft.com/office/2006/metadata/properties/metaAttributes" ct:_="" ma:_="" ma:contentTypeName="Document" ma:contentTypeID="0x010100B98A8EE2A9F7A14F94CEDBF06729C915" ma:contentTypeVersion="2" ma:contentTypeDescription="Create a new document." ma:contentTypeScope="" ma:versionID="54211dd7b80d0a5e350bd2ce1fda18e0">
   <xsd:schema xmlns:xsd="http://www.w3.org/2001/XMLSchema" xmlns:xs="http://www.w3.org/2001/XMLSchema" xmlns:p="http://schemas.microsoft.com/office/2006/metadata/properties" xmlns:ns3="4d0c820a-888c-467f-9883-f2eb09285986" targetNamespace="http://schemas.microsoft.com/office/2006/metadata/properties" ma:root="true" ma:fieldsID="215748a485b3af4a87eff8123adb26da" ns3:_="">
     <xsd:import namespace="4d0c820a-888c-467f-9883-f2eb09285986"/>
@@ -5861,31 +5847,22 @@
 </ct:contentTypeSchema>
 </file>
 
-<file path=customXml/itemProps1.xml><?xml version="1.0" encoding="utf-8"?>
-<ds:datastoreItem xmlns:ds="http://schemas.openxmlformats.org/officeDocument/2006/customXml" ds:itemID="{B1403ECD-64BE-4472-A72B-8AE2B2D302D4}">
-  <ds:schemaRefs>
-    <ds:schemaRef ds:uri="http://schemas.microsoft.com/office/2006/documentManagement/types"/>
-    <ds:schemaRef ds:uri="http://schemas.microsoft.com/office/infopath/2007/PartnerControls"/>
-    <ds:schemaRef ds:uri="http://www.w3.org/XML/1998/namespace"/>
-    <ds:schemaRef ds:uri="4d0c820a-888c-467f-9883-f2eb09285986"/>
-    <ds:schemaRef ds:uri="http://purl.org/dc/terms/"/>
-    <ds:schemaRef ds:uri="http://purl.org/dc/dcmitype/"/>
-    <ds:schemaRef ds:uri="http://purl.org/dc/elements/1.1/"/>
-    <ds:schemaRef ds:uri="http://schemas.openxmlformats.org/package/2006/metadata/core-properties"/>
-    <ds:schemaRef ds:uri="http://schemas.microsoft.com/office/2006/metadata/properties"/>
-  </ds:schemaRefs>
-</ds:datastoreItem>
+<file path=customXml/item2.xml><?xml version="1.0" encoding="utf-8"?>
+<?mso-contentType ?>
+<FormTemplates xmlns="http://schemas.microsoft.com/sharepoint/v3/contenttype/forms">
+  <Display>DocumentLibraryForm</Display>
+  <Edit>DocumentLibraryForm</Edit>
+  <New>DocumentLibraryForm</New>
+</FormTemplates>
 </file>
 
-<file path=customXml/itemProps2.xml><?xml version="1.0" encoding="utf-8"?>
-<ds:datastoreItem xmlns:ds="http://schemas.openxmlformats.org/officeDocument/2006/customXml" ds:itemID="{C361E357-1858-46EE-ADFA-698EE4D9C360}">
-  <ds:schemaRefs>
-    <ds:schemaRef ds:uri="http://schemas.microsoft.com/sharepoint/v3/contenttype/forms"/>
-  </ds:schemaRefs>
-</ds:datastoreItem>
+<file path=customXml/item3.xml><?xml version="1.0" encoding="utf-8"?>
+<p:properties xmlns:p="http://schemas.microsoft.com/office/2006/metadata/properties" xmlns:xsi="http://www.w3.org/2001/XMLSchema-instance" xmlns:pc="http://schemas.microsoft.com/office/infopath/2007/PartnerControls">
+  <documentManagement/>
+</p:properties>
 </file>
 
-<file path=customXml/itemProps3.xml><?xml version="1.0" encoding="utf-8"?>
+<file path=customXml/itemProps1.xml><?xml version="1.0" encoding="utf-8"?>
 <ds:datastoreItem xmlns:ds="http://schemas.openxmlformats.org/officeDocument/2006/customXml" ds:itemID="{94021B74-C88A-417E-AEFD-9E5858425111}">
   <ds:schemaRefs>
     <ds:schemaRef ds:uri="http://schemas.microsoft.com/office/2006/metadata/contentType"/>
@@ -5901,4 +5878,28 @@
     <ds:schemaRef ds:uri="http://schemas.microsoft.com/internal/obd"/>
   </ds:schemaRefs>
 </ds:datastoreItem>
+</file>
+
+<file path=customXml/itemProps2.xml><?xml version="1.0" encoding="utf-8"?>
+<ds:datastoreItem xmlns:ds="http://schemas.openxmlformats.org/officeDocument/2006/customXml" ds:itemID="{C361E357-1858-46EE-ADFA-698EE4D9C360}">
+  <ds:schemaRefs>
+    <ds:schemaRef ds:uri="http://schemas.microsoft.com/sharepoint/v3/contenttype/forms"/>
+  </ds:schemaRefs>
+</ds:datastoreItem>
+</file>
+
+<file path=customXml/itemProps3.xml><?xml version="1.0" encoding="utf-8"?>
+<ds:datastoreItem xmlns:ds="http://schemas.openxmlformats.org/officeDocument/2006/customXml" ds:itemID="{B1403ECD-64BE-4472-A72B-8AE2B2D302D4}">
+  <ds:schemaRefs>
+    <ds:schemaRef ds:uri="http://schemas.microsoft.com/office/2006/documentManagement/types"/>
+    <ds:schemaRef ds:uri="http://schemas.microsoft.com/office/infopath/2007/PartnerControls"/>
+    <ds:schemaRef ds:uri="http://www.w3.org/XML/1998/namespace"/>
+    <ds:schemaRef ds:uri="4d0c820a-888c-467f-9883-f2eb09285986"/>
+    <ds:schemaRef ds:uri="http://purl.org/dc/terms/"/>
+    <ds:schemaRef ds:uri="http://purl.org/dc/dcmitype/"/>
+    <ds:schemaRef ds:uri="http://purl.org/dc/elements/1.1/"/>
+    <ds:schemaRef ds:uri="http://schemas.openxmlformats.org/package/2006/metadata/core-properties"/>
+    <ds:schemaRef ds:uri="http://schemas.microsoft.com/office/2006/metadata/properties"/>
+  </ds:schemaRefs>
+</ds:datastoreItem>
 </file>
</xml_diff>

<commit_message>
atualizando o LLD ;D
</commit_message>
<xml_diff>
--- a/Documentação/HLD.LLD.DIAGRAMA.pptx
+++ b/Documentação/HLD.LLD.DIAGRAMA.pptx
@@ -7,6 +7,7 @@
   <p:sldIdLst>
     <p:sldId id="263" r:id="rId5"/>
     <p:sldId id="266" r:id="rId6"/>
+    <p:sldId id="267" r:id="rId7"/>
   </p:sldIdLst>
   <p:sldSz cx="12192000" cy="6858000"/>
   <p:notesSz cx="6858000" cy="9144000"/>
@@ -135,7 +136,7 @@
           <p:cNvPr id="2" name="Título 1">
             <a:extLst>
               <a:ext uri="{FF2B5EF4-FFF2-40B4-BE49-F238E27FC236}">
-                <a16:creationId xmlns:a16="http://schemas.microsoft.com/office/drawing/2014/main" xmlns="" id="{9C9D081C-0F97-4DB2-B545-D20F5456DA1F}"/>
+                <a16:creationId xmlns:a16="http://schemas.microsoft.com/office/drawing/2014/main" id="{9C9D081C-0F97-4DB2-B545-D20F5456DA1F}"/>
               </a:ext>
             </a:extLst>
           </p:cNvPr>
@@ -172,7 +173,7 @@
           <p:cNvPr id="3" name="Subtítulo 2">
             <a:extLst>
               <a:ext uri="{FF2B5EF4-FFF2-40B4-BE49-F238E27FC236}">
-                <a16:creationId xmlns:a16="http://schemas.microsoft.com/office/drawing/2014/main" xmlns="" id="{974DF855-DB25-4F33-BF88-68991EBB3108}"/>
+                <a16:creationId xmlns:a16="http://schemas.microsoft.com/office/drawing/2014/main" id="{974DF855-DB25-4F33-BF88-68991EBB3108}"/>
               </a:ext>
             </a:extLst>
           </p:cNvPr>
@@ -242,7 +243,7 @@
           <p:cNvPr id="4" name="Espaço Reservado para Data 3">
             <a:extLst>
               <a:ext uri="{FF2B5EF4-FFF2-40B4-BE49-F238E27FC236}">
-                <a16:creationId xmlns:a16="http://schemas.microsoft.com/office/drawing/2014/main" xmlns="" id="{035A9201-BCC9-43E0-88C6-004C731F0501}"/>
+                <a16:creationId xmlns:a16="http://schemas.microsoft.com/office/drawing/2014/main" id="{035A9201-BCC9-43E0-88C6-004C731F0501}"/>
               </a:ext>
             </a:extLst>
           </p:cNvPr>
@@ -260,7 +261,7 @@
           <a:p>
             <a:fld id="{7668FBEF-3CD8-4E97-B80F-AF0D925322BB}" type="datetimeFigureOut">
               <a:rPr lang="pt-BR" smtClean="0"/>
-              <a:t>05/12/2020</a:t>
+              <a:t>06/12/2020</a:t>
             </a:fld>
             <a:endParaRPr lang="pt-BR"/>
           </a:p>
@@ -271,7 +272,7 @@
           <p:cNvPr id="5" name="Espaço Reservado para Rodapé 4">
             <a:extLst>
               <a:ext uri="{FF2B5EF4-FFF2-40B4-BE49-F238E27FC236}">
-                <a16:creationId xmlns:a16="http://schemas.microsoft.com/office/drawing/2014/main" xmlns="" id="{EE96D7DF-1FB0-4D05-AF2C-DE6460380CCA}"/>
+                <a16:creationId xmlns:a16="http://schemas.microsoft.com/office/drawing/2014/main" id="{EE96D7DF-1FB0-4D05-AF2C-DE6460380CCA}"/>
               </a:ext>
             </a:extLst>
           </p:cNvPr>
@@ -296,7 +297,7 @@
           <p:cNvPr id="6" name="Espaço Reservado para Número de Slide 5">
             <a:extLst>
               <a:ext uri="{FF2B5EF4-FFF2-40B4-BE49-F238E27FC236}">
-                <a16:creationId xmlns:a16="http://schemas.microsoft.com/office/drawing/2014/main" xmlns="" id="{6B180718-A06F-41B8-BBDE-D69E94F87DB3}"/>
+                <a16:creationId xmlns:a16="http://schemas.microsoft.com/office/drawing/2014/main" id="{6B180718-A06F-41B8-BBDE-D69E94F87DB3}"/>
               </a:ext>
             </a:extLst>
           </p:cNvPr>
@@ -355,7 +356,7 @@
           <p:cNvPr id="2" name="Título 1">
             <a:extLst>
               <a:ext uri="{FF2B5EF4-FFF2-40B4-BE49-F238E27FC236}">
-                <a16:creationId xmlns:a16="http://schemas.microsoft.com/office/drawing/2014/main" xmlns="" id="{06BC62C5-62A3-4C34-B96D-E9772382BB1F}"/>
+                <a16:creationId xmlns:a16="http://schemas.microsoft.com/office/drawing/2014/main" id="{06BC62C5-62A3-4C34-B96D-E9772382BB1F}"/>
               </a:ext>
             </a:extLst>
           </p:cNvPr>
@@ -383,7 +384,7 @@
           <p:cNvPr id="3" name="Espaço Reservado para Texto Vertical 2">
             <a:extLst>
               <a:ext uri="{FF2B5EF4-FFF2-40B4-BE49-F238E27FC236}">
-                <a16:creationId xmlns:a16="http://schemas.microsoft.com/office/drawing/2014/main" xmlns="" id="{5987ABD5-17FB-4334-8D1E-1B9FA7510FEF}"/>
+                <a16:creationId xmlns:a16="http://schemas.microsoft.com/office/drawing/2014/main" id="{5987ABD5-17FB-4334-8D1E-1B9FA7510FEF}"/>
               </a:ext>
             </a:extLst>
           </p:cNvPr>
@@ -440,7 +441,7 @@
           <p:cNvPr id="4" name="Espaço Reservado para Data 3">
             <a:extLst>
               <a:ext uri="{FF2B5EF4-FFF2-40B4-BE49-F238E27FC236}">
-                <a16:creationId xmlns:a16="http://schemas.microsoft.com/office/drawing/2014/main" xmlns="" id="{63B767CF-7B82-479D-B09D-C5ACFB4BF497}"/>
+                <a16:creationId xmlns:a16="http://schemas.microsoft.com/office/drawing/2014/main" id="{63B767CF-7B82-479D-B09D-C5ACFB4BF497}"/>
               </a:ext>
             </a:extLst>
           </p:cNvPr>
@@ -458,7 +459,7 @@
           <a:p>
             <a:fld id="{7668FBEF-3CD8-4E97-B80F-AF0D925322BB}" type="datetimeFigureOut">
               <a:rPr lang="pt-BR" smtClean="0"/>
-              <a:t>05/12/2020</a:t>
+              <a:t>06/12/2020</a:t>
             </a:fld>
             <a:endParaRPr lang="pt-BR"/>
           </a:p>
@@ -469,7 +470,7 @@
           <p:cNvPr id="5" name="Espaço Reservado para Rodapé 4">
             <a:extLst>
               <a:ext uri="{FF2B5EF4-FFF2-40B4-BE49-F238E27FC236}">
-                <a16:creationId xmlns:a16="http://schemas.microsoft.com/office/drawing/2014/main" xmlns="" id="{5813DBE3-B5D1-47C3-9D46-3B12A356FD91}"/>
+                <a16:creationId xmlns:a16="http://schemas.microsoft.com/office/drawing/2014/main" id="{5813DBE3-B5D1-47C3-9D46-3B12A356FD91}"/>
               </a:ext>
             </a:extLst>
           </p:cNvPr>
@@ -494,7 +495,7 @@
           <p:cNvPr id="6" name="Espaço Reservado para Número de Slide 5">
             <a:extLst>
               <a:ext uri="{FF2B5EF4-FFF2-40B4-BE49-F238E27FC236}">
-                <a16:creationId xmlns:a16="http://schemas.microsoft.com/office/drawing/2014/main" xmlns="" id="{FE4F2FBA-5C20-4470-AB3B-CA59CCC90F4E}"/>
+                <a16:creationId xmlns:a16="http://schemas.microsoft.com/office/drawing/2014/main" id="{FE4F2FBA-5C20-4470-AB3B-CA59CCC90F4E}"/>
               </a:ext>
             </a:extLst>
           </p:cNvPr>
@@ -553,7 +554,7 @@
           <p:cNvPr id="2" name="Título Vertical 1">
             <a:extLst>
               <a:ext uri="{FF2B5EF4-FFF2-40B4-BE49-F238E27FC236}">
-                <a16:creationId xmlns:a16="http://schemas.microsoft.com/office/drawing/2014/main" xmlns="" id="{2D0FF3FD-4633-4116-B308-3DC9016524BF}"/>
+                <a16:creationId xmlns:a16="http://schemas.microsoft.com/office/drawing/2014/main" id="{2D0FF3FD-4633-4116-B308-3DC9016524BF}"/>
               </a:ext>
             </a:extLst>
           </p:cNvPr>
@@ -586,7 +587,7 @@
           <p:cNvPr id="3" name="Espaço Reservado para Texto Vertical 2">
             <a:extLst>
               <a:ext uri="{FF2B5EF4-FFF2-40B4-BE49-F238E27FC236}">
-                <a16:creationId xmlns:a16="http://schemas.microsoft.com/office/drawing/2014/main" xmlns="" id="{1CE652A6-6F2A-46CD-9D5C-CED0D3A9FB8F}"/>
+                <a16:creationId xmlns:a16="http://schemas.microsoft.com/office/drawing/2014/main" id="{1CE652A6-6F2A-46CD-9D5C-CED0D3A9FB8F}"/>
               </a:ext>
             </a:extLst>
           </p:cNvPr>
@@ -648,7 +649,7 @@
           <p:cNvPr id="4" name="Espaço Reservado para Data 3">
             <a:extLst>
               <a:ext uri="{FF2B5EF4-FFF2-40B4-BE49-F238E27FC236}">
-                <a16:creationId xmlns:a16="http://schemas.microsoft.com/office/drawing/2014/main" xmlns="" id="{06B13398-15E8-4EBF-B29F-80855CDF7F26}"/>
+                <a16:creationId xmlns:a16="http://schemas.microsoft.com/office/drawing/2014/main" id="{06B13398-15E8-4EBF-B29F-80855CDF7F26}"/>
               </a:ext>
             </a:extLst>
           </p:cNvPr>
@@ -666,7 +667,7 @@
           <a:p>
             <a:fld id="{7668FBEF-3CD8-4E97-B80F-AF0D925322BB}" type="datetimeFigureOut">
               <a:rPr lang="pt-BR" smtClean="0"/>
-              <a:t>05/12/2020</a:t>
+              <a:t>06/12/2020</a:t>
             </a:fld>
             <a:endParaRPr lang="pt-BR"/>
           </a:p>
@@ -677,7 +678,7 @@
           <p:cNvPr id="5" name="Espaço Reservado para Rodapé 4">
             <a:extLst>
               <a:ext uri="{FF2B5EF4-FFF2-40B4-BE49-F238E27FC236}">
-                <a16:creationId xmlns:a16="http://schemas.microsoft.com/office/drawing/2014/main" xmlns="" id="{152F3931-4EA3-4DFF-AB39-EBDC4DD76D8D}"/>
+                <a16:creationId xmlns:a16="http://schemas.microsoft.com/office/drawing/2014/main" id="{152F3931-4EA3-4DFF-AB39-EBDC4DD76D8D}"/>
               </a:ext>
             </a:extLst>
           </p:cNvPr>
@@ -702,7 +703,7 @@
           <p:cNvPr id="6" name="Espaço Reservado para Número de Slide 5">
             <a:extLst>
               <a:ext uri="{FF2B5EF4-FFF2-40B4-BE49-F238E27FC236}">
-                <a16:creationId xmlns:a16="http://schemas.microsoft.com/office/drawing/2014/main" xmlns="" id="{4A6AC45E-BF7F-4F65-9509-B6CF7A6F3748}"/>
+                <a16:creationId xmlns:a16="http://schemas.microsoft.com/office/drawing/2014/main" id="{4A6AC45E-BF7F-4F65-9509-B6CF7A6F3748}"/>
               </a:ext>
             </a:extLst>
           </p:cNvPr>
@@ -761,7 +762,7 @@
           <p:cNvPr id="2" name="Título 1">
             <a:extLst>
               <a:ext uri="{FF2B5EF4-FFF2-40B4-BE49-F238E27FC236}">
-                <a16:creationId xmlns:a16="http://schemas.microsoft.com/office/drawing/2014/main" xmlns="" id="{47080BF8-F94D-4C7B-8946-1F7A9406C1FE}"/>
+                <a16:creationId xmlns:a16="http://schemas.microsoft.com/office/drawing/2014/main" id="{47080BF8-F94D-4C7B-8946-1F7A9406C1FE}"/>
               </a:ext>
             </a:extLst>
           </p:cNvPr>
@@ -789,7 +790,7 @@
           <p:cNvPr id="3" name="Espaço Reservado para Conteúdo 2">
             <a:extLst>
               <a:ext uri="{FF2B5EF4-FFF2-40B4-BE49-F238E27FC236}">
-                <a16:creationId xmlns:a16="http://schemas.microsoft.com/office/drawing/2014/main" xmlns="" id="{87C712CB-843F-4DFE-A432-2CC6CF4A63C7}"/>
+                <a16:creationId xmlns:a16="http://schemas.microsoft.com/office/drawing/2014/main" id="{87C712CB-843F-4DFE-A432-2CC6CF4A63C7}"/>
               </a:ext>
             </a:extLst>
           </p:cNvPr>
@@ -846,7 +847,7 @@
           <p:cNvPr id="4" name="Espaço Reservado para Data 3">
             <a:extLst>
               <a:ext uri="{FF2B5EF4-FFF2-40B4-BE49-F238E27FC236}">
-                <a16:creationId xmlns:a16="http://schemas.microsoft.com/office/drawing/2014/main" xmlns="" id="{C4A7E271-096C-48D0-A96E-AC1F80043C54}"/>
+                <a16:creationId xmlns:a16="http://schemas.microsoft.com/office/drawing/2014/main" id="{C4A7E271-096C-48D0-A96E-AC1F80043C54}"/>
               </a:ext>
             </a:extLst>
           </p:cNvPr>
@@ -864,7 +865,7 @@
           <a:p>
             <a:fld id="{7668FBEF-3CD8-4E97-B80F-AF0D925322BB}" type="datetimeFigureOut">
               <a:rPr lang="pt-BR" smtClean="0"/>
-              <a:t>05/12/2020</a:t>
+              <a:t>06/12/2020</a:t>
             </a:fld>
             <a:endParaRPr lang="pt-BR"/>
           </a:p>
@@ -875,7 +876,7 @@
           <p:cNvPr id="5" name="Espaço Reservado para Rodapé 4">
             <a:extLst>
               <a:ext uri="{FF2B5EF4-FFF2-40B4-BE49-F238E27FC236}">
-                <a16:creationId xmlns:a16="http://schemas.microsoft.com/office/drawing/2014/main" xmlns="" id="{1C722D53-0BCF-4AA5-ABD6-F5F92BE3953B}"/>
+                <a16:creationId xmlns:a16="http://schemas.microsoft.com/office/drawing/2014/main" id="{1C722D53-0BCF-4AA5-ABD6-F5F92BE3953B}"/>
               </a:ext>
             </a:extLst>
           </p:cNvPr>
@@ -900,7 +901,7 @@
           <p:cNvPr id="6" name="Espaço Reservado para Número de Slide 5">
             <a:extLst>
               <a:ext uri="{FF2B5EF4-FFF2-40B4-BE49-F238E27FC236}">
-                <a16:creationId xmlns:a16="http://schemas.microsoft.com/office/drawing/2014/main" xmlns="" id="{23647B80-A0C6-4C68-B4A3-C58B2FB759D3}"/>
+                <a16:creationId xmlns:a16="http://schemas.microsoft.com/office/drawing/2014/main" id="{23647B80-A0C6-4C68-B4A3-C58B2FB759D3}"/>
               </a:ext>
             </a:extLst>
           </p:cNvPr>
@@ -959,7 +960,7 @@
           <p:cNvPr id="2" name="Título 1">
             <a:extLst>
               <a:ext uri="{FF2B5EF4-FFF2-40B4-BE49-F238E27FC236}">
-                <a16:creationId xmlns:a16="http://schemas.microsoft.com/office/drawing/2014/main" xmlns="" id="{0A830081-40B9-4693-9AE9-FB6C802278E0}"/>
+                <a16:creationId xmlns:a16="http://schemas.microsoft.com/office/drawing/2014/main" id="{0A830081-40B9-4693-9AE9-FB6C802278E0}"/>
               </a:ext>
             </a:extLst>
           </p:cNvPr>
@@ -996,7 +997,7 @@
           <p:cNvPr id="3" name="Espaço Reservado para Texto 2">
             <a:extLst>
               <a:ext uri="{FF2B5EF4-FFF2-40B4-BE49-F238E27FC236}">
-                <a16:creationId xmlns:a16="http://schemas.microsoft.com/office/drawing/2014/main" xmlns="" id="{BF5D38DE-E84F-4AD6-B626-13BAC655DDF6}"/>
+                <a16:creationId xmlns:a16="http://schemas.microsoft.com/office/drawing/2014/main" id="{BF5D38DE-E84F-4AD6-B626-13BAC655DDF6}"/>
               </a:ext>
             </a:extLst>
           </p:cNvPr>
@@ -1121,7 +1122,7 @@
           <p:cNvPr id="4" name="Espaço Reservado para Data 3">
             <a:extLst>
               <a:ext uri="{FF2B5EF4-FFF2-40B4-BE49-F238E27FC236}">
-                <a16:creationId xmlns:a16="http://schemas.microsoft.com/office/drawing/2014/main" xmlns="" id="{8BBBB9CE-FE64-4440-89E0-58692A7ED8E5}"/>
+                <a16:creationId xmlns:a16="http://schemas.microsoft.com/office/drawing/2014/main" id="{8BBBB9CE-FE64-4440-89E0-58692A7ED8E5}"/>
               </a:ext>
             </a:extLst>
           </p:cNvPr>
@@ -1139,7 +1140,7 @@
           <a:p>
             <a:fld id="{7668FBEF-3CD8-4E97-B80F-AF0D925322BB}" type="datetimeFigureOut">
               <a:rPr lang="pt-BR" smtClean="0"/>
-              <a:t>05/12/2020</a:t>
+              <a:t>06/12/2020</a:t>
             </a:fld>
             <a:endParaRPr lang="pt-BR"/>
           </a:p>
@@ -1150,7 +1151,7 @@
           <p:cNvPr id="5" name="Espaço Reservado para Rodapé 4">
             <a:extLst>
               <a:ext uri="{FF2B5EF4-FFF2-40B4-BE49-F238E27FC236}">
-                <a16:creationId xmlns:a16="http://schemas.microsoft.com/office/drawing/2014/main" xmlns="" id="{EBABC5BE-E0D5-4A2A-97A7-02EA28F3FD40}"/>
+                <a16:creationId xmlns:a16="http://schemas.microsoft.com/office/drawing/2014/main" id="{EBABC5BE-E0D5-4A2A-97A7-02EA28F3FD40}"/>
               </a:ext>
             </a:extLst>
           </p:cNvPr>
@@ -1175,7 +1176,7 @@
           <p:cNvPr id="6" name="Espaço Reservado para Número de Slide 5">
             <a:extLst>
               <a:ext uri="{FF2B5EF4-FFF2-40B4-BE49-F238E27FC236}">
-                <a16:creationId xmlns:a16="http://schemas.microsoft.com/office/drawing/2014/main" xmlns="" id="{264D844E-38E3-4AEB-95EE-A141D561415B}"/>
+                <a16:creationId xmlns:a16="http://schemas.microsoft.com/office/drawing/2014/main" id="{264D844E-38E3-4AEB-95EE-A141D561415B}"/>
               </a:ext>
             </a:extLst>
           </p:cNvPr>
@@ -1234,7 +1235,7 @@
           <p:cNvPr id="2" name="Título 1">
             <a:extLst>
               <a:ext uri="{FF2B5EF4-FFF2-40B4-BE49-F238E27FC236}">
-                <a16:creationId xmlns:a16="http://schemas.microsoft.com/office/drawing/2014/main" xmlns="" id="{EBD2F67F-68BF-4EC1-8D4E-01B8259ACD92}"/>
+                <a16:creationId xmlns:a16="http://schemas.microsoft.com/office/drawing/2014/main" id="{EBD2F67F-68BF-4EC1-8D4E-01B8259ACD92}"/>
               </a:ext>
             </a:extLst>
           </p:cNvPr>
@@ -1262,7 +1263,7 @@
           <p:cNvPr id="3" name="Espaço Reservado para Conteúdo 2">
             <a:extLst>
               <a:ext uri="{FF2B5EF4-FFF2-40B4-BE49-F238E27FC236}">
-                <a16:creationId xmlns:a16="http://schemas.microsoft.com/office/drawing/2014/main" xmlns="" id="{01974D6A-BCE5-4E24-B4D1-2B2BCA416358}"/>
+                <a16:creationId xmlns:a16="http://schemas.microsoft.com/office/drawing/2014/main" id="{01974D6A-BCE5-4E24-B4D1-2B2BCA416358}"/>
               </a:ext>
             </a:extLst>
           </p:cNvPr>
@@ -1324,7 +1325,7 @@
           <p:cNvPr id="4" name="Espaço Reservado para Conteúdo 3">
             <a:extLst>
               <a:ext uri="{FF2B5EF4-FFF2-40B4-BE49-F238E27FC236}">
-                <a16:creationId xmlns:a16="http://schemas.microsoft.com/office/drawing/2014/main" xmlns="" id="{9D00E5A3-BC4C-4370-B691-96CE002325C1}"/>
+                <a16:creationId xmlns:a16="http://schemas.microsoft.com/office/drawing/2014/main" id="{9D00E5A3-BC4C-4370-B691-96CE002325C1}"/>
               </a:ext>
             </a:extLst>
           </p:cNvPr>
@@ -1386,7 +1387,7 @@
           <p:cNvPr id="5" name="Espaço Reservado para Data 4">
             <a:extLst>
               <a:ext uri="{FF2B5EF4-FFF2-40B4-BE49-F238E27FC236}">
-                <a16:creationId xmlns:a16="http://schemas.microsoft.com/office/drawing/2014/main" xmlns="" id="{301DACF2-7B9C-4039-B450-907946D43F2F}"/>
+                <a16:creationId xmlns:a16="http://schemas.microsoft.com/office/drawing/2014/main" id="{301DACF2-7B9C-4039-B450-907946D43F2F}"/>
               </a:ext>
             </a:extLst>
           </p:cNvPr>
@@ -1404,7 +1405,7 @@
           <a:p>
             <a:fld id="{7668FBEF-3CD8-4E97-B80F-AF0D925322BB}" type="datetimeFigureOut">
               <a:rPr lang="pt-BR" smtClean="0"/>
-              <a:t>05/12/2020</a:t>
+              <a:t>06/12/2020</a:t>
             </a:fld>
             <a:endParaRPr lang="pt-BR"/>
           </a:p>
@@ -1415,7 +1416,7 @@
           <p:cNvPr id="6" name="Espaço Reservado para Rodapé 5">
             <a:extLst>
               <a:ext uri="{FF2B5EF4-FFF2-40B4-BE49-F238E27FC236}">
-                <a16:creationId xmlns:a16="http://schemas.microsoft.com/office/drawing/2014/main" xmlns="" id="{930B2BF7-E597-4DBF-AC42-44D9AC074CA7}"/>
+                <a16:creationId xmlns:a16="http://schemas.microsoft.com/office/drawing/2014/main" id="{930B2BF7-E597-4DBF-AC42-44D9AC074CA7}"/>
               </a:ext>
             </a:extLst>
           </p:cNvPr>
@@ -1440,7 +1441,7 @@
           <p:cNvPr id="7" name="Espaço Reservado para Número de Slide 6">
             <a:extLst>
               <a:ext uri="{FF2B5EF4-FFF2-40B4-BE49-F238E27FC236}">
-                <a16:creationId xmlns:a16="http://schemas.microsoft.com/office/drawing/2014/main" xmlns="" id="{7BD0FD2C-FA19-486B-8614-D5B565DD9F06}"/>
+                <a16:creationId xmlns:a16="http://schemas.microsoft.com/office/drawing/2014/main" id="{7BD0FD2C-FA19-486B-8614-D5B565DD9F06}"/>
               </a:ext>
             </a:extLst>
           </p:cNvPr>
@@ -1499,7 +1500,7 @@
           <p:cNvPr id="2" name="Título 1">
             <a:extLst>
               <a:ext uri="{FF2B5EF4-FFF2-40B4-BE49-F238E27FC236}">
-                <a16:creationId xmlns:a16="http://schemas.microsoft.com/office/drawing/2014/main" xmlns="" id="{D440D9DA-AE47-4C63-817F-6FABBFEAA115}"/>
+                <a16:creationId xmlns:a16="http://schemas.microsoft.com/office/drawing/2014/main" id="{D440D9DA-AE47-4C63-817F-6FABBFEAA115}"/>
               </a:ext>
             </a:extLst>
           </p:cNvPr>
@@ -1532,7 +1533,7 @@
           <p:cNvPr id="3" name="Espaço Reservado para Texto 2">
             <a:extLst>
               <a:ext uri="{FF2B5EF4-FFF2-40B4-BE49-F238E27FC236}">
-                <a16:creationId xmlns:a16="http://schemas.microsoft.com/office/drawing/2014/main" xmlns="" id="{5A79B8A0-431C-46B7-9585-6ED7F0D39EF2}"/>
+                <a16:creationId xmlns:a16="http://schemas.microsoft.com/office/drawing/2014/main" id="{5A79B8A0-431C-46B7-9585-6ED7F0D39EF2}"/>
               </a:ext>
             </a:extLst>
           </p:cNvPr>
@@ -1603,7 +1604,7 @@
           <p:cNvPr id="4" name="Espaço Reservado para Conteúdo 3">
             <a:extLst>
               <a:ext uri="{FF2B5EF4-FFF2-40B4-BE49-F238E27FC236}">
-                <a16:creationId xmlns:a16="http://schemas.microsoft.com/office/drawing/2014/main" xmlns="" id="{D962E492-AB16-4CE4-860D-ADB327B364FA}"/>
+                <a16:creationId xmlns:a16="http://schemas.microsoft.com/office/drawing/2014/main" id="{D962E492-AB16-4CE4-860D-ADB327B364FA}"/>
               </a:ext>
             </a:extLst>
           </p:cNvPr>
@@ -1665,7 +1666,7 @@
           <p:cNvPr id="5" name="Espaço Reservado para Texto 4">
             <a:extLst>
               <a:ext uri="{FF2B5EF4-FFF2-40B4-BE49-F238E27FC236}">
-                <a16:creationId xmlns:a16="http://schemas.microsoft.com/office/drawing/2014/main" xmlns="" id="{205D6EB2-A451-4CFB-A4CE-B757CEC3C34A}"/>
+                <a16:creationId xmlns:a16="http://schemas.microsoft.com/office/drawing/2014/main" id="{205D6EB2-A451-4CFB-A4CE-B757CEC3C34A}"/>
               </a:ext>
             </a:extLst>
           </p:cNvPr>
@@ -1736,7 +1737,7 @@
           <p:cNvPr id="6" name="Espaço Reservado para Conteúdo 5">
             <a:extLst>
               <a:ext uri="{FF2B5EF4-FFF2-40B4-BE49-F238E27FC236}">
-                <a16:creationId xmlns:a16="http://schemas.microsoft.com/office/drawing/2014/main" xmlns="" id="{F5E11F8F-EB23-4782-92C0-5A46225A3CF6}"/>
+                <a16:creationId xmlns:a16="http://schemas.microsoft.com/office/drawing/2014/main" id="{F5E11F8F-EB23-4782-92C0-5A46225A3CF6}"/>
               </a:ext>
             </a:extLst>
           </p:cNvPr>
@@ -1798,7 +1799,7 @@
           <p:cNvPr id="7" name="Espaço Reservado para Data 6">
             <a:extLst>
               <a:ext uri="{FF2B5EF4-FFF2-40B4-BE49-F238E27FC236}">
-                <a16:creationId xmlns:a16="http://schemas.microsoft.com/office/drawing/2014/main" xmlns="" id="{11E705B9-1AE6-4B3F-B142-A57289326F92}"/>
+                <a16:creationId xmlns:a16="http://schemas.microsoft.com/office/drawing/2014/main" id="{11E705B9-1AE6-4B3F-B142-A57289326F92}"/>
               </a:ext>
             </a:extLst>
           </p:cNvPr>
@@ -1816,7 +1817,7 @@
           <a:p>
             <a:fld id="{7668FBEF-3CD8-4E97-B80F-AF0D925322BB}" type="datetimeFigureOut">
               <a:rPr lang="pt-BR" smtClean="0"/>
-              <a:t>05/12/2020</a:t>
+              <a:t>06/12/2020</a:t>
             </a:fld>
             <a:endParaRPr lang="pt-BR"/>
           </a:p>
@@ -1827,7 +1828,7 @@
           <p:cNvPr id="8" name="Espaço Reservado para Rodapé 7">
             <a:extLst>
               <a:ext uri="{FF2B5EF4-FFF2-40B4-BE49-F238E27FC236}">
-                <a16:creationId xmlns:a16="http://schemas.microsoft.com/office/drawing/2014/main" xmlns="" id="{48EF0B24-3FF3-4C27-BEC2-8AC3B23E9DEB}"/>
+                <a16:creationId xmlns:a16="http://schemas.microsoft.com/office/drawing/2014/main" id="{48EF0B24-3FF3-4C27-BEC2-8AC3B23E9DEB}"/>
               </a:ext>
             </a:extLst>
           </p:cNvPr>
@@ -1852,7 +1853,7 @@
           <p:cNvPr id="9" name="Espaço Reservado para Número de Slide 8">
             <a:extLst>
               <a:ext uri="{FF2B5EF4-FFF2-40B4-BE49-F238E27FC236}">
-                <a16:creationId xmlns:a16="http://schemas.microsoft.com/office/drawing/2014/main" xmlns="" id="{E736BDCF-EC0D-4A52-8503-19E7822C8C0C}"/>
+                <a16:creationId xmlns:a16="http://schemas.microsoft.com/office/drawing/2014/main" id="{E736BDCF-EC0D-4A52-8503-19E7822C8C0C}"/>
               </a:ext>
             </a:extLst>
           </p:cNvPr>
@@ -1911,7 +1912,7 @@
           <p:cNvPr id="2" name="Título 1">
             <a:extLst>
               <a:ext uri="{FF2B5EF4-FFF2-40B4-BE49-F238E27FC236}">
-                <a16:creationId xmlns:a16="http://schemas.microsoft.com/office/drawing/2014/main" xmlns="" id="{C8D1AFA6-6735-442E-B80B-24DB69886AF1}"/>
+                <a16:creationId xmlns:a16="http://schemas.microsoft.com/office/drawing/2014/main" id="{C8D1AFA6-6735-442E-B80B-24DB69886AF1}"/>
               </a:ext>
             </a:extLst>
           </p:cNvPr>
@@ -1939,7 +1940,7 @@
           <p:cNvPr id="3" name="Espaço Reservado para Data 2">
             <a:extLst>
               <a:ext uri="{FF2B5EF4-FFF2-40B4-BE49-F238E27FC236}">
-                <a16:creationId xmlns:a16="http://schemas.microsoft.com/office/drawing/2014/main" xmlns="" id="{D7458DFD-4CB5-4F1E-8D2E-970B34448A07}"/>
+                <a16:creationId xmlns:a16="http://schemas.microsoft.com/office/drawing/2014/main" id="{D7458DFD-4CB5-4F1E-8D2E-970B34448A07}"/>
               </a:ext>
             </a:extLst>
           </p:cNvPr>
@@ -1957,7 +1958,7 @@
           <a:p>
             <a:fld id="{7668FBEF-3CD8-4E97-B80F-AF0D925322BB}" type="datetimeFigureOut">
               <a:rPr lang="pt-BR" smtClean="0"/>
-              <a:t>05/12/2020</a:t>
+              <a:t>06/12/2020</a:t>
             </a:fld>
             <a:endParaRPr lang="pt-BR"/>
           </a:p>
@@ -1968,7 +1969,7 @@
           <p:cNvPr id="4" name="Espaço Reservado para Rodapé 3">
             <a:extLst>
               <a:ext uri="{FF2B5EF4-FFF2-40B4-BE49-F238E27FC236}">
-                <a16:creationId xmlns:a16="http://schemas.microsoft.com/office/drawing/2014/main" xmlns="" id="{ED562646-CBF8-4D67-BFF2-FDA6A743285E}"/>
+                <a16:creationId xmlns:a16="http://schemas.microsoft.com/office/drawing/2014/main" id="{ED562646-CBF8-4D67-BFF2-FDA6A743285E}"/>
               </a:ext>
             </a:extLst>
           </p:cNvPr>
@@ -1993,7 +1994,7 @@
           <p:cNvPr id="5" name="Espaço Reservado para Número de Slide 4">
             <a:extLst>
               <a:ext uri="{FF2B5EF4-FFF2-40B4-BE49-F238E27FC236}">
-                <a16:creationId xmlns:a16="http://schemas.microsoft.com/office/drawing/2014/main" xmlns="" id="{7B0FA740-0E87-42AA-8994-E46D3B329A94}"/>
+                <a16:creationId xmlns:a16="http://schemas.microsoft.com/office/drawing/2014/main" id="{7B0FA740-0E87-42AA-8994-E46D3B329A94}"/>
               </a:ext>
             </a:extLst>
           </p:cNvPr>
@@ -2052,7 +2053,7 @@
           <p:cNvPr id="2" name="Espaço Reservado para Data 1">
             <a:extLst>
               <a:ext uri="{FF2B5EF4-FFF2-40B4-BE49-F238E27FC236}">
-                <a16:creationId xmlns:a16="http://schemas.microsoft.com/office/drawing/2014/main" xmlns="" id="{6BA3CBF6-643C-4ACD-AD84-EE4CC969A087}"/>
+                <a16:creationId xmlns:a16="http://schemas.microsoft.com/office/drawing/2014/main" id="{6BA3CBF6-643C-4ACD-AD84-EE4CC969A087}"/>
               </a:ext>
             </a:extLst>
           </p:cNvPr>
@@ -2070,7 +2071,7 @@
           <a:p>
             <a:fld id="{7668FBEF-3CD8-4E97-B80F-AF0D925322BB}" type="datetimeFigureOut">
               <a:rPr lang="pt-BR" smtClean="0"/>
-              <a:t>05/12/2020</a:t>
+              <a:t>06/12/2020</a:t>
             </a:fld>
             <a:endParaRPr lang="pt-BR"/>
           </a:p>
@@ -2081,7 +2082,7 @@
           <p:cNvPr id="3" name="Espaço Reservado para Rodapé 2">
             <a:extLst>
               <a:ext uri="{FF2B5EF4-FFF2-40B4-BE49-F238E27FC236}">
-                <a16:creationId xmlns:a16="http://schemas.microsoft.com/office/drawing/2014/main" xmlns="" id="{DA9E3177-C1C8-47C4-ACAB-13BA6A17B47D}"/>
+                <a16:creationId xmlns:a16="http://schemas.microsoft.com/office/drawing/2014/main" id="{DA9E3177-C1C8-47C4-ACAB-13BA6A17B47D}"/>
               </a:ext>
             </a:extLst>
           </p:cNvPr>
@@ -2106,7 +2107,7 @@
           <p:cNvPr id="4" name="Espaço Reservado para Número de Slide 3">
             <a:extLst>
               <a:ext uri="{FF2B5EF4-FFF2-40B4-BE49-F238E27FC236}">
-                <a16:creationId xmlns:a16="http://schemas.microsoft.com/office/drawing/2014/main" xmlns="" id="{18A5E5DD-60AE-4B3D-BA68-EFB55A852DB6}"/>
+                <a16:creationId xmlns:a16="http://schemas.microsoft.com/office/drawing/2014/main" id="{18A5E5DD-60AE-4B3D-BA68-EFB55A852DB6}"/>
               </a:ext>
             </a:extLst>
           </p:cNvPr>
@@ -2165,7 +2166,7 @@
           <p:cNvPr id="2" name="Título 1">
             <a:extLst>
               <a:ext uri="{FF2B5EF4-FFF2-40B4-BE49-F238E27FC236}">
-                <a16:creationId xmlns:a16="http://schemas.microsoft.com/office/drawing/2014/main" xmlns="" id="{F1DB3F72-ACB8-4452-879C-3475B9D5229B}"/>
+                <a16:creationId xmlns:a16="http://schemas.microsoft.com/office/drawing/2014/main" id="{F1DB3F72-ACB8-4452-879C-3475B9D5229B}"/>
               </a:ext>
             </a:extLst>
           </p:cNvPr>
@@ -2202,7 +2203,7 @@
           <p:cNvPr id="3" name="Espaço Reservado para Conteúdo 2">
             <a:extLst>
               <a:ext uri="{FF2B5EF4-FFF2-40B4-BE49-F238E27FC236}">
-                <a16:creationId xmlns:a16="http://schemas.microsoft.com/office/drawing/2014/main" xmlns="" id="{08B02274-FF04-4E27-8FCE-2872DC8FB29F}"/>
+                <a16:creationId xmlns:a16="http://schemas.microsoft.com/office/drawing/2014/main" id="{08B02274-FF04-4E27-8FCE-2872DC8FB29F}"/>
               </a:ext>
             </a:extLst>
           </p:cNvPr>
@@ -2292,7 +2293,7 @@
           <p:cNvPr id="4" name="Espaço Reservado para Texto 3">
             <a:extLst>
               <a:ext uri="{FF2B5EF4-FFF2-40B4-BE49-F238E27FC236}">
-                <a16:creationId xmlns:a16="http://schemas.microsoft.com/office/drawing/2014/main" xmlns="" id="{05BAC6B0-7C36-443D-BFAF-0DC7FDDB6CE6}"/>
+                <a16:creationId xmlns:a16="http://schemas.microsoft.com/office/drawing/2014/main" id="{05BAC6B0-7C36-443D-BFAF-0DC7FDDB6CE6}"/>
               </a:ext>
             </a:extLst>
           </p:cNvPr>
@@ -2363,7 +2364,7 @@
           <p:cNvPr id="5" name="Espaço Reservado para Data 4">
             <a:extLst>
               <a:ext uri="{FF2B5EF4-FFF2-40B4-BE49-F238E27FC236}">
-                <a16:creationId xmlns:a16="http://schemas.microsoft.com/office/drawing/2014/main" xmlns="" id="{C97A49D8-2ABA-4FAD-A219-DFB616012DE0}"/>
+                <a16:creationId xmlns:a16="http://schemas.microsoft.com/office/drawing/2014/main" id="{C97A49D8-2ABA-4FAD-A219-DFB616012DE0}"/>
               </a:ext>
             </a:extLst>
           </p:cNvPr>
@@ -2381,7 +2382,7 @@
           <a:p>
             <a:fld id="{7668FBEF-3CD8-4E97-B80F-AF0D925322BB}" type="datetimeFigureOut">
               <a:rPr lang="pt-BR" smtClean="0"/>
-              <a:t>05/12/2020</a:t>
+              <a:t>06/12/2020</a:t>
             </a:fld>
             <a:endParaRPr lang="pt-BR"/>
           </a:p>
@@ -2392,7 +2393,7 @@
           <p:cNvPr id="6" name="Espaço Reservado para Rodapé 5">
             <a:extLst>
               <a:ext uri="{FF2B5EF4-FFF2-40B4-BE49-F238E27FC236}">
-                <a16:creationId xmlns:a16="http://schemas.microsoft.com/office/drawing/2014/main" xmlns="" id="{39D0A1B8-190A-4E3C-93DD-D1A92DBB7D1C}"/>
+                <a16:creationId xmlns:a16="http://schemas.microsoft.com/office/drawing/2014/main" id="{39D0A1B8-190A-4E3C-93DD-D1A92DBB7D1C}"/>
               </a:ext>
             </a:extLst>
           </p:cNvPr>
@@ -2417,7 +2418,7 @@
           <p:cNvPr id="7" name="Espaço Reservado para Número de Slide 6">
             <a:extLst>
               <a:ext uri="{FF2B5EF4-FFF2-40B4-BE49-F238E27FC236}">
-                <a16:creationId xmlns:a16="http://schemas.microsoft.com/office/drawing/2014/main" xmlns="" id="{22E076B9-BF23-488D-AAA7-F93C4DEB82F9}"/>
+                <a16:creationId xmlns:a16="http://schemas.microsoft.com/office/drawing/2014/main" id="{22E076B9-BF23-488D-AAA7-F93C4DEB82F9}"/>
               </a:ext>
             </a:extLst>
           </p:cNvPr>
@@ -2476,7 +2477,7 @@
           <p:cNvPr id="2" name="Título 1">
             <a:extLst>
               <a:ext uri="{FF2B5EF4-FFF2-40B4-BE49-F238E27FC236}">
-                <a16:creationId xmlns:a16="http://schemas.microsoft.com/office/drawing/2014/main" xmlns="" id="{1C6E4039-84DB-4D88-ADBC-60DB1A1DA8A2}"/>
+                <a16:creationId xmlns:a16="http://schemas.microsoft.com/office/drawing/2014/main" id="{1C6E4039-84DB-4D88-ADBC-60DB1A1DA8A2}"/>
               </a:ext>
             </a:extLst>
           </p:cNvPr>
@@ -2513,7 +2514,7 @@
           <p:cNvPr id="3" name="Espaço Reservado para Imagem 2">
             <a:extLst>
               <a:ext uri="{FF2B5EF4-FFF2-40B4-BE49-F238E27FC236}">
-                <a16:creationId xmlns:a16="http://schemas.microsoft.com/office/drawing/2014/main" xmlns="" id="{FE66FC34-356A-4619-B939-098A01CD14A4}"/>
+                <a16:creationId xmlns:a16="http://schemas.microsoft.com/office/drawing/2014/main" id="{FE66FC34-356A-4619-B939-098A01CD14A4}"/>
               </a:ext>
             </a:extLst>
           </p:cNvPr>
@@ -2580,7 +2581,7 @@
           <p:cNvPr id="4" name="Espaço Reservado para Texto 3">
             <a:extLst>
               <a:ext uri="{FF2B5EF4-FFF2-40B4-BE49-F238E27FC236}">
-                <a16:creationId xmlns:a16="http://schemas.microsoft.com/office/drawing/2014/main" xmlns="" id="{2D1C9864-964D-4D8C-B33B-711212ACB318}"/>
+                <a16:creationId xmlns:a16="http://schemas.microsoft.com/office/drawing/2014/main" id="{2D1C9864-964D-4D8C-B33B-711212ACB318}"/>
               </a:ext>
             </a:extLst>
           </p:cNvPr>
@@ -2651,7 +2652,7 @@
           <p:cNvPr id="5" name="Espaço Reservado para Data 4">
             <a:extLst>
               <a:ext uri="{FF2B5EF4-FFF2-40B4-BE49-F238E27FC236}">
-                <a16:creationId xmlns:a16="http://schemas.microsoft.com/office/drawing/2014/main" xmlns="" id="{F9CE9AEF-2284-498A-B9EE-89DBE7B003CE}"/>
+                <a16:creationId xmlns:a16="http://schemas.microsoft.com/office/drawing/2014/main" id="{F9CE9AEF-2284-498A-B9EE-89DBE7B003CE}"/>
               </a:ext>
             </a:extLst>
           </p:cNvPr>
@@ -2669,7 +2670,7 @@
           <a:p>
             <a:fld id="{7668FBEF-3CD8-4E97-B80F-AF0D925322BB}" type="datetimeFigureOut">
               <a:rPr lang="pt-BR" smtClean="0"/>
-              <a:t>05/12/2020</a:t>
+              <a:t>06/12/2020</a:t>
             </a:fld>
             <a:endParaRPr lang="pt-BR"/>
           </a:p>
@@ -2680,7 +2681,7 @@
           <p:cNvPr id="6" name="Espaço Reservado para Rodapé 5">
             <a:extLst>
               <a:ext uri="{FF2B5EF4-FFF2-40B4-BE49-F238E27FC236}">
-                <a16:creationId xmlns:a16="http://schemas.microsoft.com/office/drawing/2014/main" xmlns="" id="{E8DD3157-6B63-4D9B-B816-0DE04861777F}"/>
+                <a16:creationId xmlns:a16="http://schemas.microsoft.com/office/drawing/2014/main" id="{E8DD3157-6B63-4D9B-B816-0DE04861777F}"/>
               </a:ext>
             </a:extLst>
           </p:cNvPr>
@@ -2705,7 +2706,7 @@
           <p:cNvPr id="7" name="Espaço Reservado para Número de Slide 6">
             <a:extLst>
               <a:ext uri="{FF2B5EF4-FFF2-40B4-BE49-F238E27FC236}">
-                <a16:creationId xmlns:a16="http://schemas.microsoft.com/office/drawing/2014/main" xmlns="" id="{757F54A0-57B1-44CC-8CDD-CA3EAA4B0189}"/>
+                <a16:creationId xmlns:a16="http://schemas.microsoft.com/office/drawing/2014/main" id="{757F54A0-57B1-44CC-8CDD-CA3EAA4B0189}"/>
               </a:ext>
             </a:extLst>
           </p:cNvPr>
@@ -2769,7 +2770,7 @@
           <p:cNvPr id="2" name="Espaço Reservado para Título 1">
             <a:extLst>
               <a:ext uri="{FF2B5EF4-FFF2-40B4-BE49-F238E27FC236}">
-                <a16:creationId xmlns:a16="http://schemas.microsoft.com/office/drawing/2014/main" xmlns="" id="{DF3B372A-336D-49A1-8E4C-C2772470E717}"/>
+                <a16:creationId xmlns:a16="http://schemas.microsoft.com/office/drawing/2014/main" id="{DF3B372A-336D-49A1-8E4C-C2772470E717}"/>
               </a:ext>
             </a:extLst>
           </p:cNvPr>
@@ -2807,7 +2808,7 @@
           <p:cNvPr id="3" name="Espaço Reservado para Texto 2">
             <a:extLst>
               <a:ext uri="{FF2B5EF4-FFF2-40B4-BE49-F238E27FC236}">
-                <a16:creationId xmlns:a16="http://schemas.microsoft.com/office/drawing/2014/main" xmlns="" id="{FF8D6751-AF01-43BA-BC96-8236D09E671A}"/>
+                <a16:creationId xmlns:a16="http://schemas.microsoft.com/office/drawing/2014/main" id="{FF8D6751-AF01-43BA-BC96-8236D09E671A}"/>
               </a:ext>
             </a:extLst>
           </p:cNvPr>
@@ -2874,7 +2875,7 @@
           <p:cNvPr id="4" name="Espaço Reservado para Data 3">
             <a:extLst>
               <a:ext uri="{FF2B5EF4-FFF2-40B4-BE49-F238E27FC236}">
-                <a16:creationId xmlns:a16="http://schemas.microsoft.com/office/drawing/2014/main" xmlns="" id="{717400A4-F695-495F-8D3A-44F247634C38}"/>
+                <a16:creationId xmlns:a16="http://schemas.microsoft.com/office/drawing/2014/main" id="{717400A4-F695-495F-8D3A-44F247634C38}"/>
               </a:ext>
             </a:extLst>
           </p:cNvPr>
@@ -2910,7 +2911,7 @@
           <a:p>
             <a:fld id="{7668FBEF-3CD8-4E97-B80F-AF0D925322BB}" type="datetimeFigureOut">
               <a:rPr lang="pt-BR" smtClean="0"/>
-              <a:t>05/12/2020</a:t>
+              <a:t>06/12/2020</a:t>
             </a:fld>
             <a:endParaRPr lang="pt-BR"/>
           </a:p>
@@ -2921,7 +2922,7 @@
           <p:cNvPr id="5" name="Espaço Reservado para Rodapé 4">
             <a:extLst>
               <a:ext uri="{FF2B5EF4-FFF2-40B4-BE49-F238E27FC236}">
-                <a16:creationId xmlns:a16="http://schemas.microsoft.com/office/drawing/2014/main" xmlns="" id="{AE9E5EC4-6EE9-4001-83FB-7B2CEDC8F6C1}"/>
+                <a16:creationId xmlns:a16="http://schemas.microsoft.com/office/drawing/2014/main" id="{AE9E5EC4-6EE9-4001-83FB-7B2CEDC8F6C1}"/>
               </a:ext>
             </a:extLst>
           </p:cNvPr>
@@ -2964,7 +2965,7 @@
           <p:cNvPr id="6" name="Espaço Reservado para Número de Slide 5">
             <a:extLst>
               <a:ext uri="{FF2B5EF4-FFF2-40B4-BE49-F238E27FC236}">
-                <a16:creationId xmlns:a16="http://schemas.microsoft.com/office/drawing/2014/main" xmlns="" id="{23F1441C-AB1F-4113-A9EA-CFBBA3E5D38B}"/>
+                <a16:creationId xmlns:a16="http://schemas.microsoft.com/office/drawing/2014/main" id="{23F1441C-AB1F-4113-A9EA-CFBBA3E5D38B}"/>
               </a:ext>
             </a:extLst>
           </p:cNvPr>
@@ -3332,7 +3333,7 @@
           <p:cNvPr id="5" name="CaixaDeTexto 4">
             <a:extLst>
               <a:ext uri="{FF2B5EF4-FFF2-40B4-BE49-F238E27FC236}">
-                <a16:creationId xmlns:a16="http://schemas.microsoft.com/office/drawing/2014/main" xmlns="" id="{3A0E2E5A-1CDB-49BC-9C37-FC86C36DA909}"/>
+                <a16:creationId xmlns:a16="http://schemas.microsoft.com/office/drawing/2014/main" id="{3A0E2E5A-1CDB-49BC-9C37-FC86C36DA909}"/>
               </a:ext>
             </a:extLst>
           </p:cNvPr>
@@ -3368,7 +3369,7 @@
           <p:cNvPr id="6" name="CaixaDeTexto 5">
             <a:extLst>
               <a:ext uri="{FF2B5EF4-FFF2-40B4-BE49-F238E27FC236}">
-                <a16:creationId xmlns:a16="http://schemas.microsoft.com/office/drawing/2014/main" xmlns="" id="{412904C5-8378-4A99-AC6C-897C51F80497}"/>
+                <a16:creationId xmlns:a16="http://schemas.microsoft.com/office/drawing/2014/main" id="{412904C5-8378-4A99-AC6C-897C51F80497}"/>
               </a:ext>
             </a:extLst>
           </p:cNvPr>
@@ -3404,7 +3405,7 @@
           <p:cNvPr id="10" name="Imagem 9">
             <a:extLst>
               <a:ext uri="{FF2B5EF4-FFF2-40B4-BE49-F238E27FC236}">
-                <a16:creationId xmlns:a16="http://schemas.microsoft.com/office/drawing/2014/main" xmlns="" id="{AD925734-A883-4E00-A8F5-5539F9E089B0}"/>
+                <a16:creationId xmlns:a16="http://schemas.microsoft.com/office/drawing/2014/main" id="{AD925734-A883-4E00-A8F5-5539F9E089B0}"/>
               </a:ext>
             </a:extLst>
           </p:cNvPr>
@@ -3449,7 +3450,7 @@
           <p:cNvPr id="12" name="Imagem 11">
             <a:extLst>
               <a:ext uri="{FF2B5EF4-FFF2-40B4-BE49-F238E27FC236}">
-                <a16:creationId xmlns:a16="http://schemas.microsoft.com/office/drawing/2014/main" xmlns="" id="{B36E72DB-7364-407A-ADAA-356DC5102CC1}"/>
+                <a16:creationId xmlns:a16="http://schemas.microsoft.com/office/drawing/2014/main" id="{B36E72DB-7364-407A-ADAA-356DC5102CC1}"/>
               </a:ext>
             </a:extLst>
           </p:cNvPr>
@@ -3494,7 +3495,7 @@
           <p:cNvPr id="14" name="Imagem 13">
             <a:extLst>
               <a:ext uri="{FF2B5EF4-FFF2-40B4-BE49-F238E27FC236}">
-                <a16:creationId xmlns:a16="http://schemas.microsoft.com/office/drawing/2014/main" xmlns="" id="{7C95BA3E-B087-497F-A2F7-17D2ACAB588D}"/>
+                <a16:creationId xmlns:a16="http://schemas.microsoft.com/office/drawing/2014/main" id="{7C95BA3E-B087-497F-A2F7-17D2ACAB588D}"/>
               </a:ext>
             </a:extLst>
           </p:cNvPr>
@@ -3538,7 +3539,7 @@
           <p:cNvPr id="16" name="Imagem 15">
             <a:extLst>
               <a:ext uri="{FF2B5EF4-FFF2-40B4-BE49-F238E27FC236}">
-                <a16:creationId xmlns:a16="http://schemas.microsoft.com/office/drawing/2014/main" xmlns="" id="{6E1ED496-9576-424C-A6D8-1A33B907F447}"/>
+                <a16:creationId xmlns:a16="http://schemas.microsoft.com/office/drawing/2014/main" id="{6E1ED496-9576-424C-A6D8-1A33B907F447}"/>
               </a:ext>
             </a:extLst>
           </p:cNvPr>
@@ -3574,7 +3575,7 @@
           <p:cNvPr id="20" name="Imagem 19">
             <a:extLst>
               <a:ext uri="{FF2B5EF4-FFF2-40B4-BE49-F238E27FC236}">
-                <a16:creationId xmlns:a16="http://schemas.microsoft.com/office/drawing/2014/main" xmlns="" id="{6711525F-D16D-41C7-AB3E-9799DB511FA0}"/>
+                <a16:creationId xmlns:a16="http://schemas.microsoft.com/office/drawing/2014/main" id="{6711525F-D16D-41C7-AB3E-9799DB511FA0}"/>
               </a:ext>
             </a:extLst>
           </p:cNvPr>
@@ -3618,7 +3619,7 @@
           <p:cNvPr id="29" name="Imagem 28" descr="Ícone&#10;&#10;Descrição gerada automaticamente">
             <a:extLst>
               <a:ext uri="{FF2B5EF4-FFF2-40B4-BE49-F238E27FC236}">
-                <a16:creationId xmlns:a16="http://schemas.microsoft.com/office/drawing/2014/main" xmlns="" id="{43FB11AC-C448-4F44-B61E-41B39317BF92}"/>
+                <a16:creationId xmlns:a16="http://schemas.microsoft.com/office/drawing/2014/main" id="{43FB11AC-C448-4F44-B61E-41B39317BF92}"/>
               </a:ext>
             </a:extLst>
           </p:cNvPr>
@@ -3654,7 +3655,7 @@
           <p:cNvPr id="31" name="Imagem 30" descr="Ícone&#10;&#10;Descrição gerada automaticamente">
             <a:extLst>
               <a:ext uri="{FF2B5EF4-FFF2-40B4-BE49-F238E27FC236}">
-                <a16:creationId xmlns:a16="http://schemas.microsoft.com/office/drawing/2014/main" xmlns="" id="{E015E4BB-65D7-4162-A599-1A3DABA35918}"/>
+                <a16:creationId xmlns:a16="http://schemas.microsoft.com/office/drawing/2014/main" id="{E015E4BB-65D7-4162-A599-1A3DABA35918}"/>
               </a:ext>
             </a:extLst>
           </p:cNvPr>
@@ -3690,7 +3691,7 @@
           <p:cNvPr id="37" name="Imagem 36" descr="Uma imagem contendo relógio&#10;&#10;Descrição gerada automaticamente">
             <a:extLst>
               <a:ext uri="{FF2B5EF4-FFF2-40B4-BE49-F238E27FC236}">
-                <a16:creationId xmlns:a16="http://schemas.microsoft.com/office/drawing/2014/main" xmlns="" id="{CAF8B920-9A4F-406A-AB75-211B681E233E}"/>
+                <a16:creationId xmlns:a16="http://schemas.microsoft.com/office/drawing/2014/main" id="{CAF8B920-9A4F-406A-AB75-211B681E233E}"/>
               </a:ext>
             </a:extLst>
           </p:cNvPr>
@@ -3726,7 +3727,7 @@
           <p:cNvPr id="39" name="Imagem 38" descr="Ícone&#10;&#10;Descrição gerada automaticamente">
             <a:extLst>
               <a:ext uri="{FF2B5EF4-FFF2-40B4-BE49-F238E27FC236}">
-                <a16:creationId xmlns:a16="http://schemas.microsoft.com/office/drawing/2014/main" xmlns="" id="{F75E5FE2-0419-4BCC-A15C-8DE54005C9B2}"/>
+                <a16:creationId xmlns:a16="http://schemas.microsoft.com/office/drawing/2014/main" id="{F75E5FE2-0419-4BCC-A15C-8DE54005C9B2}"/>
               </a:ext>
             </a:extLst>
           </p:cNvPr>
@@ -3762,7 +3763,7 @@
           <p:cNvPr id="2" name="CaixaDeTexto 1">
             <a:extLst>
               <a:ext uri="{FF2B5EF4-FFF2-40B4-BE49-F238E27FC236}">
-                <a16:creationId xmlns:a16="http://schemas.microsoft.com/office/drawing/2014/main" xmlns="" id="{9785855B-0C06-475A-8CEB-38B9B93C5421}"/>
+                <a16:creationId xmlns:a16="http://schemas.microsoft.com/office/drawing/2014/main" id="{9785855B-0C06-475A-8CEB-38B9B93C5421}"/>
               </a:ext>
             </a:extLst>
           </p:cNvPr>
@@ -3797,7 +3798,7 @@
           <p:cNvPr id="18" name="CaixaDeTexto 17">
             <a:extLst>
               <a:ext uri="{FF2B5EF4-FFF2-40B4-BE49-F238E27FC236}">
-                <a16:creationId xmlns:a16="http://schemas.microsoft.com/office/drawing/2014/main" xmlns="" id="{5E16D9AB-B401-4B00-98D4-EFE0768B70EC}"/>
+                <a16:creationId xmlns:a16="http://schemas.microsoft.com/office/drawing/2014/main" id="{5E16D9AB-B401-4B00-98D4-EFE0768B70EC}"/>
               </a:ext>
             </a:extLst>
           </p:cNvPr>
@@ -3833,7 +3834,7 @@
           <p:cNvPr id="21" name="CaixaDeTexto 20">
             <a:extLst>
               <a:ext uri="{FF2B5EF4-FFF2-40B4-BE49-F238E27FC236}">
-                <a16:creationId xmlns:a16="http://schemas.microsoft.com/office/drawing/2014/main" xmlns="" id="{8FAB4AC2-1CFF-4CA5-BD50-F2D84F81A361}"/>
+                <a16:creationId xmlns:a16="http://schemas.microsoft.com/office/drawing/2014/main" id="{8FAB4AC2-1CFF-4CA5-BD50-F2D84F81A361}"/>
               </a:ext>
             </a:extLst>
           </p:cNvPr>
@@ -3869,7 +3870,7 @@
           <p:cNvPr id="23" name="CaixaDeTexto 22">
             <a:extLst>
               <a:ext uri="{FF2B5EF4-FFF2-40B4-BE49-F238E27FC236}">
-                <a16:creationId xmlns:a16="http://schemas.microsoft.com/office/drawing/2014/main" xmlns="" id="{752684E8-841F-414C-92C0-6E2CF31C3DA7}"/>
+                <a16:creationId xmlns:a16="http://schemas.microsoft.com/office/drawing/2014/main" id="{752684E8-841F-414C-92C0-6E2CF31C3DA7}"/>
               </a:ext>
             </a:extLst>
           </p:cNvPr>
@@ -3935,7 +3936,7 @@
           <p:cNvPr id="24" name="Imagem 23" descr="Forma&#10;&#10;Descrição gerada automaticamente">
             <a:extLst>
               <a:ext uri="{FF2B5EF4-FFF2-40B4-BE49-F238E27FC236}">
-                <a16:creationId xmlns:a16="http://schemas.microsoft.com/office/drawing/2014/main" xmlns="" id="{5C7DD506-50B1-460C-BA22-4C94A74330EA}"/>
+                <a16:creationId xmlns:a16="http://schemas.microsoft.com/office/drawing/2014/main" id="{5C7DD506-50B1-460C-BA22-4C94A74330EA}"/>
               </a:ext>
             </a:extLst>
           </p:cNvPr>
@@ -3970,7 +3971,7 @@
           <p:cNvPr id="16" name="Imagem 15">
             <a:extLst>
               <a:ext uri="{FF2B5EF4-FFF2-40B4-BE49-F238E27FC236}">
-                <a16:creationId xmlns:a16="http://schemas.microsoft.com/office/drawing/2014/main" xmlns="" id="{F080E30E-48F9-44E0-BB36-75BC3D0889E5}"/>
+                <a16:creationId xmlns:a16="http://schemas.microsoft.com/office/drawing/2014/main" id="{F080E30E-48F9-44E0-BB36-75BC3D0889E5}"/>
               </a:ext>
             </a:extLst>
           </p:cNvPr>
@@ -4006,7 +4007,7 @@
           <p:cNvPr id="68" name="Conector de Seta Reta 67">
             <a:extLst>
               <a:ext uri="{FF2B5EF4-FFF2-40B4-BE49-F238E27FC236}">
-                <a16:creationId xmlns:a16="http://schemas.microsoft.com/office/drawing/2014/main" xmlns="" id="{8C10B952-8765-4D4B-A28B-A6F214A05649}"/>
+                <a16:creationId xmlns:a16="http://schemas.microsoft.com/office/drawing/2014/main" id="{8C10B952-8765-4D4B-A28B-A6F214A05649}"/>
               </a:ext>
             </a:extLst>
           </p:cNvPr>
@@ -4053,7 +4054,7 @@
           <p:cNvPr id="72" name="Conector de Seta Reta 71">
             <a:extLst>
               <a:ext uri="{FF2B5EF4-FFF2-40B4-BE49-F238E27FC236}">
-                <a16:creationId xmlns:a16="http://schemas.microsoft.com/office/drawing/2014/main" xmlns="" id="{E39A84D5-791D-428F-8A43-562265A600C5}"/>
+                <a16:creationId xmlns:a16="http://schemas.microsoft.com/office/drawing/2014/main" id="{E39A84D5-791D-428F-8A43-562265A600C5}"/>
               </a:ext>
             </a:extLst>
           </p:cNvPr>
@@ -4100,7 +4101,7 @@
           <p:cNvPr id="91" name="Imagem 90">
             <a:extLst>
               <a:ext uri="{FF2B5EF4-FFF2-40B4-BE49-F238E27FC236}">
-                <a16:creationId xmlns:a16="http://schemas.microsoft.com/office/drawing/2014/main" xmlns="" id="{413FCE52-9E42-42C4-8D09-B45934FDA216}"/>
+                <a16:creationId xmlns:a16="http://schemas.microsoft.com/office/drawing/2014/main" id="{413FCE52-9E42-42C4-8D09-B45934FDA216}"/>
               </a:ext>
             </a:extLst>
           </p:cNvPr>
@@ -4136,7 +4137,7 @@
           <p:cNvPr id="93" name="Imagem 92">
             <a:extLst>
               <a:ext uri="{FF2B5EF4-FFF2-40B4-BE49-F238E27FC236}">
-                <a16:creationId xmlns:a16="http://schemas.microsoft.com/office/drawing/2014/main" xmlns="" id="{63E9CCF7-0455-42A7-B3B4-AEC2412E858C}"/>
+                <a16:creationId xmlns:a16="http://schemas.microsoft.com/office/drawing/2014/main" id="{63E9CCF7-0455-42A7-B3B4-AEC2412E858C}"/>
               </a:ext>
             </a:extLst>
           </p:cNvPr>
@@ -4172,7 +4173,7 @@
           <p:cNvPr id="94" name="Imagem 93">
             <a:extLst>
               <a:ext uri="{FF2B5EF4-FFF2-40B4-BE49-F238E27FC236}">
-                <a16:creationId xmlns:a16="http://schemas.microsoft.com/office/drawing/2014/main" xmlns="" id="{B79F862E-D809-4A78-AAE4-6CF63FB26508}"/>
+                <a16:creationId xmlns:a16="http://schemas.microsoft.com/office/drawing/2014/main" id="{B79F862E-D809-4A78-AAE4-6CF63FB26508}"/>
               </a:ext>
             </a:extLst>
           </p:cNvPr>
@@ -4208,7 +4209,7 @@
           <p:cNvPr id="97" name="Imagem 96">
             <a:extLst>
               <a:ext uri="{FF2B5EF4-FFF2-40B4-BE49-F238E27FC236}">
-                <a16:creationId xmlns:a16="http://schemas.microsoft.com/office/drawing/2014/main" xmlns="" id="{1E1D9264-4478-4D21-90D1-CC0A88EEBE02}"/>
+                <a16:creationId xmlns:a16="http://schemas.microsoft.com/office/drawing/2014/main" id="{1E1D9264-4478-4D21-90D1-CC0A88EEBE02}"/>
               </a:ext>
             </a:extLst>
           </p:cNvPr>
@@ -4244,7 +4245,7 @@
           <p:cNvPr id="110" name="Imagem 109">
             <a:extLst>
               <a:ext uri="{FF2B5EF4-FFF2-40B4-BE49-F238E27FC236}">
-                <a16:creationId xmlns:a16="http://schemas.microsoft.com/office/drawing/2014/main" xmlns="" id="{48EAE7C9-853C-4C62-BE4F-77E1FF7A2142}"/>
+                <a16:creationId xmlns:a16="http://schemas.microsoft.com/office/drawing/2014/main" id="{48EAE7C9-853C-4C62-BE4F-77E1FF7A2142}"/>
               </a:ext>
             </a:extLst>
           </p:cNvPr>
@@ -4280,7 +4281,7 @@
           <p:cNvPr id="113" name="Imagem 112">
             <a:extLst>
               <a:ext uri="{FF2B5EF4-FFF2-40B4-BE49-F238E27FC236}">
-                <a16:creationId xmlns:a16="http://schemas.microsoft.com/office/drawing/2014/main" xmlns="" id="{3A0A7C0D-5AAE-4386-8F96-FE545AB5180F}"/>
+                <a16:creationId xmlns:a16="http://schemas.microsoft.com/office/drawing/2014/main" id="{3A0A7C0D-5AAE-4386-8F96-FE545AB5180F}"/>
               </a:ext>
             </a:extLst>
           </p:cNvPr>
@@ -4316,7 +4317,7 @@
           <p:cNvPr id="115" name="Imagem 114">
             <a:extLst>
               <a:ext uri="{FF2B5EF4-FFF2-40B4-BE49-F238E27FC236}">
-                <a16:creationId xmlns:a16="http://schemas.microsoft.com/office/drawing/2014/main" xmlns="" id="{3C1B681C-ED12-41C5-AD26-8B6853414F1D}"/>
+                <a16:creationId xmlns:a16="http://schemas.microsoft.com/office/drawing/2014/main" id="{3C1B681C-ED12-41C5-AD26-8B6853414F1D}"/>
               </a:ext>
             </a:extLst>
           </p:cNvPr>
@@ -4352,7 +4353,7 @@
           <p:cNvPr id="2" name="Retângulo 1">
             <a:extLst>
               <a:ext uri="{FF2B5EF4-FFF2-40B4-BE49-F238E27FC236}">
-                <a16:creationId xmlns:a16="http://schemas.microsoft.com/office/drawing/2014/main" xmlns="" id="{969E54A0-B7B5-4147-AB27-DA0CC75F47BD}"/>
+                <a16:creationId xmlns:a16="http://schemas.microsoft.com/office/drawing/2014/main" id="{969E54A0-B7B5-4147-AB27-DA0CC75F47BD}"/>
               </a:ext>
             </a:extLst>
           </p:cNvPr>
@@ -4404,7 +4405,7 @@
           <p:cNvPr id="3" name="CaixaDeTexto 2">
             <a:extLst>
               <a:ext uri="{FF2B5EF4-FFF2-40B4-BE49-F238E27FC236}">
-                <a16:creationId xmlns:a16="http://schemas.microsoft.com/office/drawing/2014/main" xmlns="" id="{F3DB1EB6-7EDD-4F76-AC41-93A77350D0DB}"/>
+                <a16:creationId xmlns:a16="http://schemas.microsoft.com/office/drawing/2014/main" id="{F3DB1EB6-7EDD-4F76-AC41-93A77350D0DB}"/>
               </a:ext>
             </a:extLst>
           </p:cNvPr>
@@ -4439,7 +4440,7 @@
           <p:cNvPr id="5" name="CaixaDeTexto 4">
             <a:extLst>
               <a:ext uri="{FF2B5EF4-FFF2-40B4-BE49-F238E27FC236}">
-                <a16:creationId xmlns:a16="http://schemas.microsoft.com/office/drawing/2014/main" xmlns="" id="{00324186-5835-453F-9CA7-D8BA2FE4FDB1}"/>
+                <a16:creationId xmlns:a16="http://schemas.microsoft.com/office/drawing/2014/main" id="{00324186-5835-453F-9CA7-D8BA2FE4FDB1}"/>
               </a:ext>
             </a:extLst>
           </p:cNvPr>
@@ -4478,7 +4479,7 @@
           <p:cNvPr id="8" name="CaixaDeTexto 7">
             <a:extLst>
               <a:ext uri="{FF2B5EF4-FFF2-40B4-BE49-F238E27FC236}">
-                <a16:creationId xmlns:a16="http://schemas.microsoft.com/office/drawing/2014/main" xmlns="" id="{C6B4F186-1182-4828-8066-2E561878460C}"/>
+                <a16:creationId xmlns:a16="http://schemas.microsoft.com/office/drawing/2014/main" id="{C6B4F186-1182-4828-8066-2E561878460C}"/>
               </a:ext>
             </a:extLst>
           </p:cNvPr>
@@ -4513,7 +4514,7 @@
           <p:cNvPr id="14" name="Imagem 13" descr="Logotipo, nome da empresa&#10;&#10;Descrição gerada automaticamente">
             <a:extLst>
               <a:ext uri="{FF2B5EF4-FFF2-40B4-BE49-F238E27FC236}">
-                <a16:creationId xmlns:a16="http://schemas.microsoft.com/office/drawing/2014/main" xmlns="" id="{C131E45E-AAA8-4092-97F7-314E8411F05B}"/>
+                <a16:creationId xmlns:a16="http://schemas.microsoft.com/office/drawing/2014/main" id="{C131E45E-AAA8-4092-97F7-314E8411F05B}"/>
               </a:ext>
             </a:extLst>
           </p:cNvPr>
@@ -4549,7 +4550,7 @@
           <p:cNvPr id="6" name="Picture 4">
             <a:extLst>
               <a:ext uri="{FF2B5EF4-FFF2-40B4-BE49-F238E27FC236}">
-                <a16:creationId xmlns:a16="http://schemas.microsoft.com/office/drawing/2014/main" xmlns="" id="{459310AC-F268-4178-A4E9-B2C3E8E97734}"/>
+                <a16:creationId xmlns:a16="http://schemas.microsoft.com/office/drawing/2014/main" id="{459310AC-F268-4178-A4E9-B2C3E8E97734}"/>
               </a:ext>
             </a:extLst>
           </p:cNvPr>
@@ -4596,7 +4597,7 @@
           <p:cNvPr id="36" name="CaixaDeTexto 35">
             <a:extLst>
               <a:ext uri="{FF2B5EF4-FFF2-40B4-BE49-F238E27FC236}">
-                <a16:creationId xmlns:a16="http://schemas.microsoft.com/office/drawing/2014/main" xmlns="" id="{2AD70534-8DF3-47A4-8849-845029A2F70F}"/>
+                <a16:creationId xmlns:a16="http://schemas.microsoft.com/office/drawing/2014/main" id="{2AD70534-8DF3-47A4-8849-845029A2F70F}"/>
               </a:ext>
             </a:extLst>
           </p:cNvPr>
@@ -4636,7 +4637,7 @@
           <p:cNvPr id="41" name="CaixaDeTexto 40">
             <a:extLst>
               <a:ext uri="{FF2B5EF4-FFF2-40B4-BE49-F238E27FC236}">
-                <a16:creationId xmlns:a16="http://schemas.microsoft.com/office/drawing/2014/main" xmlns="" id="{52D7509F-0E02-4527-A270-E5C288172F37}"/>
+                <a16:creationId xmlns:a16="http://schemas.microsoft.com/office/drawing/2014/main" id="{52D7509F-0E02-4527-A270-E5C288172F37}"/>
               </a:ext>
             </a:extLst>
           </p:cNvPr>
@@ -4676,7 +4677,7 @@
           <p:cNvPr id="57" name="Conector de Seta Reta 56">
             <a:extLst>
               <a:ext uri="{FF2B5EF4-FFF2-40B4-BE49-F238E27FC236}">
-                <a16:creationId xmlns:a16="http://schemas.microsoft.com/office/drawing/2014/main" xmlns="" id="{688067FF-CBEE-4F28-88D7-F6AEC67ED517}"/>
+                <a16:creationId xmlns:a16="http://schemas.microsoft.com/office/drawing/2014/main" id="{688067FF-CBEE-4F28-88D7-F6AEC67ED517}"/>
               </a:ext>
             </a:extLst>
           </p:cNvPr>
@@ -4717,7 +4718,7 @@
           <p:cNvPr id="9" name="Retângulo 8">
             <a:extLst>
               <a:ext uri="{FF2B5EF4-FFF2-40B4-BE49-F238E27FC236}">
-                <a16:creationId xmlns:a16="http://schemas.microsoft.com/office/drawing/2014/main" xmlns="" id="{A2895AD6-3034-4EE2-8F53-A1BC76FBF2D0}"/>
+                <a16:creationId xmlns:a16="http://schemas.microsoft.com/office/drawing/2014/main" id="{A2895AD6-3034-4EE2-8F53-A1BC76FBF2D0}"/>
               </a:ext>
             </a:extLst>
           </p:cNvPr>
@@ -4769,7 +4770,7 @@
           <p:cNvPr id="7" name="Picture 10" descr="Amazon Web Services - Wikipedia">
             <a:extLst>
               <a:ext uri="{FF2B5EF4-FFF2-40B4-BE49-F238E27FC236}">
-                <a16:creationId xmlns:a16="http://schemas.microsoft.com/office/drawing/2014/main" xmlns="" id="{4484FA0D-09D2-41AD-9A5C-AA5C5431D5FE}"/>
+                <a16:creationId xmlns:a16="http://schemas.microsoft.com/office/drawing/2014/main" id="{4484FA0D-09D2-41AD-9A5C-AA5C5431D5FE}"/>
               </a:ext>
             </a:extLst>
           </p:cNvPr>
@@ -4816,7 +4817,7 @@
           <p:cNvPr id="17" name="CaixaDeTexto 16">
             <a:extLst>
               <a:ext uri="{FF2B5EF4-FFF2-40B4-BE49-F238E27FC236}">
-                <a16:creationId xmlns:a16="http://schemas.microsoft.com/office/drawing/2014/main" xmlns="" id="{26EAF8F4-3BDF-487E-A712-9B376B133FBC}"/>
+                <a16:creationId xmlns:a16="http://schemas.microsoft.com/office/drawing/2014/main" id="{26EAF8F4-3BDF-487E-A712-9B376B133FBC}"/>
               </a:ext>
             </a:extLst>
           </p:cNvPr>
@@ -5025,7 +5026,7 @@
           <p:cNvPr id="21" name="Agrupar 20">
             <a:extLst>
               <a:ext uri="{FF2B5EF4-FFF2-40B4-BE49-F238E27FC236}">
-                <a16:creationId xmlns:a16="http://schemas.microsoft.com/office/drawing/2014/main" xmlns="" id="{1550788F-EA80-4E29-BE8A-2E903471849F}"/>
+                <a16:creationId xmlns:a16="http://schemas.microsoft.com/office/drawing/2014/main" id="{1550788F-EA80-4E29-BE8A-2E903471849F}"/>
               </a:ext>
             </a:extLst>
           </p:cNvPr>
@@ -5045,7 +5046,7 @@
             <p:cNvPr id="1026" name="Picture 2" descr="Boas-vindas ao seu novo QG | Slack">
               <a:extLst>
                 <a:ext uri="{FF2B5EF4-FFF2-40B4-BE49-F238E27FC236}">
-                  <a16:creationId xmlns:a16="http://schemas.microsoft.com/office/drawing/2014/main" xmlns="" id="{D2B9D5B0-D199-4A89-A00B-86E4BE07F467}"/>
+                  <a16:creationId xmlns:a16="http://schemas.microsoft.com/office/drawing/2014/main" id="{D2B9D5B0-D199-4A89-A00B-86E4BE07F467}"/>
                 </a:ext>
               </a:extLst>
             </p:cNvPr>
@@ -5092,7 +5093,7 @@
             <p:cNvPr id="4" name="CaixaDeTexto 3">
               <a:extLst>
                 <a:ext uri="{FF2B5EF4-FFF2-40B4-BE49-F238E27FC236}">
-                  <a16:creationId xmlns:a16="http://schemas.microsoft.com/office/drawing/2014/main" xmlns="" id="{D03018DC-DEBD-439B-B33A-3FD65D7934A5}"/>
+                  <a16:creationId xmlns:a16="http://schemas.microsoft.com/office/drawing/2014/main" id="{D03018DC-DEBD-439B-B33A-3FD65D7934A5}"/>
                 </a:ext>
               </a:extLst>
             </p:cNvPr>
@@ -5128,7 +5129,7 @@
           <p:cNvPr id="23" name="Imagem 22" descr="Logotipo, nome da empresa&#10;&#10;Descrição gerada automaticamente">
             <a:extLst>
               <a:ext uri="{FF2B5EF4-FFF2-40B4-BE49-F238E27FC236}">
-                <a16:creationId xmlns:a16="http://schemas.microsoft.com/office/drawing/2014/main" xmlns="" id="{430375AE-F10C-4E7F-AC5E-E4A9143A7746}"/>
+                <a16:creationId xmlns:a16="http://schemas.microsoft.com/office/drawing/2014/main" id="{430375AE-F10C-4E7F-AC5E-E4A9143A7746}"/>
               </a:ext>
             </a:extLst>
           </p:cNvPr>
@@ -5164,7 +5165,7 @@
           <p:cNvPr id="50" name="Imagem 49">
             <a:extLst>
               <a:ext uri="{FF2B5EF4-FFF2-40B4-BE49-F238E27FC236}">
-                <a16:creationId xmlns:a16="http://schemas.microsoft.com/office/drawing/2014/main" xmlns="" id="{B7B64E3D-9B7A-45F3-806A-B186144DA1C4}"/>
+                <a16:creationId xmlns:a16="http://schemas.microsoft.com/office/drawing/2014/main" id="{B7B64E3D-9B7A-45F3-806A-B186144DA1C4}"/>
               </a:ext>
             </a:extLst>
           </p:cNvPr>
@@ -5194,7 +5195,7 @@
           <p:cNvPr id="52" name="Picture 2" descr="Boas-vindas ao seu novo QG | Slack">
             <a:extLst>
               <a:ext uri="{FF2B5EF4-FFF2-40B4-BE49-F238E27FC236}">
-                <a16:creationId xmlns:a16="http://schemas.microsoft.com/office/drawing/2014/main" xmlns="" id="{84353701-537A-485B-9AFC-F27D88E69C0E}"/>
+                <a16:creationId xmlns:a16="http://schemas.microsoft.com/office/drawing/2014/main" id="{84353701-537A-485B-9AFC-F27D88E69C0E}"/>
               </a:ext>
             </a:extLst>
           </p:cNvPr>
@@ -5241,7 +5242,7 @@
           <p:cNvPr id="54" name="Retângulo 53">
             <a:extLst>
               <a:ext uri="{FF2B5EF4-FFF2-40B4-BE49-F238E27FC236}">
-                <a16:creationId xmlns:a16="http://schemas.microsoft.com/office/drawing/2014/main" xmlns="" id="{F6769D6D-4C92-4616-B7A1-9AA9E96B528E}"/>
+                <a16:creationId xmlns:a16="http://schemas.microsoft.com/office/drawing/2014/main" id="{F6769D6D-4C92-4616-B7A1-9AA9E96B528E}"/>
               </a:ext>
             </a:extLst>
           </p:cNvPr>
@@ -5293,7 +5294,7 @@
           <p:cNvPr id="28" name="Imagem 27" descr="Imagem em preto e branco&#10;&#10;Descrição gerada automaticamente">
             <a:extLst>
               <a:ext uri="{FF2B5EF4-FFF2-40B4-BE49-F238E27FC236}">
-                <a16:creationId xmlns:a16="http://schemas.microsoft.com/office/drawing/2014/main" xmlns="" id="{2CC60A5A-32BC-4872-BEF8-F867013BB652}"/>
+                <a16:creationId xmlns:a16="http://schemas.microsoft.com/office/drawing/2014/main" id="{2CC60A5A-32BC-4872-BEF8-F867013BB652}"/>
               </a:ext>
             </a:extLst>
           </p:cNvPr>
@@ -5353,7 +5354,7 @@
           <p:cNvPr id="42" name="Imagem 41" descr="Forma&#10;&#10;Descrição gerada automaticamente">
             <a:extLst>
               <a:ext uri="{FF2B5EF4-FFF2-40B4-BE49-F238E27FC236}">
-                <a16:creationId xmlns:a16="http://schemas.microsoft.com/office/drawing/2014/main" xmlns="" id="{5C7DD506-50B1-460C-BA22-4C94A74330EA}"/>
+                <a16:creationId xmlns:a16="http://schemas.microsoft.com/office/drawing/2014/main" id="{5C7DD506-50B1-460C-BA22-4C94A74330EA}"/>
               </a:ext>
             </a:extLst>
           </p:cNvPr>
@@ -5417,6 +5418,1838 @@
   <p:clrMapOvr>
     <a:masterClrMapping/>
   </p:clrMapOvr>
+</p:sld>
+</file>
+
+<file path=ppt/slides/slide3.xml><?xml version="1.0" encoding="utf-8"?>
+<p:sld xmlns:a="http://schemas.openxmlformats.org/drawingml/2006/main" xmlns:r="http://schemas.openxmlformats.org/officeDocument/2006/relationships" xmlns:p="http://schemas.openxmlformats.org/presentationml/2006/main">
+  <p:cSld>
+    <p:spTree>
+      <p:nvGrpSpPr>
+        <p:cNvPr id="1" name=""/>
+        <p:cNvGrpSpPr/>
+        <p:nvPr/>
+      </p:nvGrpSpPr>
+      <p:grpSpPr>
+        <a:xfrm>
+          <a:off x="0" y="0"/>
+          <a:ext cx="0" cy="0"/>
+          <a:chOff x="0" y="0"/>
+          <a:chExt cx="0" cy="0"/>
+        </a:xfrm>
+      </p:grpSpPr>
+      <p:pic>
+        <p:nvPicPr>
+          <p:cNvPr id="32" name="Imagem 31" descr="Ícone&#10;&#10;Descrição gerada automaticamente">
+            <a:extLst>
+              <a:ext uri="{FF2B5EF4-FFF2-40B4-BE49-F238E27FC236}">
+                <a16:creationId xmlns:a16="http://schemas.microsoft.com/office/drawing/2014/main" id="{63AD9E9B-E7CD-43FB-B6D0-A4BA25762E77}"/>
+              </a:ext>
+            </a:extLst>
+          </p:cNvPr>
+          <p:cNvPicPr>
+            <a:picLocks noChangeAspect="1"/>
+          </p:cNvPicPr>
+          <p:nvPr/>
+        </p:nvPicPr>
+        <p:blipFill>
+          <a:blip r:embed="rId2">
+            <a:extLst>
+              <a:ext uri="{28A0092B-C50C-407E-A947-70E740481C1C}">
+                <a14:useLocalDpi xmlns:a14="http://schemas.microsoft.com/office/drawing/2010/main" val="0"/>
+              </a:ext>
+            </a:extLst>
+          </a:blip>
+          <a:stretch>
+            <a:fillRect/>
+          </a:stretch>
+        </p:blipFill>
+        <p:spPr>
+          <a:xfrm>
+            <a:off x="2291561" y="1551058"/>
+            <a:ext cx="760751" cy="737395"/>
+          </a:xfrm>
+          <a:prstGeom prst="rect">
+            <a:avLst/>
+          </a:prstGeom>
+        </p:spPr>
+      </p:pic>
+      <p:pic>
+        <p:nvPicPr>
+          <p:cNvPr id="43" name="Imagem 42" descr="Forma&#10;&#10;Descrição gerada automaticamente">
+            <a:extLst>
+              <a:ext uri="{FF2B5EF4-FFF2-40B4-BE49-F238E27FC236}">
+                <a16:creationId xmlns:a16="http://schemas.microsoft.com/office/drawing/2014/main" id="{02EFC7BC-B3DC-409C-BAC5-710BDBE5CCB2}"/>
+              </a:ext>
+            </a:extLst>
+          </p:cNvPr>
+          <p:cNvPicPr>
+            <a:picLocks noChangeAspect="1"/>
+          </p:cNvPicPr>
+          <p:nvPr/>
+        </p:nvPicPr>
+        <p:blipFill rotWithShape="1">
+          <a:blip r:embed="rId3">
+            <a:extLst>
+              <a:ext uri="{28A0092B-C50C-407E-A947-70E740481C1C}">
+                <a14:useLocalDpi xmlns:a14="http://schemas.microsoft.com/office/drawing/2010/main" val="0"/>
+              </a:ext>
+            </a:extLst>
+          </a:blip>
+          <a:srcRect l="1522" t="2780" r="-356" b="3946"/>
+          <a:stretch/>
+        </p:blipFill>
+        <p:spPr>
+          <a:xfrm>
+            <a:off x="323100" y="780380"/>
+            <a:ext cx="3756136" cy="1965281"/>
+          </a:xfrm>
+          <a:prstGeom prst="rect">
+            <a:avLst/>
+          </a:prstGeom>
+        </p:spPr>
+      </p:pic>
+      <p:pic>
+        <p:nvPicPr>
+          <p:cNvPr id="24" name="Imagem 23" descr="Forma&#10;&#10;Descrição gerada automaticamente">
+            <a:extLst>
+              <a:ext uri="{FF2B5EF4-FFF2-40B4-BE49-F238E27FC236}">
+                <a16:creationId xmlns:a16="http://schemas.microsoft.com/office/drawing/2014/main" id="{5C7DD506-50B1-460C-BA22-4C94A74330EA}"/>
+              </a:ext>
+            </a:extLst>
+          </p:cNvPr>
+          <p:cNvPicPr>
+            <a:picLocks noChangeAspect="1"/>
+          </p:cNvPicPr>
+          <p:nvPr/>
+        </p:nvPicPr>
+        <p:blipFill rotWithShape="1">
+          <a:blip r:embed="rId3">
+            <a:extLst>
+              <a:ext uri="{28A0092B-C50C-407E-A947-70E740481C1C}">
+                <a14:useLocalDpi xmlns:a14="http://schemas.microsoft.com/office/drawing/2010/main" val="0"/>
+              </a:ext>
+            </a:extLst>
+          </a:blip>
+          <a:srcRect l="1522" t="2780" r="-356" b="3946"/>
+          <a:stretch/>
+        </p:blipFill>
+        <p:spPr>
+          <a:xfrm>
+            <a:off x="6451701" y="206514"/>
+            <a:ext cx="5115284" cy="2676413"/>
+          </a:xfrm>
+          <a:prstGeom prst="rect">
+            <a:avLst/>
+          </a:prstGeom>
+        </p:spPr>
+      </p:pic>
+      <p:pic>
+        <p:nvPicPr>
+          <p:cNvPr id="16" name="Imagem 15">
+            <a:extLst>
+              <a:ext uri="{FF2B5EF4-FFF2-40B4-BE49-F238E27FC236}">
+                <a16:creationId xmlns:a16="http://schemas.microsoft.com/office/drawing/2014/main" id="{F080E30E-48F9-44E0-BB36-75BC3D0889E5}"/>
+              </a:ext>
+            </a:extLst>
+          </p:cNvPr>
+          <p:cNvPicPr>
+            <a:picLocks noChangeAspect="1"/>
+          </p:cNvPicPr>
+          <p:nvPr/>
+        </p:nvPicPr>
+        <p:blipFill>
+          <a:blip r:embed="rId4" cstate="print">
+            <a:extLst>
+              <a:ext uri="{28A0092B-C50C-407E-A947-70E740481C1C}">
+                <a14:useLocalDpi xmlns:a14="http://schemas.microsoft.com/office/drawing/2010/main" val="0"/>
+              </a:ext>
+            </a:extLst>
+          </a:blip>
+          <a:stretch>
+            <a:fillRect/>
+          </a:stretch>
+        </p:blipFill>
+        <p:spPr>
+          <a:xfrm>
+            <a:off x="470498" y="4330934"/>
+            <a:ext cx="2944867" cy="2325843"/>
+          </a:xfrm>
+          <a:prstGeom prst="rect">
+            <a:avLst/>
+          </a:prstGeom>
+        </p:spPr>
+      </p:pic>
+      <p:pic>
+        <p:nvPicPr>
+          <p:cNvPr id="91" name="Imagem 90">
+            <a:extLst>
+              <a:ext uri="{FF2B5EF4-FFF2-40B4-BE49-F238E27FC236}">
+                <a16:creationId xmlns:a16="http://schemas.microsoft.com/office/drawing/2014/main" id="{413FCE52-9E42-42C4-8D09-B45934FDA216}"/>
+              </a:ext>
+            </a:extLst>
+          </p:cNvPr>
+          <p:cNvPicPr>
+            <a:picLocks noChangeAspect="1"/>
+          </p:cNvPicPr>
+          <p:nvPr/>
+        </p:nvPicPr>
+        <p:blipFill>
+          <a:blip r:embed="rId5" cstate="print">
+            <a:extLst>
+              <a:ext uri="{28A0092B-C50C-407E-A947-70E740481C1C}">
+                <a14:useLocalDpi xmlns:a14="http://schemas.microsoft.com/office/drawing/2010/main" val="0"/>
+              </a:ext>
+            </a:extLst>
+          </a:blip>
+          <a:stretch>
+            <a:fillRect/>
+          </a:stretch>
+        </p:blipFill>
+        <p:spPr>
+          <a:xfrm>
+            <a:off x="8533752" y="4466536"/>
+            <a:ext cx="2509404" cy="1981917"/>
+          </a:xfrm>
+          <a:prstGeom prst="rect">
+            <a:avLst/>
+          </a:prstGeom>
+        </p:spPr>
+      </p:pic>
+      <p:pic>
+        <p:nvPicPr>
+          <p:cNvPr id="93" name="Imagem 92">
+            <a:extLst>
+              <a:ext uri="{FF2B5EF4-FFF2-40B4-BE49-F238E27FC236}">
+                <a16:creationId xmlns:a16="http://schemas.microsoft.com/office/drawing/2014/main" id="{63E9CCF7-0455-42A7-B3B4-AEC2412E858C}"/>
+              </a:ext>
+            </a:extLst>
+          </p:cNvPr>
+          <p:cNvPicPr>
+            <a:picLocks noChangeAspect="1"/>
+          </p:cNvPicPr>
+          <p:nvPr/>
+        </p:nvPicPr>
+        <p:blipFill>
+          <a:blip r:embed="rId6" cstate="print">
+            <a:extLst>
+              <a:ext uri="{28A0092B-C50C-407E-A947-70E740481C1C}">
+                <a14:useLocalDpi xmlns:a14="http://schemas.microsoft.com/office/drawing/2010/main" val="0"/>
+              </a:ext>
+            </a:extLst>
+          </a:blip>
+          <a:stretch>
+            <a:fillRect/>
+          </a:stretch>
+        </p:blipFill>
+        <p:spPr>
+          <a:xfrm>
+            <a:off x="8276657" y="4401210"/>
+            <a:ext cx="519499" cy="519499"/>
+          </a:xfrm>
+          <a:prstGeom prst="rect">
+            <a:avLst/>
+          </a:prstGeom>
+        </p:spPr>
+      </p:pic>
+      <p:pic>
+        <p:nvPicPr>
+          <p:cNvPr id="94" name="Imagem 93">
+            <a:extLst>
+              <a:ext uri="{FF2B5EF4-FFF2-40B4-BE49-F238E27FC236}">
+                <a16:creationId xmlns:a16="http://schemas.microsoft.com/office/drawing/2014/main" id="{B79F862E-D809-4A78-AAE4-6CF63FB26508}"/>
+              </a:ext>
+            </a:extLst>
+          </p:cNvPr>
+          <p:cNvPicPr>
+            <a:picLocks noChangeAspect="1"/>
+          </p:cNvPicPr>
+          <p:nvPr/>
+        </p:nvPicPr>
+        <p:blipFill>
+          <a:blip r:embed="rId6" cstate="print">
+            <a:extLst>
+              <a:ext uri="{28A0092B-C50C-407E-A947-70E740481C1C}">
+                <a14:useLocalDpi xmlns:a14="http://schemas.microsoft.com/office/drawing/2010/main" val="0"/>
+              </a:ext>
+            </a:extLst>
+          </a:blip>
+          <a:stretch>
+            <a:fillRect/>
+          </a:stretch>
+        </p:blipFill>
+        <p:spPr>
+          <a:xfrm>
+            <a:off x="3158761" y="4244315"/>
+            <a:ext cx="510968" cy="510968"/>
+          </a:xfrm>
+          <a:prstGeom prst="rect">
+            <a:avLst/>
+          </a:prstGeom>
+        </p:spPr>
+      </p:pic>
+      <p:pic>
+        <p:nvPicPr>
+          <p:cNvPr id="97" name="Imagem 96">
+            <a:extLst>
+              <a:ext uri="{FF2B5EF4-FFF2-40B4-BE49-F238E27FC236}">
+                <a16:creationId xmlns:a16="http://schemas.microsoft.com/office/drawing/2014/main" id="{1E1D9264-4478-4D21-90D1-CC0A88EEBE02}"/>
+              </a:ext>
+            </a:extLst>
+          </p:cNvPr>
+          <p:cNvPicPr>
+            <a:picLocks noChangeAspect="1"/>
+          </p:cNvPicPr>
+          <p:nvPr/>
+        </p:nvPicPr>
+        <p:blipFill>
+          <a:blip r:embed="rId6" cstate="print">
+            <a:extLst>
+              <a:ext uri="{28A0092B-C50C-407E-A947-70E740481C1C}">
+                <a14:useLocalDpi xmlns:a14="http://schemas.microsoft.com/office/drawing/2010/main" val="0"/>
+              </a:ext>
+            </a:extLst>
+          </a:blip>
+          <a:stretch>
+            <a:fillRect/>
+          </a:stretch>
+        </p:blipFill>
+        <p:spPr>
+          <a:xfrm>
+            <a:off x="11321896" y="4788111"/>
+            <a:ext cx="381592" cy="381592"/>
+          </a:xfrm>
+          <a:prstGeom prst="rect">
+            <a:avLst/>
+          </a:prstGeom>
+        </p:spPr>
+      </p:pic>
+      <p:pic>
+        <p:nvPicPr>
+          <p:cNvPr id="110" name="Imagem 109">
+            <a:extLst>
+              <a:ext uri="{FF2B5EF4-FFF2-40B4-BE49-F238E27FC236}">
+                <a16:creationId xmlns:a16="http://schemas.microsoft.com/office/drawing/2014/main" id="{48EAE7C9-853C-4C62-BE4F-77E1FF7A2142}"/>
+              </a:ext>
+            </a:extLst>
+          </p:cNvPr>
+          <p:cNvPicPr>
+            <a:picLocks noChangeAspect="1"/>
+          </p:cNvPicPr>
+          <p:nvPr/>
+        </p:nvPicPr>
+        <p:blipFill>
+          <a:blip r:embed="rId7" cstate="print">
+            <a:extLst>
+              <a:ext uri="{28A0092B-C50C-407E-A947-70E740481C1C}">
+                <a14:useLocalDpi xmlns:a14="http://schemas.microsoft.com/office/drawing/2010/main" val="0"/>
+              </a:ext>
+            </a:extLst>
+          </a:blip>
+          <a:stretch>
+            <a:fillRect/>
+          </a:stretch>
+        </p:blipFill>
+        <p:spPr>
+          <a:xfrm>
+            <a:off x="9130676" y="4820510"/>
+            <a:ext cx="374514" cy="374514"/>
+          </a:xfrm>
+          <a:prstGeom prst="rect">
+            <a:avLst/>
+          </a:prstGeom>
+        </p:spPr>
+      </p:pic>
+      <p:pic>
+        <p:nvPicPr>
+          <p:cNvPr id="113" name="Imagem 112">
+            <a:extLst>
+              <a:ext uri="{FF2B5EF4-FFF2-40B4-BE49-F238E27FC236}">
+                <a16:creationId xmlns:a16="http://schemas.microsoft.com/office/drawing/2014/main" id="{3A0A7C0D-5AAE-4386-8F96-FE545AB5180F}"/>
+              </a:ext>
+            </a:extLst>
+          </p:cNvPr>
+          <p:cNvPicPr>
+            <a:picLocks noChangeAspect="1"/>
+          </p:cNvPicPr>
+          <p:nvPr/>
+        </p:nvPicPr>
+        <p:blipFill>
+          <a:blip r:embed="rId8" cstate="print">
+            <a:extLst>
+              <a:ext uri="{28A0092B-C50C-407E-A947-70E740481C1C}">
+                <a14:useLocalDpi xmlns:a14="http://schemas.microsoft.com/office/drawing/2010/main" val="0"/>
+              </a:ext>
+            </a:extLst>
+          </a:blip>
+          <a:stretch>
+            <a:fillRect/>
+          </a:stretch>
+        </p:blipFill>
+        <p:spPr>
+          <a:xfrm>
+            <a:off x="9484224" y="4691264"/>
+            <a:ext cx="615235" cy="615235"/>
+          </a:xfrm>
+          <a:prstGeom prst="rect">
+            <a:avLst/>
+          </a:prstGeom>
+        </p:spPr>
+      </p:pic>
+      <p:pic>
+        <p:nvPicPr>
+          <p:cNvPr id="115" name="Imagem 114">
+            <a:extLst>
+              <a:ext uri="{FF2B5EF4-FFF2-40B4-BE49-F238E27FC236}">
+                <a16:creationId xmlns:a16="http://schemas.microsoft.com/office/drawing/2014/main" id="{3C1B681C-ED12-41C5-AD26-8B6853414F1D}"/>
+              </a:ext>
+            </a:extLst>
+          </p:cNvPr>
+          <p:cNvPicPr>
+            <a:picLocks noChangeAspect="1"/>
+          </p:cNvPicPr>
+          <p:nvPr/>
+        </p:nvPicPr>
+        <p:blipFill>
+          <a:blip r:embed="rId9" cstate="print">
+            <a:extLst>
+              <a:ext uri="{28A0092B-C50C-407E-A947-70E740481C1C}">
+                <a14:useLocalDpi xmlns:a14="http://schemas.microsoft.com/office/drawing/2010/main" val="0"/>
+              </a:ext>
+            </a:extLst>
+          </a:blip>
+          <a:stretch>
+            <a:fillRect/>
+          </a:stretch>
+        </p:blipFill>
+        <p:spPr>
+          <a:xfrm>
+            <a:off x="10048596" y="4778771"/>
+            <a:ext cx="408113" cy="408113"/>
+          </a:xfrm>
+          <a:prstGeom prst="rect">
+            <a:avLst/>
+          </a:prstGeom>
+        </p:spPr>
+      </p:pic>
+      <p:sp>
+        <p:nvSpPr>
+          <p:cNvPr id="2" name="Retângulo 1">
+            <a:extLst>
+              <a:ext uri="{FF2B5EF4-FFF2-40B4-BE49-F238E27FC236}">
+                <a16:creationId xmlns:a16="http://schemas.microsoft.com/office/drawing/2014/main" id="{969E54A0-B7B5-4147-AB27-DA0CC75F47BD}"/>
+              </a:ext>
+            </a:extLst>
+          </p:cNvPr>
+          <p:cNvSpPr/>
+          <p:nvPr/>
+        </p:nvSpPr>
+        <p:spPr>
+          <a:xfrm>
+            <a:off x="120981" y="3939522"/>
+            <a:ext cx="3958255" cy="2822003"/>
+          </a:xfrm>
+          <a:prstGeom prst="rect">
+            <a:avLst/>
+          </a:prstGeom>
+          <a:noFill/>
+          <a:ln>
+            <a:solidFill>
+              <a:schemeClr val="tx1"/>
+            </a:solidFill>
+          </a:ln>
+        </p:spPr>
+        <p:style>
+          <a:lnRef idx="2">
+            <a:schemeClr val="accent1">
+              <a:shade val="50000"/>
+            </a:schemeClr>
+          </a:lnRef>
+          <a:fillRef idx="1">
+            <a:schemeClr val="accent1"/>
+          </a:fillRef>
+          <a:effectRef idx="0">
+            <a:schemeClr val="accent1"/>
+          </a:effectRef>
+          <a:fontRef idx="minor">
+            <a:schemeClr val="lt1"/>
+          </a:fontRef>
+        </p:style>
+        <p:txBody>
+          <a:bodyPr rtlCol="0" anchor="ctr"/>
+          <a:lstStyle/>
+          <a:p>
+            <a:pPr algn="ctr"/>
+            <a:endParaRPr lang="pt-BR"/>
+          </a:p>
+        </p:txBody>
+      </p:sp>
+      <p:sp>
+        <p:nvSpPr>
+          <p:cNvPr id="5" name="CaixaDeTexto 4">
+            <a:extLst>
+              <a:ext uri="{FF2B5EF4-FFF2-40B4-BE49-F238E27FC236}">
+                <a16:creationId xmlns:a16="http://schemas.microsoft.com/office/drawing/2014/main" id="{00324186-5835-453F-9CA7-D8BA2FE4FDB1}"/>
+              </a:ext>
+            </a:extLst>
+          </p:cNvPr>
+          <p:cNvSpPr txBox="1"/>
+          <p:nvPr/>
+        </p:nvSpPr>
+        <p:spPr>
+          <a:xfrm>
+            <a:off x="11332156" y="3595568"/>
+            <a:ext cx="1168252" cy="646331"/>
+          </a:xfrm>
+          <a:prstGeom prst="rect">
+            <a:avLst/>
+          </a:prstGeom>
+          <a:noFill/>
+        </p:spPr>
+        <p:txBody>
+          <a:bodyPr wrap="square" rtlCol="0">
+            <a:spAutoFit/>
+          </a:bodyPr>
+          <a:lstStyle/>
+          <a:p>
+            <a:r>
+              <a:rPr lang="pt-BR" dirty="0"/>
+              <a:t>Gestor</a:t>
+            </a:r>
+            <a:endParaRPr lang="pt-BR" sz="1600" dirty="0"/>
+          </a:p>
+          <a:p>
+            <a:endParaRPr lang="pt-BR" dirty="0"/>
+          </a:p>
+        </p:txBody>
+      </p:sp>
+      <p:sp>
+        <p:nvSpPr>
+          <p:cNvPr id="8" name="CaixaDeTexto 7">
+            <a:extLst>
+              <a:ext uri="{FF2B5EF4-FFF2-40B4-BE49-F238E27FC236}">
+                <a16:creationId xmlns:a16="http://schemas.microsoft.com/office/drawing/2014/main" id="{C6B4F186-1182-4828-8066-2E561878460C}"/>
+              </a:ext>
+            </a:extLst>
+          </p:cNvPr>
+          <p:cNvSpPr txBox="1"/>
+          <p:nvPr/>
+        </p:nvSpPr>
+        <p:spPr>
+          <a:xfrm>
+            <a:off x="70363" y="3550825"/>
+            <a:ext cx="1454885" cy="369332"/>
+          </a:xfrm>
+          <a:prstGeom prst="rect">
+            <a:avLst/>
+          </a:prstGeom>
+          <a:noFill/>
+        </p:spPr>
+        <p:txBody>
+          <a:bodyPr wrap="square" rtlCol="0">
+            <a:spAutoFit/>
+          </a:bodyPr>
+          <a:lstStyle/>
+          <a:p>
+            <a:r>
+              <a:rPr lang="pt-BR" dirty="0"/>
+              <a:t>Funcionário</a:t>
+            </a:r>
+          </a:p>
+        </p:txBody>
+      </p:sp>
+      <p:pic>
+        <p:nvPicPr>
+          <p:cNvPr id="14" name="Imagem 13" descr="Logotipo, nome da empresa&#10;&#10;Descrição gerada automaticamente">
+            <a:extLst>
+              <a:ext uri="{FF2B5EF4-FFF2-40B4-BE49-F238E27FC236}">
+                <a16:creationId xmlns:a16="http://schemas.microsoft.com/office/drawing/2014/main" id="{C131E45E-AAA8-4092-97F7-314E8411F05B}"/>
+              </a:ext>
+            </a:extLst>
+          </p:cNvPr>
+          <p:cNvPicPr>
+            <a:picLocks noChangeAspect="1"/>
+          </p:cNvPicPr>
+          <p:nvPr/>
+        </p:nvPicPr>
+        <p:blipFill>
+          <a:blip r:embed="rId10" cstate="print">
+            <a:extLst>
+              <a:ext uri="{28A0092B-C50C-407E-A947-70E740481C1C}">
+                <a14:useLocalDpi xmlns:a14="http://schemas.microsoft.com/office/drawing/2010/main" val="0"/>
+              </a:ext>
+            </a:extLst>
+          </a:blip>
+          <a:stretch>
+            <a:fillRect/>
+          </a:stretch>
+        </p:blipFill>
+        <p:spPr>
+          <a:xfrm>
+            <a:off x="1063232" y="5096589"/>
+            <a:ext cx="447427" cy="447427"/>
+          </a:xfrm>
+          <a:prstGeom prst="rect">
+            <a:avLst/>
+          </a:prstGeom>
+        </p:spPr>
+      </p:pic>
+      <p:pic>
+        <p:nvPicPr>
+          <p:cNvPr id="6" name="Picture 4">
+            <a:extLst>
+              <a:ext uri="{FF2B5EF4-FFF2-40B4-BE49-F238E27FC236}">
+                <a16:creationId xmlns:a16="http://schemas.microsoft.com/office/drawing/2014/main" id="{459310AC-F268-4178-A4E9-B2C3E8E97734}"/>
+              </a:ext>
+            </a:extLst>
+          </p:cNvPr>
+          <p:cNvPicPr>
+            <a:picLocks noChangeAspect="1" noChangeArrowheads="1"/>
+          </p:cNvPicPr>
+          <p:nvPr/>
+        </p:nvPicPr>
+        <p:blipFill>
+          <a:blip r:embed="rId11" cstate="print">
+            <a:extLst>
+              <a:ext uri="{28A0092B-C50C-407E-A947-70E740481C1C}">
+                <a14:useLocalDpi xmlns:a14="http://schemas.microsoft.com/office/drawing/2010/main" val="0"/>
+              </a:ext>
+            </a:extLst>
+          </a:blip>
+          <a:srcRect/>
+          <a:stretch>
+            <a:fillRect/>
+          </a:stretch>
+        </p:blipFill>
+        <p:spPr bwMode="auto">
+          <a:xfrm>
+            <a:off x="10407256" y="376802"/>
+            <a:ext cx="1328647" cy="384063"/>
+          </a:xfrm>
+          <a:prstGeom prst="rect">
+            <a:avLst/>
+          </a:prstGeom>
+          <a:noFill/>
+          <a:extLst>
+            <a:ext uri="{909E8E84-426E-40DD-AFC4-6F175D3DCCD1}">
+              <a14:hiddenFill xmlns:a14="http://schemas.microsoft.com/office/drawing/2010/main">
+                <a:solidFill>
+                  <a:srgbClr val="FFFFFF"/>
+                </a:solidFill>
+              </a14:hiddenFill>
+            </a:ext>
+          </a:extLst>
+        </p:spPr>
+      </p:pic>
+      <p:sp>
+        <p:nvSpPr>
+          <p:cNvPr id="9" name="Retângulo 8">
+            <a:extLst>
+              <a:ext uri="{FF2B5EF4-FFF2-40B4-BE49-F238E27FC236}">
+                <a16:creationId xmlns:a16="http://schemas.microsoft.com/office/drawing/2014/main" id="{A2895AD6-3034-4EE2-8F53-A1BC76FBF2D0}"/>
+              </a:ext>
+            </a:extLst>
+          </p:cNvPr>
+          <p:cNvSpPr/>
+          <p:nvPr/>
+        </p:nvSpPr>
+        <p:spPr>
+          <a:xfrm>
+            <a:off x="2415582" y="3545209"/>
+            <a:ext cx="595753" cy="445305"/>
+          </a:xfrm>
+          <a:prstGeom prst="rect">
+            <a:avLst/>
+          </a:prstGeom>
+          <a:solidFill>
+            <a:schemeClr val="bg1"/>
+          </a:solidFill>
+          <a:ln>
+            <a:noFill/>
+          </a:ln>
+        </p:spPr>
+        <p:style>
+          <a:lnRef idx="2">
+            <a:schemeClr val="accent1">
+              <a:shade val="50000"/>
+            </a:schemeClr>
+          </a:lnRef>
+          <a:fillRef idx="1">
+            <a:schemeClr val="accent1"/>
+          </a:fillRef>
+          <a:effectRef idx="0">
+            <a:schemeClr val="accent1"/>
+          </a:effectRef>
+          <a:fontRef idx="minor">
+            <a:schemeClr val="lt1"/>
+          </a:fontRef>
+        </p:style>
+        <p:txBody>
+          <a:bodyPr rtlCol="0" anchor="ctr"/>
+          <a:lstStyle/>
+          <a:p>
+            <a:pPr algn="ctr"/>
+            <a:endParaRPr lang="pt-BR"/>
+          </a:p>
+        </p:txBody>
+      </p:sp>
+      <p:pic>
+        <p:nvPicPr>
+          <p:cNvPr id="7" name="Picture 10" descr="Amazon Web Services - Wikipedia">
+            <a:extLst>
+              <a:ext uri="{FF2B5EF4-FFF2-40B4-BE49-F238E27FC236}">
+                <a16:creationId xmlns:a16="http://schemas.microsoft.com/office/drawing/2014/main" id="{4484FA0D-09D2-41AD-9A5C-AA5C5431D5FE}"/>
+              </a:ext>
+            </a:extLst>
+          </p:cNvPr>
+          <p:cNvPicPr>
+            <a:picLocks noChangeAspect="1" noChangeArrowheads="1"/>
+          </p:cNvPicPr>
+          <p:nvPr/>
+        </p:nvPicPr>
+        <p:blipFill>
+          <a:blip r:embed="rId12" cstate="print">
+            <a:extLst>
+              <a:ext uri="{28A0092B-C50C-407E-A947-70E740481C1C}">
+                <a14:useLocalDpi xmlns:a14="http://schemas.microsoft.com/office/drawing/2010/main" val="0"/>
+              </a:ext>
+            </a:extLst>
+          </a:blip>
+          <a:srcRect/>
+          <a:stretch>
+            <a:fillRect/>
+          </a:stretch>
+        </p:blipFill>
+        <p:spPr bwMode="auto">
+          <a:xfrm>
+            <a:off x="2361909" y="3774525"/>
+            <a:ext cx="703098" cy="361931"/>
+          </a:xfrm>
+          <a:prstGeom prst="rect">
+            <a:avLst/>
+          </a:prstGeom>
+          <a:noFill/>
+          <a:extLst>
+            <a:ext uri="{909E8E84-426E-40DD-AFC4-6F175D3DCCD1}">
+              <a14:hiddenFill xmlns:a14="http://schemas.microsoft.com/office/drawing/2010/main">
+                <a:solidFill>
+                  <a:srgbClr val="FFFFFF"/>
+                </a:solidFill>
+              </a14:hiddenFill>
+            </a:ext>
+          </a:extLst>
+        </p:spPr>
+      </p:pic>
+      <p:pic>
+        <p:nvPicPr>
+          <p:cNvPr id="10" name="Imagem 9"/>
+          <p:cNvPicPr>
+            <a:picLocks noChangeAspect="1"/>
+          </p:cNvPicPr>
+          <p:nvPr/>
+        </p:nvPicPr>
+        <p:blipFill rotWithShape="1">
+          <a:blip r:embed="rId13"/>
+          <a:srcRect l="9121" t="320" r="8400" b="-320"/>
+          <a:stretch/>
+        </p:blipFill>
+        <p:spPr>
+          <a:xfrm>
+            <a:off x="10551142" y="1798095"/>
+            <a:ext cx="702832" cy="360454"/>
+          </a:xfrm>
+          <a:prstGeom prst="rect">
+            <a:avLst/>
+          </a:prstGeom>
+        </p:spPr>
+      </p:pic>
+      <p:sp>
+        <p:nvSpPr>
+          <p:cNvPr id="13" name="AutoShape 4" descr="HTML5 – Wikipédia, a enciclopédia livre"/>
+          <p:cNvSpPr>
+            <a:spLocks noChangeAspect="1" noChangeArrowheads="1"/>
+          </p:cNvSpPr>
+          <p:nvPr/>
+        </p:nvSpPr>
+        <p:spPr bwMode="auto">
+          <a:xfrm>
+            <a:off x="155575" y="-144463"/>
+            <a:ext cx="304800" cy="304801"/>
+          </a:xfrm>
+          <a:prstGeom prst="rect">
+            <a:avLst/>
+          </a:prstGeom>
+          <a:noFill/>
+          <a:extLst>
+            <a:ext uri="{909E8E84-426E-40DD-AFC4-6F175D3DCCD1}">
+              <a14:hiddenFill xmlns:a14="http://schemas.microsoft.com/office/drawing/2010/main">
+                <a:solidFill>
+                  <a:srgbClr val="FFFFFF"/>
+                </a:solidFill>
+              </a14:hiddenFill>
+            </a:ext>
+          </a:extLst>
+        </p:spPr>
+        <p:txBody>
+          <a:bodyPr vert="horz" wrap="square" lIns="91440" tIns="45720" rIns="91440" bIns="45720" numCol="1" anchor="t" anchorCtr="0" compatLnSpc="1">
+            <a:prstTxWarp prst="textNoShape">
+              <a:avLst/>
+            </a:prstTxWarp>
+          </a:bodyPr>
+          <a:lstStyle/>
+          <a:p>
+            <a:endParaRPr lang="pt-BR"/>
+          </a:p>
+        </p:txBody>
+      </p:sp>
+      <p:pic>
+        <p:nvPicPr>
+          <p:cNvPr id="19" name="Imagem 18"/>
+          <p:cNvPicPr>
+            <a:picLocks noChangeAspect="1"/>
+          </p:cNvPicPr>
+          <p:nvPr/>
+        </p:nvPicPr>
+        <p:blipFill>
+          <a:blip r:embed="rId14"/>
+          <a:stretch>
+            <a:fillRect/>
+          </a:stretch>
+        </p:blipFill>
+        <p:spPr>
+          <a:xfrm>
+            <a:off x="8490063" y="1643048"/>
+            <a:ext cx="683157" cy="683157"/>
+          </a:xfrm>
+          <a:prstGeom prst="rect">
+            <a:avLst/>
+          </a:prstGeom>
+        </p:spPr>
+      </p:pic>
+      <p:pic>
+        <p:nvPicPr>
+          <p:cNvPr id="25" name="Imagem 24"/>
+          <p:cNvPicPr>
+            <a:picLocks noChangeAspect="1"/>
+          </p:cNvPicPr>
+          <p:nvPr/>
+        </p:nvPicPr>
+        <p:blipFill rotWithShape="1">
+          <a:blip r:embed="rId15"/>
+          <a:srcRect l="35681" t="14554" r="34566" b="10328"/>
+          <a:stretch/>
+        </p:blipFill>
+        <p:spPr>
+          <a:xfrm>
+            <a:off x="9817063" y="1564060"/>
+            <a:ext cx="491390" cy="697832"/>
+          </a:xfrm>
+          <a:prstGeom prst="rect">
+            <a:avLst/>
+          </a:prstGeom>
+        </p:spPr>
+      </p:pic>
+      <p:pic>
+        <p:nvPicPr>
+          <p:cNvPr id="1030" name="Picture 6" descr="O que é JavaScript - Portal GSTI"/>
+          <p:cNvPicPr>
+            <a:picLocks noChangeAspect="1" noChangeArrowheads="1"/>
+          </p:cNvPicPr>
+          <p:nvPr/>
+        </p:nvPicPr>
+        <p:blipFill>
+          <a:blip r:embed="rId16" cstate="print">
+            <a:extLst>
+              <a:ext uri="{28A0092B-C50C-407E-A947-70E740481C1C}">
+                <a14:useLocalDpi xmlns:a14="http://schemas.microsoft.com/office/drawing/2010/main" val="0"/>
+              </a:ext>
+            </a:extLst>
+          </a:blip>
+          <a:srcRect/>
+          <a:stretch>
+            <a:fillRect/>
+          </a:stretch>
+        </p:blipFill>
+        <p:spPr bwMode="auto">
+          <a:xfrm>
+            <a:off x="9105297" y="1643048"/>
+            <a:ext cx="683157" cy="683157"/>
+          </a:xfrm>
+          <a:prstGeom prst="rect">
+            <a:avLst/>
+          </a:prstGeom>
+          <a:noFill/>
+          <a:extLst>
+            <a:ext uri="{909E8E84-426E-40DD-AFC4-6F175D3DCCD1}">
+              <a14:hiddenFill xmlns:a14="http://schemas.microsoft.com/office/drawing/2010/main">
+                <a:solidFill>
+                  <a:srgbClr val="FFFFFF"/>
+                </a:solidFill>
+              </a14:hiddenFill>
+            </a:ext>
+          </a:extLst>
+        </p:spPr>
+      </p:pic>
+      <p:grpSp>
+        <p:nvGrpSpPr>
+          <p:cNvPr id="21" name="Agrupar 20">
+            <a:extLst>
+              <a:ext uri="{FF2B5EF4-FFF2-40B4-BE49-F238E27FC236}">
+                <a16:creationId xmlns:a16="http://schemas.microsoft.com/office/drawing/2014/main" id="{1550788F-EA80-4E29-BE8A-2E903471849F}"/>
+              </a:ext>
+            </a:extLst>
+          </p:cNvPr>
+          <p:cNvGrpSpPr/>
+          <p:nvPr/>
+        </p:nvGrpSpPr>
+        <p:grpSpPr>
+          <a:xfrm>
+            <a:off x="5642223" y="4686095"/>
+            <a:ext cx="907553" cy="1156876"/>
+            <a:chOff x="742233" y="1428136"/>
+            <a:chExt cx="976966" cy="1379358"/>
+          </a:xfrm>
+        </p:grpSpPr>
+        <p:pic>
+          <p:nvPicPr>
+            <p:cNvPr id="1026" name="Picture 2" descr="Boas-vindas ao seu novo QG | Slack">
+              <a:extLst>
+                <a:ext uri="{FF2B5EF4-FFF2-40B4-BE49-F238E27FC236}">
+                  <a16:creationId xmlns:a16="http://schemas.microsoft.com/office/drawing/2014/main" id="{D2B9D5B0-D199-4A89-A00B-86E4BE07F467}"/>
+                </a:ext>
+              </a:extLst>
+            </p:cNvPr>
+            <p:cNvPicPr>
+              <a:picLocks noChangeAspect="1" noChangeArrowheads="1"/>
+            </p:cNvPicPr>
+            <p:nvPr/>
+          </p:nvPicPr>
+          <p:blipFill>
+            <a:blip r:embed="rId17" cstate="print">
+              <a:extLst>
+                <a:ext uri="{28A0092B-C50C-407E-A947-70E740481C1C}">
+                  <a14:useLocalDpi xmlns:a14="http://schemas.microsoft.com/office/drawing/2010/main" val="0"/>
+                </a:ext>
+              </a:extLst>
+            </a:blip>
+            <a:srcRect/>
+            <a:stretch>
+              <a:fillRect/>
+            </a:stretch>
+          </p:blipFill>
+          <p:spPr bwMode="auto">
+            <a:xfrm>
+              <a:off x="742233" y="1428136"/>
+              <a:ext cx="976966" cy="976966"/>
+            </a:xfrm>
+            <a:prstGeom prst="rect">
+              <a:avLst/>
+            </a:prstGeom>
+            <a:noFill/>
+            <a:extLst>
+              <a:ext uri="{909E8E84-426E-40DD-AFC4-6F175D3DCCD1}">
+                <a14:hiddenFill xmlns:a14="http://schemas.microsoft.com/office/drawing/2010/main">
+                  <a:solidFill>
+                    <a:srgbClr val="FFFFFF"/>
+                  </a:solidFill>
+                </a14:hiddenFill>
+              </a:ext>
+            </a:extLst>
+          </p:spPr>
+        </p:pic>
+        <p:sp>
+          <p:nvSpPr>
+            <p:cNvPr id="4" name="CaixaDeTexto 3">
+              <a:extLst>
+                <a:ext uri="{FF2B5EF4-FFF2-40B4-BE49-F238E27FC236}">
+                  <a16:creationId xmlns:a16="http://schemas.microsoft.com/office/drawing/2014/main" id="{D03018DC-DEBD-439B-B33A-3FD65D7934A5}"/>
+                </a:ext>
+              </a:extLst>
+            </p:cNvPr>
+            <p:cNvSpPr txBox="1"/>
+            <p:nvPr/>
+          </p:nvSpPr>
+          <p:spPr>
+            <a:xfrm>
+              <a:off x="841193" y="2438162"/>
+              <a:ext cx="863138" cy="369332"/>
+            </a:xfrm>
+            <a:prstGeom prst="rect">
+              <a:avLst/>
+            </a:prstGeom>
+            <a:noFill/>
+          </p:spPr>
+          <p:txBody>
+            <a:bodyPr wrap="square" rtlCol="0">
+              <a:spAutoFit/>
+            </a:bodyPr>
+            <a:lstStyle/>
+            <a:p>
+              <a:r>
+                <a:rPr lang="pt-BR" dirty="0"/>
+                <a:t>SLACK</a:t>
+              </a:r>
+            </a:p>
+          </p:txBody>
+        </p:sp>
+      </p:grpSp>
+      <p:pic>
+        <p:nvPicPr>
+          <p:cNvPr id="23" name="Imagem 22" descr="Logotipo, nome da empresa&#10;&#10;Descrição gerada automaticamente">
+            <a:extLst>
+              <a:ext uri="{FF2B5EF4-FFF2-40B4-BE49-F238E27FC236}">
+                <a16:creationId xmlns:a16="http://schemas.microsoft.com/office/drawing/2014/main" id="{430375AE-F10C-4E7F-AC5E-E4A9143A7746}"/>
+              </a:ext>
+            </a:extLst>
+          </p:cNvPr>
+          <p:cNvPicPr>
+            <a:picLocks noChangeAspect="1"/>
+          </p:cNvPicPr>
+          <p:nvPr/>
+        </p:nvPicPr>
+        <p:blipFill>
+          <a:blip r:embed="rId18" cstate="print">
+            <a:extLst>
+              <a:ext uri="{28A0092B-C50C-407E-A947-70E740481C1C}">
+                <a14:useLocalDpi xmlns:a14="http://schemas.microsoft.com/office/drawing/2010/main" val="0"/>
+              </a:ext>
+            </a:extLst>
+          </a:blip>
+          <a:stretch>
+            <a:fillRect/>
+          </a:stretch>
+        </p:blipFill>
+        <p:spPr>
+          <a:xfrm>
+            <a:off x="6598467" y="1601117"/>
+            <a:ext cx="1089399" cy="754409"/>
+          </a:xfrm>
+          <a:prstGeom prst="rect">
+            <a:avLst/>
+          </a:prstGeom>
+        </p:spPr>
+      </p:pic>
+      <p:pic>
+        <p:nvPicPr>
+          <p:cNvPr id="50" name="Imagem 49">
+            <a:extLst>
+              <a:ext uri="{FF2B5EF4-FFF2-40B4-BE49-F238E27FC236}">
+                <a16:creationId xmlns:a16="http://schemas.microsoft.com/office/drawing/2014/main" id="{B7B64E3D-9B7A-45F3-806A-B186144DA1C4}"/>
+              </a:ext>
+            </a:extLst>
+          </p:cNvPr>
+          <p:cNvPicPr>
+            <a:picLocks noChangeAspect="1"/>
+          </p:cNvPicPr>
+          <p:nvPr/>
+        </p:nvPicPr>
+        <p:blipFill>
+          <a:blip r:embed="rId19"/>
+          <a:stretch>
+            <a:fillRect/>
+          </a:stretch>
+        </p:blipFill>
+        <p:spPr>
+          <a:xfrm>
+            <a:off x="7792055" y="1669082"/>
+            <a:ext cx="736425" cy="618481"/>
+          </a:xfrm>
+          <a:prstGeom prst="rect">
+            <a:avLst/>
+          </a:prstGeom>
+        </p:spPr>
+      </p:pic>
+      <p:sp>
+        <p:nvSpPr>
+          <p:cNvPr id="54" name="Retângulo 53">
+            <a:extLst>
+              <a:ext uri="{FF2B5EF4-FFF2-40B4-BE49-F238E27FC236}">
+                <a16:creationId xmlns:a16="http://schemas.microsoft.com/office/drawing/2014/main" id="{F6769D6D-4C92-4616-B7A1-9AA9E96B528E}"/>
+              </a:ext>
+            </a:extLst>
+          </p:cNvPr>
+          <p:cNvSpPr/>
+          <p:nvPr/>
+        </p:nvSpPr>
+        <p:spPr>
+          <a:xfrm>
+            <a:off x="8121207" y="3975098"/>
+            <a:ext cx="3958255" cy="2799923"/>
+          </a:xfrm>
+          <a:prstGeom prst="rect">
+            <a:avLst/>
+          </a:prstGeom>
+          <a:noFill/>
+          <a:ln>
+            <a:solidFill>
+              <a:schemeClr val="tx1"/>
+            </a:solidFill>
+          </a:ln>
+        </p:spPr>
+        <p:style>
+          <a:lnRef idx="2">
+            <a:schemeClr val="accent1">
+              <a:shade val="50000"/>
+            </a:schemeClr>
+          </a:lnRef>
+          <a:fillRef idx="1">
+            <a:schemeClr val="accent1"/>
+          </a:fillRef>
+          <a:effectRef idx="0">
+            <a:schemeClr val="accent1"/>
+          </a:effectRef>
+          <a:fontRef idx="minor">
+            <a:schemeClr val="lt1"/>
+          </a:fontRef>
+        </p:style>
+        <p:txBody>
+          <a:bodyPr rtlCol="0" anchor="ctr"/>
+          <a:lstStyle/>
+          <a:p>
+            <a:pPr algn="ctr"/>
+            <a:endParaRPr lang="pt-BR"/>
+          </a:p>
+        </p:txBody>
+      </p:sp>
+      <p:pic>
+        <p:nvPicPr>
+          <p:cNvPr id="28" name="Imagem 27" descr="Imagem em preto e branco&#10;&#10;Descrição gerada automaticamente">
+            <a:extLst>
+              <a:ext uri="{FF2B5EF4-FFF2-40B4-BE49-F238E27FC236}">
+                <a16:creationId xmlns:a16="http://schemas.microsoft.com/office/drawing/2014/main" id="{2CC60A5A-32BC-4872-BEF8-F867013BB652}"/>
+              </a:ext>
+            </a:extLst>
+          </p:cNvPr>
+          <p:cNvPicPr>
+            <a:picLocks noChangeAspect="1"/>
+          </p:cNvPicPr>
+          <p:nvPr/>
+        </p:nvPicPr>
+        <p:blipFill>
+          <a:blip r:embed="rId20">
+            <a:extLst>
+              <a:ext uri="{28A0092B-C50C-407E-A947-70E740481C1C}">
+                <a14:useLocalDpi xmlns:a14="http://schemas.microsoft.com/office/drawing/2010/main" val="0"/>
+              </a:ext>
+            </a:extLst>
+          </a:blip>
+          <a:stretch>
+            <a:fillRect/>
+          </a:stretch>
+        </p:blipFill>
+        <p:spPr>
+          <a:xfrm>
+            <a:off x="11071580" y="5328598"/>
+            <a:ext cx="933450" cy="981075"/>
+          </a:xfrm>
+          <a:prstGeom prst="rect">
+            <a:avLst/>
+          </a:prstGeom>
+        </p:spPr>
+      </p:pic>
+      <p:pic>
+        <p:nvPicPr>
+          <p:cNvPr id="12" name="Imagem 11"/>
+          <p:cNvPicPr>
+            <a:picLocks noChangeAspect="1"/>
+          </p:cNvPicPr>
+          <p:nvPr/>
+        </p:nvPicPr>
+        <p:blipFill>
+          <a:blip r:embed="rId21"/>
+          <a:stretch>
+            <a:fillRect/>
+          </a:stretch>
+        </p:blipFill>
+        <p:spPr>
+          <a:xfrm>
+            <a:off x="70363" y="179703"/>
+            <a:ext cx="1689404" cy="950290"/>
+          </a:xfrm>
+          <a:prstGeom prst="rect">
+            <a:avLst/>
+          </a:prstGeom>
+        </p:spPr>
+      </p:pic>
+      <p:pic>
+        <p:nvPicPr>
+          <p:cNvPr id="18" name="Imagem 17"/>
+          <p:cNvPicPr>
+            <a:picLocks noChangeAspect="1"/>
+          </p:cNvPicPr>
+          <p:nvPr/>
+        </p:nvPicPr>
+        <p:blipFill>
+          <a:blip r:embed="rId22"/>
+          <a:stretch>
+            <a:fillRect/>
+          </a:stretch>
+        </p:blipFill>
+        <p:spPr>
+          <a:xfrm>
+            <a:off x="1907679" y="4935704"/>
+            <a:ext cx="824918" cy="431086"/>
+          </a:xfrm>
+          <a:prstGeom prst="rect">
+            <a:avLst/>
+          </a:prstGeom>
+        </p:spPr>
+      </p:pic>
+      <p:pic>
+        <p:nvPicPr>
+          <p:cNvPr id="20" name="Imagem 19" descr="Texto&#10;&#10;Descrição gerada automaticamente">
+            <a:extLst>
+              <a:ext uri="{FF2B5EF4-FFF2-40B4-BE49-F238E27FC236}">
+                <a16:creationId xmlns:a16="http://schemas.microsoft.com/office/drawing/2014/main" id="{ED87CAAA-DE80-46A0-86B2-609AB5201EA4}"/>
+              </a:ext>
+            </a:extLst>
+          </p:cNvPr>
+          <p:cNvPicPr>
+            <a:picLocks noChangeAspect="1"/>
+          </p:cNvPicPr>
+          <p:nvPr/>
+        </p:nvPicPr>
+        <p:blipFill>
+          <a:blip r:embed="rId23">
+            <a:extLst>
+              <a:ext uri="{28A0092B-C50C-407E-A947-70E740481C1C}">
+                <a14:useLocalDpi xmlns:a14="http://schemas.microsoft.com/office/drawing/2010/main" val="0"/>
+              </a:ext>
+            </a:extLst>
+          </a:blip>
+          <a:stretch>
+            <a:fillRect/>
+          </a:stretch>
+        </p:blipFill>
+        <p:spPr>
+          <a:xfrm>
+            <a:off x="1022259" y="4511074"/>
+            <a:ext cx="529375" cy="409635"/>
+          </a:xfrm>
+          <a:prstGeom prst="rect">
+            <a:avLst/>
+          </a:prstGeom>
+        </p:spPr>
+      </p:pic>
+      <p:pic>
+        <p:nvPicPr>
+          <p:cNvPr id="26" name="Imagem 25" descr="Logotipo&#10;&#10;Descrição gerada automaticamente">
+            <a:extLst>
+              <a:ext uri="{FF2B5EF4-FFF2-40B4-BE49-F238E27FC236}">
+                <a16:creationId xmlns:a16="http://schemas.microsoft.com/office/drawing/2014/main" id="{6B8134E3-650D-478E-A821-EF0EB50EF35E}"/>
+              </a:ext>
+            </a:extLst>
+          </p:cNvPr>
+          <p:cNvPicPr>
+            <a:picLocks noChangeAspect="1"/>
+          </p:cNvPicPr>
+          <p:nvPr/>
+        </p:nvPicPr>
+        <p:blipFill>
+          <a:blip r:embed="rId24">
+            <a:extLst>
+              <a:ext uri="{28A0092B-C50C-407E-A947-70E740481C1C}">
+                <a14:useLocalDpi xmlns:a14="http://schemas.microsoft.com/office/drawing/2010/main" val="0"/>
+              </a:ext>
+            </a:extLst>
+          </a:blip>
+          <a:stretch>
+            <a:fillRect/>
+          </a:stretch>
+        </p:blipFill>
+        <p:spPr>
+          <a:xfrm>
+            <a:off x="1617662" y="4470979"/>
+            <a:ext cx="690370" cy="589691"/>
+          </a:xfrm>
+          <a:prstGeom prst="rect">
+            <a:avLst/>
+          </a:prstGeom>
+        </p:spPr>
+      </p:pic>
+      <p:sp>
+        <p:nvSpPr>
+          <p:cNvPr id="27" name="Retângulo: Cantos Arredondados 26">
+            <a:extLst>
+              <a:ext uri="{FF2B5EF4-FFF2-40B4-BE49-F238E27FC236}">
+                <a16:creationId xmlns:a16="http://schemas.microsoft.com/office/drawing/2014/main" id="{8FA7A66A-5AF3-44D5-82C5-F518ED665F57}"/>
+              </a:ext>
+            </a:extLst>
+          </p:cNvPr>
+          <p:cNvSpPr/>
+          <p:nvPr/>
+        </p:nvSpPr>
+        <p:spPr>
+          <a:xfrm>
+            <a:off x="1629768" y="4506075"/>
+            <a:ext cx="1254245" cy="999407"/>
+          </a:xfrm>
+          <a:prstGeom prst="roundRect">
+            <a:avLst/>
+          </a:prstGeom>
+          <a:noFill/>
+        </p:spPr>
+        <p:style>
+          <a:lnRef idx="2">
+            <a:schemeClr val="accent1">
+              <a:shade val="50000"/>
+            </a:schemeClr>
+          </a:lnRef>
+          <a:fillRef idx="1">
+            <a:schemeClr val="accent1"/>
+          </a:fillRef>
+          <a:effectRef idx="0">
+            <a:schemeClr val="accent1"/>
+          </a:effectRef>
+          <a:fontRef idx="minor">
+            <a:schemeClr val="lt1"/>
+          </a:fontRef>
+        </p:style>
+        <p:txBody>
+          <a:bodyPr rtlCol="0" anchor="ctr"/>
+          <a:lstStyle/>
+          <a:p>
+            <a:pPr algn="ctr"/>
+            <a:endParaRPr lang="pt-BR"/>
+          </a:p>
+        </p:txBody>
+      </p:sp>
+      <p:pic>
+        <p:nvPicPr>
+          <p:cNvPr id="30" name="Imagem 29" descr="Ícone&#10;&#10;Descrição gerada automaticamente">
+            <a:extLst>
+              <a:ext uri="{FF2B5EF4-FFF2-40B4-BE49-F238E27FC236}">
+                <a16:creationId xmlns:a16="http://schemas.microsoft.com/office/drawing/2014/main" id="{37F30B95-69BD-4863-8AD5-82CA6DED1DD7}"/>
+              </a:ext>
+            </a:extLst>
+          </p:cNvPr>
+          <p:cNvPicPr>
+            <a:picLocks noChangeAspect="1"/>
+          </p:cNvPicPr>
+          <p:nvPr/>
+        </p:nvPicPr>
+        <p:blipFill>
+          <a:blip r:embed="rId25">
+            <a:extLst>
+              <a:ext uri="{28A0092B-C50C-407E-A947-70E740481C1C}">
+                <a14:useLocalDpi xmlns:a14="http://schemas.microsoft.com/office/drawing/2010/main" val="0"/>
+              </a:ext>
+            </a:extLst>
+          </a:blip>
+          <a:stretch>
+            <a:fillRect/>
+          </a:stretch>
+        </p:blipFill>
+        <p:spPr>
+          <a:xfrm>
+            <a:off x="1234537" y="1451292"/>
+            <a:ext cx="810600" cy="810600"/>
+          </a:xfrm>
+          <a:prstGeom prst="rect">
+            <a:avLst/>
+          </a:prstGeom>
+        </p:spPr>
+      </p:pic>
+      <p:cxnSp>
+        <p:nvCxnSpPr>
+          <p:cNvPr id="35" name="Conector de Seta Reta 34">
+            <a:extLst>
+              <a:ext uri="{FF2B5EF4-FFF2-40B4-BE49-F238E27FC236}">
+                <a16:creationId xmlns:a16="http://schemas.microsoft.com/office/drawing/2014/main" id="{8103FEFB-336C-414E-BD99-F6AF7DF67DF7}"/>
+              </a:ext>
+            </a:extLst>
+          </p:cNvPr>
+          <p:cNvCxnSpPr>
+            <a:cxnSpLocks/>
+          </p:cNvCxnSpPr>
+          <p:nvPr/>
+        </p:nvCxnSpPr>
+        <p:spPr>
+          <a:xfrm>
+            <a:off x="3981796" y="2003367"/>
+            <a:ext cx="2469905" cy="0"/>
+          </a:xfrm>
+          <a:prstGeom prst="straightConnector1">
+            <a:avLst/>
+          </a:prstGeom>
+          <a:ln>
+            <a:tailEnd type="triangle"/>
+          </a:ln>
+        </p:spPr>
+        <p:style>
+          <a:lnRef idx="1">
+            <a:schemeClr val="accent1"/>
+          </a:lnRef>
+          <a:fillRef idx="0">
+            <a:schemeClr val="accent1"/>
+          </a:fillRef>
+          <a:effectRef idx="0">
+            <a:schemeClr val="accent1"/>
+          </a:effectRef>
+          <a:fontRef idx="minor">
+            <a:schemeClr val="tx1"/>
+          </a:fontRef>
+        </p:style>
+      </p:cxnSp>
+      <p:cxnSp>
+        <p:nvCxnSpPr>
+          <p:cNvPr id="61" name="Conector de Seta Reta 60">
+            <a:extLst>
+              <a:ext uri="{FF2B5EF4-FFF2-40B4-BE49-F238E27FC236}">
+                <a16:creationId xmlns:a16="http://schemas.microsoft.com/office/drawing/2014/main" id="{C2916943-22EE-4CFB-99FA-9AD58A30BF83}"/>
+              </a:ext>
+            </a:extLst>
+          </p:cNvPr>
+          <p:cNvCxnSpPr>
+            <a:cxnSpLocks/>
+          </p:cNvCxnSpPr>
+          <p:nvPr/>
+        </p:nvCxnSpPr>
+        <p:spPr>
+          <a:xfrm flipV="1">
+            <a:off x="4079236" y="2261892"/>
+            <a:ext cx="2469905" cy="1658265"/>
+          </a:xfrm>
+          <a:prstGeom prst="straightConnector1">
+            <a:avLst/>
+          </a:prstGeom>
+          <a:ln>
+            <a:tailEnd type="triangle"/>
+          </a:ln>
+        </p:spPr>
+        <p:style>
+          <a:lnRef idx="1">
+            <a:schemeClr val="accent1"/>
+          </a:lnRef>
+          <a:fillRef idx="0">
+            <a:schemeClr val="accent1"/>
+          </a:fillRef>
+          <a:effectRef idx="0">
+            <a:schemeClr val="accent1"/>
+          </a:effectRef>
+          <a:fontRef idx="minor">
+            <a:schemeClr val="tx1"/>
+          </a:fontRef>
+        </p:style>
+      </p:cxnSp>
+      <p:cxnSp>
+        <p:nvCxnSpPr>
+          <p:cNvPr id="64" name="Conector de Seta Reta 63">
+            <a:extLst>
+              <a:ext uri="{FF2B5EF4-FFF2-40B4-BE49-F238E27FC236}">
+                <a16:creationId xmlns:a16="http://schemas.microsoft.com/office/drawing/2014/main" id="{7657379C-900C-4742-A460-A8AE9389EEF8}"/>
+              </a:ext>
+            </a:extLst>
+          </p:cNvPr>
+          <p:cNvCxnSpPr>
+            <a:cxnSpLocks/>
+          </p:cNvCxnSpPr>
+          <p:nvPr/>
+        </p:nvCxnSpPr>
+        <p:spPr>
+          <a:xfrm>
+            <a:off x="9346920" y="2753330"/>
+            <a:ext cx="0" cy="1166827"/>
+          </a:xfrm>
+          <a:prstGeom prst="straightConnector1">
+            <a:avLst/>
+          </a:prstGeom>
+          <a:ln>
+            <a:tailEnd type="triangle"/>
+          </a:ln>
+        </p:spPr>
+        <p:style>
+          <a:lnRef idx="1">
+            <a:schemeClr val="accent1"/>
+          </a:lnRef>
+          <a:fillRef idx="0">
+            <a:schemeClr val="accent1"/>
+          </a:fillRef>
+          <a:effectRef idx="0">
+            <a:schemeClr val="accent1"/>
+          </a:effectRef>
+          <a:fontRef idx="minor">
+            <a:schemeClr val="tx1"/>
+          </a:fontRef>
+        </p:style>
+      </p:cxnSp>
+      <p:cxnSp>
+        <p:nvCxnSpPr>
+          <p:cNvPr id="69" name="Conector de Seta Reta 68">
+            <a:extLst>
+              <a:ext uri="{FF2B5EF4-FFF2-40B4-BE49-F238E27FC236}">
+                <a16:creationId xmlns:a16="http://schemas.microsoft.com/office/drawing/2014/main" id="{B81E2079-84D7-430E-A793-D3C73FD6A4F9}"/>
+              </a:ext>
+            </a:extLst>
+          </p:cNvPr>
+          <p:cNvCxnSpPr>
+            <a:cxnSpLocks/>
+          </p:cNvCxnSpPr>
+          <p:nvPr/>
+        </p:nvCxnSpPr>
+        <p:spPr>
+          <a:xfrm>
+            <a:off x="4103433" y="5109788"/>
+            <a:ext cx="1365481" cy="0"/>
+          </a:xfrm>
+          <a:prstGeom prst="straightConnector1">
+            <a:avLst/>
+          </a:prstGeom>
+          <a:ln>
+            <a:tailEnd type="triangle"/>
+          </a:ln>
+        </p:spPr>
+        <p:style>
+          <a:lnRef idx="1">
+            <a:schemeClr val="accent1"/>
+          </a:lnRef>
+          <a:fillRef idx="0">
+            <a:schemeClr val="accent1"/>
+          </a:fillRef>
+          <a:effectRef idx="0">
+            <a:schemeClr val="accent1"/>
+          </a:effectRef>
+          <a:fontRef idx="minor">
+            <a:schemeClr val="tx1"/>
+          </a:fontRef>
+        </p:style>
+      </p:cxnSp>
+      <p:cxnSp>
+        <p:nvCxnSpPr>
+          <p:cNvPr id="73" name="Conector de Seta Reta 72">
+            <a:extLst>
+              <a:ext uri="{FF2B5EF4-FFF2-40B4-BE49-F238E27FC236}">
+                <a16:creationId xmlns:a16="http://schemas.microsoft.com/office/drawing/2014/main" id="{C47F1F93-925A-41E3-B4F1-42F7A6F2840A}"/>
+              </a:ext>
+            </a:extLst>
+          </p:cNvPr>
+          <p:cNvCxnSpPr>
+            <a:cxnSpLocks/>
+          </p:cNvCxnSpPr>
+          <p:nvPr/>
+        </p:nvCxnSpPr>
+        <p:spPr>
+          <a:xfrm flipV="1">
+            <a:off x="6598467" y="5095789"/>
+            <a:ext cx="1448308" cy="13999"/>
+          </a:xfrm>
+          <a:prstGeom prst="straightConnector1">
+            <a:avLst/>
+          </a:prstGeom>
+          <a:ln>
+            <a:tailEnd type="triangle"/>
+          </a:ln>
+        </p:spPr>
+        <p:style>
+          <a:lnRef idx="1">
+            <a:schemeClr val="accent1"/>
+          </a:lnRef>
+          <a:fillRef idx="0">
+            <a:schemeClr val="accent1"/>
+          </a:fillRef>
+          <a:effectRef idx="0">
+            <a:schemeClr val="accent1"/>
+          </a:effectRef>
+          <a:fontRef idx="minor">
+            <a:schemeClr val="tx1"/>
+          </a:fontRef>
+        </p:style>
+      </p:cxnSp>
+      <p:sp>
+        <p:nvSpPr>
+          <p:cNvPr id="81" name="CaixaDeTexto 80">
+            <a:extLst>
+              <a:ext uri="{FF2B5EF4-FFF2-40B4-BE49-F238E27FC236}">
+                <a16:creationId xmlns:a16="http://schemas.microsoft.com/office/drawing/2014/main" id="{ECE493CE-D17B-4BFE-BD91-4E56E5D69857}"/>
+              </a:ext>
+            </a:extLst>
+          </p:cNvPr>
+          <p:cNvSpPr txBox="1"/>
+          <p:nvPr/>
+        </p:nvSpPr>
+        <p:spPr>
+          <a:xfrm>
+            <a:off x="5834549" y="21848"/>
+            <a:ext cx="522900" cy="369332"/>
+          </a:xfrm>
+          <a:prstGeom prst="rect">
+            <a:avLst/>
+          </a:prstGeom>
+          <a:noFill/>
+        </p:spPr>
+        <p:txBody>
+          <a:bodyPr wrap="none" rtlCol="0">
+            <a:spAutoFit/>
+          </a:bodyPr>
+          <a:lstStyle/>
+          <a:p>
+            <a:r>
+              <a:rPr lang="pt-BR" b="1" dirty="0"/>
+              <a:t>LLD</a:t>
+            </a:r>
+          </a:p>
+        </p:txBody>
+      </p:sp>
+    </p:spTree>
+    <p:extLst>
+      <p:ext uri="{BB962C8B-B14F-4D97-AF65-F5344CB8AC3E}">
+        <p14:creationId xmlns:p14="http://schemas.microsoft.com/office/powerpoint/2010/main" val="2571974641"/>
+      </p:ext>
+    </p:extLst>
+  </p:cSld>
+  <p:clrMapOvr>
+    <a:masterClrMapping/>
+  </p:clrMapOvr>
+  <p:timing>
+    <p:tnLst>
+      <p:par>
+        <p:cTn id="1" dur="indefinite" restart="never" nodeType="tmRoot">
+          <p:childTnLst>
+            <p:seq concurrent="1" nextAc="seek">
+              <p:cTn id="2" dur="indefinite" nodeType="mainSeq">
+                <p:childTnLst>
+                  <p:par>
+                    <p:cTn id="3" fill="hold">
+                      <p:stCondLst>
+                        <p:cond delay="indefinite"/>
+                      </p:stCondLst>
+                      <p:childTnLst>
+                        <p:par>
+                          <p:cTn id="4" fill="hold">
+                            <p:stCondLst>
+                              <p:cond delay="0"/>
+                            </p:stCondLst>
+                            <p:childTnLst>
+                              <p:par>
+                                <p:cTn id="5" presetID="50" presetClass="path" presetSubtype="0" accel="50000" decel="50000" fill="hold" nodeType="clickEffect">
+                                  <p:stCondLst>
+                                    <p:cond delay="0"/>
+                                  </p:stCondLst>
+                                  <p:childTnLst>
+                                    <p:animMotion origin="layout" path="M 4.79167E-6 -1.85185E-6 L 0.30494 -1.85185E-6 C 0.44153 -1.85185E-6 0.61002 -0.03819 0.61002 -0.06898 L 0.61002 -0.13773 " pathEditMode="relative" rAng="0" ptsTypes="AAAA">
+                                      <p:cBhvr>
+                                        <p:cTn id="6" dur="2000" fill="hold"/>
+                                        <p:tgtEl>
+                                          <p:spTgt spid="30"/>
+                                        </p:tgtEl>
+                                        <p:attrNameLst>
+                                          <p:attrName>ppt_x</p:attrName>
+                                          <p:attrName>ppt_y</p:attrName>
+                                        </p:attrNameLst>
+                                      </p:cBhvr>
+                                      <p:rCtr x="30495" y="-6898"/>
+                                    </p:animMotion>
+                                  </p:childTnLst>
+                                </p:cTn>
+                              </p:par>
+                            </p:childTnLst>
+                          </p:cTn>
+                        </p:par>
+                      </p:childTnLst>
+                    </p:cTn>
+                  </p:par>
+                  <p:par>
+                    <p:cTn id="7" fill="hold">
+                      <p:stCondLst>
+                        <p:cond delay="indefinite"/>
+                      </p:stCondLst>
+                      <p:childTnLst>
+                        <p:par>
+                          <p:cTn id="8" fill="hold">
+                            <p:stCondLst>
+                              <p:cond delay="0"/>
+                            </p:stCondLst>
+                            <p:childTnLst>
+                              <p:par>
+                                <p:cTn id="9" presetID="1" presetClass="entr" presetSubtype="0" fill="hold" nodeType="clickEffect">
+                                  <p:stCondLst>
+                                    <p:cond delay="0"/>
+                                  </p:stCondLst>
+                                  <p:childTnLst>
+                                    <p:set>
+                                      <p:cBhvr>
+                                        <p:cTn id="10" dur="1" fill="hold">
+                                          <p:stCondLst>
+                                            <p:cond delay="0"/>
+                                          </p:stCondLst>
+                                        </p:cTn>
+                                        <p:tgtEl>
+                                          <p:spTgt spid="23"/>
+                                        </p:tgtEl>
+                                        <p:attrNameLst>
+                                          <p:attrName>style.visibility</p:attrName>
+                                        </p:attrNameLst>
+                                      </p:cBhvr>
+                                      <p:to>
+                                        <p:strVal val="visible"/>
+                                      </p:to>
+                                    </p:set>
+                                  </p:childTnLst>
+                                </p:cTn>
+                              </p:par>
+                              <p:par>
+                                <p:cTn id="11" presetID="1" presetClass="entr" presetSubtype="0" fill="hold" nodeType="withEffect">
+                                  <p:stCondLst>
+                                    <p:cond delay="0"/>
+                                  </p:stCondLst>
+                                  <p:childTnLst>
+                                    <p:set>
+                                      <p:cBhvr>
+                                        <p:cTn id="12" dur="1" fill="hold">
+                                          <p:stCondLst>
+                                            <p:cond delay="0"/>
+                                          </p:stCondLst>
+                                        </p:cTn>
+                                        <p:tgtEl>
+                                          <p:spTgt spid="50"/>
+                                        </p:tgtEl>
+                                        <p:attrNameLst>
+                                          <p:attrName>style.visibility</p:attrName>
+                                        </p:attrNameLst>
+                                      </p:cBhvr>
+                                      <p:to>
+                                        <p:strVal val="visible"/>
+                                      </p:to>
+                                    </p:set>
+                                  </p:childTnLst>
+                                </p:cTn>
+                              </p:par>
+                              <p:par>
+                                <p:cTn id="13" presetID="1" presetClass="entr" presetSubtype="0" fill="hold" nodeType="withEffect">
+                                  <p:stCondLst>
+                                    <p:cond delay="0"/>
+                                  </p:stCondLst>
+                                  <p:childTnLst>
+                                    <p:set>
+                                      <p:cBhvr>
+                                        <p:cTn id="14" dur="1" fill="hold">
+                                          <p:stCondLst>
+                                            <p:cond delay="0"/>
+                                          </p:stCondLst>
+                                        </p:cTn>
+                                        <p:tgtEl>
+                                          <p:spTgt spid="19"/>
+                                        </p:tgtEl>
+                                        <p:attrNameLst>
+                                          <p:attrName>style.visibility</p:attrName>
+                                        </p:attrNameLst>
+                                      </p:cBhvr>
+                                      <p:to>
+                                        <p:strVal val="visible"/>
+                                      </p:to>
+                                    </p:set>
+                                  </p:childTnLst>
+                                </p:cTn>
+                              </p:par>
+                              <p:par>
+                                <p:cTn id="15" presetID="1" presetClass="entr" presetSubtype="0" fill="hold" nodeType="withEffect">
+                                  <p:stCondLst>
+                                    <p:cond delay="0"/>
+                                  </p:stCondLst>
+                                  <p:childTnLst>
+                                    <p:set>
+                                      <p:cBhvr>
+                                        <p:cTn id="16" dur="1" fill="hold">
+                                          <p:stCondLst>
+                                            <p:cond delay="0"/>
+                                          </p:stCondLst>
+                                        </p:cTn>
+                                        <p:tgtEl>
+                                          <p:spTgt spid="1030"/>
+                                        </p:tgtEl>
+                                        <p:attrNameLst>
+                                          <p:attrName>style.visibility</p:attrName>
+                                        </p:attrNameLst>
+                                      </p:cBhvr>
+                                      <p:to>
+                                        <p:strVal val="visible"/>
+                                      </p:to>
+                                    </p:set>
+                                  </p:childTnLst>
+                                </p:cTn>
+                              </p:par>
+                              <p:par>
+                                <p:cTn id="17" presetID="1" presetClass="entr" presetSubtype="0" fill="hold" nodeType="withEffect">
+                                  <p:stCondLst>
+                                    <p:cond delay="0"/>
+                                  </p:stCondLst>
+                                  <p:childTnLst>
+                                    <p:set>
+                                      <p:cBhvr>
+                                        <p:cTn id="18" dur="1" fill="hold">
+                                          <p:stCondLst>
+                                            <p:cond delay="0"/>
+                                          </p:stCondLst>
+                                        </p:cTn>
+                                        <p:tgtEl>
+                                          <p:spTgt spid="25"/>
+                                        </p:tgtEl>
+                                        <p:attrNameLst>
+                                          <p:attrName>style.visibility</p:attrName>
+                                        </p:attrNameLst>
+                                      </p:cBhvr>
+                                      <p:to>
+                                        <p:strVal val="visible"/>
+                                      </p:to>
+                                    </p:set>
+                                  </p:childTnLst>
+                                </p:cTn>
+                              </p:par>
+                              <p:par>
+                                <p:cTn id="19" presetID="1" presetClass="entr" presetSubtype="0" fill="hold" nodeType="withEffect">
+                                  <p:stCondLst>
+                                    <p:cond delay="0"/>
+                                  </p:stCondLst>
+                                  <p:childTnLst>
+                                    <p:set>
+                                      <p:cBhvr>
+                                        <p:cTn id="20" dur="1" fill="hold">
+                                          <p:stCondLst>
+                                            <p:cond delay="0"/>
+                                          </p:stCondLst>
+                                        </p:cTn>
+                                        <p:tgtEl>
+                                          <p:spTgt spid="10"/>
+                                        </p:tgtEl>
+                                        <p:attrNameLst>
+                                          <p:attrName>style.visibility</p:attrName>
+                                        </p:attrNameLst>
+                                      </p:cBhvr>
+                                      <p:to>
+                                        <p:strVal val="visible"/>
+                                      </p:to>
+                                    </p:set>
+                                  </p:childTnLst>
+                                </p:cTn>
+                              </p:par>
+                            </p:childTnLst>
+                          </p:cTn>
+                        </p:par>
+                      </p:childTnLst>
+                    </p:cTn>
+                  </p:par>
+                </p:childTnLst>
+              </p:cTn>
+              <p:prevCondLst>
+                <p:cond evt="onPrev" delay="0">
+                  <p:tgtEl>
+                    <p:sldTgt/>
+                  </p:tgtEl>
+                </p:cond>
+              </p:prevCondLst>
+              <p:nextCondLst>
+                <p:cond evt="onNext" delay="0">
+                  <p:tgtEl>
+                    <p:sldTgt/>
+                  </p:tgtEl>
+                </p:cond>
+              </p:nextCondLst>
+            </p:seq>
+          </p:childTnLst>
+        </p:cTn>
+      </p:par>
+    </p:tnLst>
+  </p:timing>
 </p:sld>
 </file>
 
@@ -5716,6 +7549,21 @@
 </file>
 
 <file path=customXml/item1.xml><?xml version="1.0" encoding="utf-8"?>
+<p:properties xmlns:p="http://schemas.microsoft.com/office/2006/metadata/properties" xmlns:xsi="http://www.w3.org/2001/XMLSchema-instance" xmlns:pc="http://schemas.microsoft.com/office/infopath/2007/PartnerControls">
+  <documentManagement/>
+</p:properties>
+</file>
+
+<file path=customXml/item2.xml><?xml version="1.0" encoding="utf-8"?>
+<?mso-contentType ?>
+<FormTemplates xmlns="http://schemas.microsoft.com/sharepoint/v3/contenttype/forms">
+  <Display>DocumentLibraryForm</Display>
+  <Edit>DocumentLibraryForm</Edit>
+  <New>DocumentLibraryForm</New>
+</FormTemplates>
+</file>
+
+<file path=customXml/item3.xml><?xml version="1.0" encoding="utf-8"?>
 <ct:contentTypeSchema xmlns:ct="http://schemas.microsoft.com/office/2006/metadata/contentType" xmlns:ma="http://schemas.microsoft.com/office/2006/metadata/properties/metaAttributes" ct:_="" ma:_="" ma:contentTypeName="Document" ma:contentTypeID="0x010100B98A8EE2A9F7A14F94CEDBF06729C915" ma:contentTypeVersion="2" ma:contentTypeDescription="Create a new document." ma:contentTypeScope="" ma:versionID="54211dd7b80d0a5e350bd2ce1fda18e0">
   <xsd:schema xmlns:xsd="http://www.w3.org/2001/XMLSchema" xmlns:xs="http://www.w3.org/2001/XMLSchema" xmlns:p="http://schemas.microsoft.com/office/2006/metadata/properties" xmlns:ns3="4d0c820a-888c-467f-9883-f2eb09285986" targetNamespace="http://schemas.microsoft.com/office/2006/metadata/properties" ma:root="true" ma:fieldsID="215748a485b3af4a87eff8123adb26da" ns3:_="">
     <xsd:import namespace="4d0c820a-888c-467f-9883-f2eb09285986"/>
@@ -5847,22 +7695,31 @@
 </ct:contentTypeSchema>
 </file>
 
-<file path=customXml/item2.xml><?xml version="1.0" encoding="utf-8"?>
-<?mso-contentType ?>
-<FormTemplates xmlns="http://schemas.microsoft.com/sharepoint/v3/contenttype/forms">
-  <Display>DocumentLibraryForm</Display>
-  <Edit>DocumentLibraryForm</Edit>
-  <New>DocumentLibraryForm</New>
-</FormTemplates>
+<file path=customXml/itemProps1.xml><?xml version="1.0" encoding="utf-8"?>
+<ds:datastoreItem xmlns:ds="http://schemas.openxmlformats.org/officeDocument/2006/customXml" ds:itemID="{B1403ECD-64BE-4472-A72B-8AE2B2D302D4}">
+  <ds:schemaRefs>
+    <ds:schemaRef ds:uri="http://schemas.microsoft.com/office/2006/documentManagement/types"/>
+    <ds:schemaRef ds:uri="http://schemas.microsoft.com/office/infopath/2007/PartnerControls"/>
+    <ds:schemaRef ds:uri="http://www.w3.org/XML/1998/namespace"/>
+    <ds:schemaRef ds:uri="4d0c820a-888c-467f-9883-f2eb09285986"/>
+    <ds:schemaRef ds:uri="http://purl.org/dc/terms/"/>
+    <ds:schemaRef ds:uri="http://purl.org/dc/dcmitype/"/>
+    <ds:schemaRef ds:uri="http://purl.org/dc/elements/1.1/"/>
+    <ds:schemaRef ds:uri="http://schemas.openxmlformats.org/package/2006/metadata/core-properties"/>
+    <ds:schemaRef ds:uri="http://schemas.microsoft.com/office/2006/metadata/properties"/>
+  </ds:schemaRefs>
+</ds:datastoreItem>
 </file>
 
-<file path=customXml/item3.xml><?xml version="1.0" encoding="utf-8"?>
-<p:properties xmlns:p="http://schemas.microsoft.com/office/2006/metadata/properties" xmlns:xsi="http://www.w3.org/2001/XMLSchema-instance" xmlns:pc="http://schemas.microsoft.com/office/infopath/2007/PartnerControls">
-  <documentManagement/>
-</p:properties>
+<file path=customXml/itemProps2.xml><?xml version="1.0" encoding="utf-8"?>
+<ds:datastoreItem xmlns:ds="http://schemas.openxmlformats.org/officeDocument/2006/customXml" ds:itemID="{C361E357-1858-46EE-ADFA-698EE4D9C360}">
+  <ds:schemaRefs>
+    <ds:schemaRef ds:uri="http://schemas.microsoft.com/sharepoint/v3/contenttype/forms"/>
+  </ds:schemaRefs>
+</ds:datastoreItem>
 </file>
 
-<file path=customXml/itemProps1.xml><?xml version="1.0" encoding="utf-8"?>
+<file path=customXml/itemProps3.xml><?xml version="1.0" encoding="utf-8"?>
 <ds:datastoreItem xmlns:ds="http://schemas.openxmlformats.org/officeDocument/2006/customXml" ds:itemID="{94021B74-C88A-417E-AEFD-9E5858425111}">
   <ds:schemaRefs>
     <ds:schemaRef ds:uri="http://schemas.microsoft.com/office/2006/metadata/contentType"/>
@@ -5878,28 +7735,4 @@
     <ds:schemaRef ds:uri="http://schemas.microsoft.com/internal/obd"/>
   </ds:schemaRefs>
 </ds:datastoreItem>
-</file>
-
-<file path=customXml/itemProps2.xml><?xml version="1.0" encoding="utf-8"?>
-<ds:datastoreItem xmlns:ds="http://schemas.openxmlformats.org/officeDocument/2006/customXml" ds:itemID="{C361E357-1858-46EE-ADFA-698EE4D9C360}">
-  <ds:schemaRefs>
-    <ds:schemaRef ds:uri="http://schemas.microsoft.com/sharepoint/v3/contenttype/forms"/>
-  </ds:schemaRefs>
-</ds:datastoreItem>
-</file>
-
-<file path=customXml/itemProps3.xml><?xml version="1.0" encoding="utf-8"?>
-<ds:datastoreItem xmlns:ds="http://schemas.openxmlformats.org/officeDocument/2006/customXml" ds:itemID="{B1403ECD-64BE-4472-A72B-8AE2B2D302D4}">
-  <ds:schemaRefs>
-    <ds:schemaRef ds:uri="http://schemas.microsoft.com/office/2006/documentManagement/types"/>
-    <ds:schemaRef ds:uri="http://schemas.microsoft.com/office/infopath/2007/PartnerControls"/>
-    <ds:schemaRef ds:uri="http://www.w3.org/XML/1998/namespace"/>
-    <ds:schemaRef ds:uri="4d0c820a-888c-467f-9883-f2eb09285986"/>
-    <ds:schemaRef ds:uri="http://purl.org/dc/terms/"/>
-    <ds:schemaRef ds:uri="http://purl.org/dc/dcmitype/"/>
-    <ds:schemaRef ds:uri="http://purl.org/dc/elements/1.1/"/>
-    <ds:schemaRef ds:uri="http://schemas.openxmlformats.org/package/2006/metadata/core-properties"/>
-    <ds:schemaRef ds:uri="http://schemas.microsoft.com/office/2006/metadata/properties"/>
-  </ds:schemaRefs>
-</ds:datastoreItem>
 </file>
</xml_diff>